<commit_message>
Worked on the slides
</commit_message>
<xml_diff>
--- a/src/slides/resources/2017-03-31-JUG-Saxony-Workshop-de.pptx
+++ b/src/slides/resources/2017-03-31-JUG-Saxony-Workshop-de.pptx
@@ -5,20 +5,25 @@
     <p:sldMasterId id="2147483648" r:id="rId1"/>
   </p:sldMasterIdLst>
   <p:notesMasterIdLst>
-    <p:notesMasterId r:id="rId10"/>
+    <p:notesMasterId r:id="rId15"/>
   </p:notesMasterIdLst>
   <p:handoutMasterIdLst>
-    <p:handoutMasterId r:id="rId11"/>
+    <p:handoutMasterId r:id="rId16"/>
   </p:handoutMasterIdLst>
   <p:sldIdLst>
     <p:sldId id="668" r:id="rId2"/>
-    <p:sldId id="712" r:id="rId3"/>
-    <p:sldId id="711" r:id="rId4"/>
-    <p:sldId id="710" r:id="rId5"/>
-    <p:sldId id="709" r:id="rId6"/>
-    <p:sldId id="686" r:id="rId7"/>
-    <p:sldId id="706" r:id="rId8"/>
-    <p:sldId id="702" r:id="rId9"/>
+    <p:sldId id="714" r:id="rId3"/>
+    <p:sldId id="712" r:id="rId4"/>
+    <p:sldId id="719" r:id="rId5"/>
+    <p:sldId id="717" r:id="rId6"/>
+    <p:sldId id="718" r:id="rId7"/>
+    <p:sldId id="716" r:id="rId8"/>
+    <p:sldId id="710" r:id="rId9"/>
+    <p:sldId id="713" r:id="rId10"/>
+    <p:sldId id="709" r:id="rId11"/>
+    <p:sldId id="686" r:id="rId12"/>
+    <p:sldId id="706" r:id="rId13"/>
+    <p:sldId id="702" r:id="rId14"/>
   </p:sldIdLst>
   <p:sldSz cx="12192000" cy="6858000"/>
   <p:notesSz cx="7315200" cy="9601200"/>
@@ -149,7 +154,7 @@
   </p:defaultTextStyle>
   <p:extLst>
     <p:ext uri="{EFAFB233-063F-42B5-8137-9DF3F51BA10A}">
-      <p15:sldGuideLst xmlns="" xmlns:p15="http://schemas.microsoft.com/office/powerpoint/2012/main">
+      <p15:sldGuideLst xmlns:p15="http://schemas.microsoft.com/office/powerpoint/2012/main" xmlns="">
         <p15:guide id="1" orient="horz" pos="2084">
           <p15:clr>
             <a:srgbClr val="A4A3A4"/>
@@ -163,7 +168,7 @@
       </p15:sldGuideLst>
     </p:ext>
     <p:ext uri="{2D200454-40CA-4A62-9FC3-DE9A4176ACB9}">
-      <p15:notesGuideLst xmlns="" xmlns:p15="http://schemas.microsoft.com/office/powerpoint/2012/main">
+      <p15:notesGuideLst xmlns:p15="http://schemas.microsoft.com/office/powerpoint/2012/main" xmlns="">
         <p15:guide id="1" orient="horz" pos="3024">
           <p15:clr>
             <a:srgbClr val="A4A3A4"/>
@@ -1043,6 +1048,252 @@
     <p:extLst>
       <p:ext uri="{BB962C8B-B14F-4D97-AF65-F5344CB8AC3E}">
         <p14:creationId xmlns:p14="http://schemas.microsoft.com/office/powerpoint/2010/main" val="2949974959"/>
+      </p:ext>
+    </p:extLst>
+  </p:cSld>
+  <p:clrMapOvr>
+    <a:masterClrMapping/>
+  </p:clrMapOvr>
+</p:notes>
+</file>
+
+<file path=ppt/notesSlides/notesSlide2.xml><?xml version="1.0" encoding="utf-8"?>
+<p:notes xmlns:a="http://schemas.openxmlformats.org/drawingml/2006/main" xmlns:r="http://schemas.openxmlformats.org/officeDocument/2006/relationships" xmlns:p="http://schemas.openxmlformats.org/presentationml/2006/main">
+  <p:cSld>
+    <p:spTree>
+      <p:nvGrpSpPr>
+        <p:cNvPr id="1" name=""/>
+        <p:cNvGrpSpPr/>
+        <p:nvPr/>
+      </p:nvGrpSpPr>
+      <p:grpSpPr>
+        <a:xfrm>
+          <a:off x="0" y="0"/>
+          <a:ext cx="0" cy="0"/>
+          <a:chOff x="0" y="0"/>
+          <a:chExt cx="0" cy="0"/>
+        </a:xfrm>
+      </p:grpSpPr>
+      <p:sp>
+        <p:nvSpPr>
+          <p:cNvPr id="2" name="Folienbildplatzhalter 1"/>
+          <p:cNvSpPr>
+            <a:spLocks noGrp="1" noRot="1" noChangeAspect="1"/>
+          </p:cNvSpPr>
+          <p:nvPr>
+            <p:ph type="sldImg"/>
+          </p:nvPr>
+        </p:nvSpPr>
+        <p:spPr>
+          <a:xfrm>
+            <a:off x="457200" y="719138"/>
+            <a:ext cx="6402388" cy="3602037"/>
+          </a:xfrm>
+        </p:spPr>
+      </p:sp>
+      <p:sp>
+        <p:nvSpPr>
+          <p:cNvPr id="3" name="Notizenplatzhalter 2"/>
+          <p:cNvSpPr>
+            <a:spLocks noGrp="1"/>
+          </p:cNvSpPr>
+          <p:nvPr>
+            <p:ph type="body" idx="1"/>
+          </p:nvPr>
+        </p:nvSpPr>
+        <p:spPr/>
+        <p:txBody>
+          <a:bodyPr/>
+          <a:lstStyle/>
+          <a:p>
+            <a:r>
+              <a:rPr lang="de-DE" dirty="0" smtClean="0"/>
+              <a:t>Vorwarnung: In echt sind die Daten niemals so</a:t>
+            </a:r>
+            <a:r>
+              <a:rPr lang="de-DE" baseline="0" dirty="0" smtClean="0"/>
+              <a:t> fehlerfrei und harmonisiert</a:t>
+            </a:r>
+            <a:endParaRPr lang="de-DE" dirty="0"/>
+          </a:p>
+        </p:txBody>
+      </p:sp>
+      <p:sp>
+        <p:nvSpPr>
+          <p:cNvPr id="4" name="Foliennummernplatzhalter 3"/>
+          <p:cNvSpPr>
+            <a:spLocks noGrp="1"/>
+          </p:cNvSpPr>
+          <p:nvPr>
+            <p:ph type="sldNum" sz="quarter" idx="10"/>
+          </p:nvPr>
+        </p:nvSpPr>
+        <p:spPr/>
+        <p:txBody>
+          <a:bodyPr/>
+          <a:lstStyle/>
+          <a:p>
+            <a:pPr>
+              <a:defRPr/>
+            </a:pPr>
+            <a:fld id="{A78FF2BC-F68A-4EB6-9E3E-3C5BE7030B7B}" type="slidenum">
+              <a:rPr lang="de-DE" smtClean="0"/>
+              <a:pPr>
+                <a:defRPr/>
+              </a:pPr>
+              <a:t>5</a:t>
+            </a:fld>
+            <a:endParaRPr lang="de-DE"/>
+          </a:p>
+        </p:txBody>
+      </p:sp>
+    </p:spTree>
+    <p:extLst>
+      <p:ext uri="{BB962C8B-B14F-4D97-AF65-F5344CB8AC3E}">
+        <p14:creationId xmlns:p14="http://schemas.microsoft.com/office/powerpoint/2010/main" val="2569672510"/>
+      </p:ext>
+    </p:extLst>
+  </p:cSld>
+  <p:clrMapOvr>
+    <a:masterClrMapping/>
+  </p:clrMapOvr>
+</p:notes>
+</file>
+
+<file path=ppt/notesSlides/notesSlide3.xml><?xml version="1.0" encoding="utf-8"?>
+<p:notes xmlns:a="http://schemas.openxmlformats.org/drawingml/2006/main" xmlns:r="http://schemas.openxmlformats.org/officeDocument/2006/relationships" xmlns:p="http://schemas.openxmlformats.org/presentationml/2006/main">
+  <p:cSld>
+    <p:spTree>
+      <p:nvGrpSpPr>
+        <p:cNvPr id="1" name=""/>
+        <p:cNvGrpSpPr/>
+        <p:nvPr/>
+      </p:nvGrpSpPr>
+      <p:grpSpPr>
+        <a:xfrm>
+          <a:off x="0" y="0"/>
+          <a:ext cx="0" cy="0"/>
+          <a:chOff x="0" y="0"/>
+          <a:chExt cx="0" cy="0"/>
+        </a:xfrm>
+      </p:grpSpPr>
+      <p:sp>
+        <p:nvSpPr>
+          <p:cNvPr id="2" name="Folienbildplatzhalter 1"/>
+          <p:cNvSpPr>
+            <a:spLocks noGrp="1" noRot="1" noChangeAspect="1"/>
+          </p:cNvSpPr>
+          <p:nvPr>
+            <p:ph type="sldImg"/>
+          </p:nvPr>
+        </p:nvSpPr>
+        <p:spPr>
+          <a:xfrm>
+            <a:off x="457200" y="719138"/>
+            <a:ext cx="6402388" cy="3602037"/>
+          </a:xfrm>
+        </p:spPr>
+      </p:sp>
+      <p:sp>
+        <p:nvSpPr>
+          <p:cNvPr id="3" name="Notizenplatzhalter 2"/>
+          <p:cNvSpPr>
+            <a:spLocks noGrp="1"/>
+          </p:cNvSpPr>
+          <p:nvPr>
+            <p:ph type="body" idx="1"/>
+          </p:nvPr>
+        </p:nvSpPr>
+        <p:spPr/>
+        <p:txBody>
+          <a:bodyPr/>
+          <a:lstStyle/>
+          <a:p>
+            <a:r>
+              <a:rPr lang="de-DE" dirty="0" smtClean="0"/>
+              <a:t>Analogie</a:t>
+            </a:r>
+            <a:r>
+              <a:rPr lang="de-DE" baseline="0" dirty="0" smtClean="0"/>
+              <a:t> zu </a:t>
+            </a:r>
+            <a:r>
+              <a:rPr lang="de-DE" baseline="0" dirty="0" err="1" smtClean="0"/>
+              <a:t>MapReduce</a:t>
+            </a:r>
+            <a:r>
+              <a:rPr lang="de-DE" baseline="0" dirty="0" smtClean="0"/>
+              <a:t>: </a:t>
+            </a:r>
+            <a:r>
+              <a:rPr lang="de-DE" baseline="0" dirty="0" err="1" smtClean="0"/>
+              <a:t>flatMap</a:t>
+            </a:r>
+            <a:r>
+              <a:rPr lang="de-DE" baseline="0" dirty="0" smtClean="0"/>
+              <a:t> und </a:t>
+            </a:r>
+            <a:r>
+              <a:rPr lang="de-DE" baseline="0" dirty="0" err="1" smtClean="0"/>
+              <a:t>aggregateByKey</a:t>
+            </a:r>
+            <a:r>
+              <a:rPr lang="de-DE" baseline="0" dirty="0" smtClean="0"/>
+              <a:t> (nicht </a:t>
+            </a:r>
+            <a:r>
+              <a:rPr lang="de-DE" baseline="0" dirty="0" err="1" smtClean="0"/>
+              <a:t>map</a:t>
+            </a:r>
+            <a:r>
+              <a:rPr lang="de-DE" baseline="0" dirty="0" smtClean="0"/>
+              <a:t> und </a:t>
+            </a:r>
+            <a:r>
+              <a:rPr lang="de-DE" baseline="0" dirty="0" err="1" smtClean="0"/>
+              <a:t>reduce</a:t>
+            </a:r>
+            <a:r>
+              <a:rPr lang="de-DE" baseline="0" dirty="0" smtClean="0"/>
+              <a:t> wie man denken könnte)</a:t>
+            </a:r>
+            <a:endParaRPr lang="de-DE" dirty="0"/>
+          </a:p>
+        </p:txBody>
+      </p:sp>
+      <p:sp>
+        <p:nvSpPr>
+          <p:cNvPr id="4" name="Foliennummernplatzhalter 3"/>
+          <p:cNvSpPr>
+            <a:spLocks noGrp="1"/>
+          </p:cNvSpPr>
+          <p:nvPr>
+            <p:ph type="sldNum" sz="quarter" idx="10"/>
+          </p:nvPr>
+        </p:nvSpPr>
+        <p:spPr/>
+        <p:txBody>
+          <a:bodyPr/>
+          <a:lstStyle/>
+          <a:p>
+            <a:pPr>
+              <a:defRPr/>
+            </a:pPr>
+            <a:fld id="{A78FF2BC-F68A-4EB6-9E3E-3C5BE7030B7B}" type="slidenum">
+              <a:rPr lang="de-DE" smtClean="0"/>
+              <a:pPr>
+                <a:defRPr/>
+              </a:pPr>
+              <a:t>7</a:t>
+            </a:fld>
+            <a:endParaRPr lang="de-DE"/>
+          </a:p>
+        </p:txBody>
+      </p:sp>
+    </p:spTree>
+    <p:extLst>
+      <p:ext uri="{BB962C8B-B14F-4D97-AF65-F5344CB8AC3E}">
+        <p14:creationId xmlns:p14="http://schemas.microsoft.com/office/powerpoint/2010/main" val="781255643"/>
       </p:ext>
     </p:extLst>
   </p:cSld>
@@ -3259,10 +3510,17 @@
   <p:clrMapOvr>
     <a:masterClrMapping/>
   </p:clrMapOvr>
+  <p:timing>
+    <p:tnLst>
+      <p:par>
+        <p:cTn id="1" dur="indefinite" restart="never" nodeType="tmRoot"/>
+      </p:par>
+    </p:tnLst>
+  </p:timing>
 </p:sld>
 </file>
 
-<file path=ppt/slides/slide2.xml><?xml version="1.0" encoding="utf-8"?>
+<file path=ppt/slides/slide10.xml><?xml version="1.0" encoding="utf-8"?>
 <p:sld xmlns:a="http://schemas.openxmlformats.org/drawingml/2006/main" xmlns:r="http://schemas.openxmlformats.org/officeDocument/2006/relationships" xmlns:p="http://schemas.openxmlformats.org/presentationml/2006/main">
   <p:cSld>
     <p:spTree>
@@ -3295,528 +3553,7 @@
           <a:lstStyle/>
           <a:p>
             <a:r>
-              <a:rPr lang="de-DE" dirty="0" smtClean="0"/>
-              <a:t>Problemstellung: Wie erstelle ich Programme, die ich bei steigenden Eingabedatenmengen mit mehr Hardware genauso schnell abarbeiten kann?</a:t>
-            </a:r>
-            <a:endParaRPr lang="de-DE" dirty="0"/>
-          </a:p>
-        </p:txBody>
-      </p:sp>
-      <p:sp>
-        <p:nvSpPr>
-          <p:cNvPr id="2" name="Inhaltsplatzhalter 1"/>
-          <p:cNvSpPr>
-            <a:spLocks noGrp="1"/>
-          </p:cNvSpPr>
-          <p:nvPr>
-            <p:ph sz="half" idx="1"/>
-          </p:nvPr>
-        </p:nvSpPr>
-        <p:spPr/>
-        <p:txBody>
-          <a:bodyPr/>
-          <a:lstStyle/>
-          <a:p>
-            <a:r>
-              <a:rPr lang="de-DE" dirty="0" smtClean="0"/>
-              <a:t>Kommt auf die Programme an – im einfachen Fall benötigt das Programm nie eine globale Sicht auf alle Daten, dann kann ich die Daten und das Programm einfach auf die zur Verfügung stehenden Rechner („Knoten“) verteilen</a:t>
-            </a:r>
-          </a:p>
-          <a:p>
-            <a:pPr marL="0" indent="0">
-              <a:buNone/>
-            </a:pPr>
-            <a:r>
-              <a:rPr lang="de-DE" b="1" dirty="0" smtClean="0">
-                <a:sym typeface="Wingdings" panose="05000000000000000000" pitchFamily="2" charset="2"/>
-              </a:rPr>
-              <a:t>Beispiele</a:t>
-            </a:r>
-          </a:p>
-          <a:p>
-            <a:pPr marL="342900" indent="-342900">
-              <a:buFont typeface="+mj-lt"/>
-              <a:buAutoNum type="arabicPeriod"/>
-            </a:pPr>
-            <a:r>
-              <a:rPr lang="de-DE" dirty="0" smtClean="0">
-                <a:sym typeface="Wingdings" panose="05000000000000000000" pitchFamily="2" charset="2"/>
-              </a:rPr>
-              <a:t>Erstelle mir eine Zusammenfassung für jeden Wikipedia-Artikel</a:t>
-            </a:r>
-          </a:p>
-          <a:p>
-            <a:pPr marL="701550" lvl="1" indent="-342900"/>
-            <a:r>
-              <a:rPr lang="de-DE" dirty="0" smtClean="0">
-                <a:sym typeface="Wingdings" panose="05000000000000000000" pitchFamily="2" charset="2"/>
-              </a:rPr>
-              <a:t>Eingabe: Alle Wikipedia-Artikel (beständig wachsend + veränderlich)</a:t>
-            </a:r>
-          </a:p>
-          <a:p>
-            <a:pPr marL="701550" lvl="1" indent="-342900"/>
-            <a:r>
-              <a:rPr lang="de-DE" dirty="0" smtClean="0">
-                <a:sym typeface="Wingdings" panose="05000000000000000000" pitchFamily="2" charset="2"/>
-              </a:rPr>
-              <a:t>Ausgabe: Artikel-ID  Zusammenfassung</a:t>
-            </a:r>
-          </a:p>
-          <a:p>
-            <a:pPr marL="342900" indent="-342900">
-              <a:buFont typeface="+mj-lt"/>
-              <a:buAutoNum type="arabicPeriod"/>
-            </a:pPr>
-            <a:r>
-              <a:rPr lang="de-DE" dirty="0" smtClean="0"/>
-              <a:t>Berechne mir die relevantesten Artikel je nach Term</a:t>
-            </a:r>
-          </a:p>
-          <a:p>
-            <a:pPr marL="701550" lvl="1" indent="-342900"/>
-            <a:r>
-              <a:rPr lang="de-DE" dirty="0" smtClean="0"/>
-              <a:t>Eingabe: Alle Wikipedia-Artikel</a:t>
-            </a:r>
-          </a:p>
-          <a:p>
-            <a:pPr marL="701550" lvl="1" indent="-342900"/>
-            <a:r>
-              <a:rPr lang="de-DE" dirty="0" smtClean="0"/>
-              <a:t>Ausgabe: Term </a:t>
-            </a:r>
-            <a:r>
-              <a:rPr lang="de-DE" dirty="0" smtClean="0">
-                <a:sym typeface="Wingdings" panose="05000000000000000000" pitchFamily="2" charset="2"/>
-              </a:rPr>
-              <a:t> relevanteste Artikel</a:t>
-            </a:r>
-            <a:endParaRPr lang="de-DE" dirty="0" smtClean="0"/>
-          </a:p>
-        </p:txBody>
-      </p:sp>
-      <p:sp>
-        <p:nvSpPr>
-          <p:cNvPr id="4" name="Inhaltsplatzhalter 3"/>
-          <p:cNvSpPr>
-            <a:spLocks noGrp="1"/>
-          </p:cNvSpPr>
-          <p:nvPr>
-            <p:ph sz="half" idx="2"/>
-          </p:nvPr>
-        </p:nvSpPr>
-        <p:spPr/>
-        <p:txBody>
-          <a:bodyPr/>
-          <a:lstStyle/>
-          <a:p>
-            <a:r>
-              <a:rPr lang="de-DE" dirty="0"/>
-              <a:t>Dazu: (Teilweise) Funktionale Formalisierung des Programms mithilfe von Funktionen höherer </a:t>
-            </a:r>
-            <a:r>
-              <a:rPr lang="de-DE" dirty="0" smtClean="0"/>
-              <a:t>Ordnung</a:t>
-            </a:r>
-          </a:p>
-          <a:p>
-            <a:pPr marL="0" indent="0">
-              <a:buNone/>
-            </a:pPr>
-            <a:endParaRPr lang="de-DE" dirty="0" smtClean="0"/>
-          </a:p>
-          <a:p>
-            <a:pPr marL="0" indent="0">
-              <a:buNone/>
-            </a:pPr>
-            <a:r>
-              <a:rPr lang="de-DE" dirty="0" err="1" smtClean="0"/>
-              <a:t>map</a:t>
-            </a:r>
-            <a:r>
-              <a:rPr lang="de-DE" dirty="0" smtClean="0"/>
-              <a:t> </a:t>
-            </a:r>
-            <a:r>
-              <a:rPr lang="de-DE" dirty="0"/>
-              <a:t>:: (a -&gt; b) -&gt; [a] -&gt; [b]  </a:t>
-            </a:r>
-          </a:p>
-          <a:p>
-            <a:pPr marL="0" indent="0">
-              <a:buNone/>
-            </a:pPr>
-            <a:r>
-              <a:rPr lang="de-DE" dirty="0" err="1" smtClean="0"/>
-              <a:t>map</a:t>
-            </a:r>
-            <a:r>
-              <a:rPr lang="de-DE" dirty="0" smtClean="0"/>
-              <a:t> </a:t>
-            </a:r>
-            <a:r>
-              <a:rPr lang="de-DE" dirty="0"/>
-              <a:t>_ [] = []  </a:t>
-            </a:r>
-            <a:endParaRPr lang="de-DE" dirty="0" smtClean="0"/>
-          </a:p>
-          <a:p>
-            <a:pPr marL="0" indent="0">
-              <a:buNone/>
-            </a:pPr>
-            <a:r>
-              <a:rPr lang="de-DE" dirty="0" err="1" smtClean="0"/>
-              <a:t>map</a:t>
-            </a:r>
-            <a:r>
-              <a:rPr lang="de-DE" dirty="0" smtClean="0"/>
-              <a:t> </a:t>
-            </a:r>
-            <a:r>
-              <a:rPr lang="de-DE" dirty="0"/>
-              <a:t>f (</a:t>
-            </a:r>
-            <a:r>
-              <a:rPr lang="de-DE" dirty="0" err="1"/>
-              <a:t>x:xs</a:t>
-            </a:r>
-            <a:r>
-              <a:rPr lang="de-DE" dirty="0"/>
-              <a:t>) = f x : </a:t>
-            </a:r>
-            <a:r>
-              <a:rPr lang="de-DE" dirty="0" err="1"/>
-              <a:t>map</a:t>
-            </a:r>
-            <a:r>
-              <a:rPr lang="de-DE" dirty="0"/>
-              <a:t> f </a:t>
-            </a:r>
-            <a:r>
-              <a:rPr lang="de-DE" dirty="0" err="1"/>
-              <a:t>xs</a:t>
-            </a:r>
-            <a:r>
-              <a:rPr lang="de-DE" dirty="0"/>
-              <a:t> </a:t>
-            </a:r>
-            <a:endParaRPr lang="de-DE" dirty="0" smtClean="0"/>
-          </a:p>
-          <a:p>
-            <a:pPr marL="0" indent="0">
-              <a:buNone/>
-            </a:pPr>
-            <a:endParaRPr lang="de-DE" dirty="0"/>
-          </a:p>
-          <a:p>
-            <a:pPr marL="0" indent="0">
-              <a:buNone/>
-            </a:pPr>
-            <a:r>
               <a:rPr lang="en-US" dirty="0"/>
-              <a:t>map(\x -&gt; (take 2 x))["foo","bar","</a:t>
-            </a:r>
-            <a:r>
-              <a:rPr lang="en-US" dirty="0" err="1"/>
-              <a:t>baz</a:t>
-            </a:r>
-            <a:r>
-              <a:rPr lang="en-US" dirty="0"/>
-              <a:t>"]</a:t>
-            </a:r>
-          </a:p>
-          <a:p>
-            <a:pPr marL="0" indent="0">
-              <a:buNone/>
-            </a:pPr>
-            <a:r>
-              <a:rPr lang="en-US" dirty="0"/>
-              <a:t>["</a:t>
-            </a:r>
-            <a:r>
-              <a:rPr lang="en-US" dirty="0" err="1"/>
-              <a:t>fo</a:t>
-            </a:r>
-            <a:r>
-              <a:rPr lang="en-US" dirty="0"/>
-              <a:t>","</a:t>
-            </a:r>
-            <a:r>
-              <a:rPr lang="en-US" dirty="0" err="1"/>
-              <a:t>ba</a:t>
-            </a:r>
-            <a:r>
-              <a:rPr lang="en-US" dirty="0"/>
-              <a:t>","</a:t>
-            </a:r>
-            <a:r>
-              <a:rPr lang="en-US" dirty="0" err="1"/>
-              <a:t>ba</a:t>
-            </a:r>
-            <a:r>
-              <a:rPr lang="en-US" dirty="0" smtClean="0"/>
-              <a:t>"]</a:t>
-            </a:r>
-            <a:endParaRPr lang="en-US" dirty="0"/>
-          </a:p>
-        </p:txBody>
-      </p:sp>
-    </p:spTree>
-    <p:extLst>
-      <p:ext uri="{BB962C8B-B14F-4D97-AF65-F5344CB8AC3E}">
-        <p14:creationId xmlns:p14="http://schemas.microsoft.com/office/powerpoint/2010/main" val="3513972585"/>
-      </p:ext>
-    </p:extLst>
-  </p:cSld>
-  <p:clrMapOvr>
-    <a:masterClrMapping/>
-  </p:clrMapOvr>
-</p:sld>
-</file>
-
-<file path=ppt/slides/slide3.xml><?xml version="1.0" encoding="utf-8"?>
-<p:sld xmlns:a="http://schemas.openxmlformats.org/drawingml/2006/main" xmlns:r="http://schemas.openxmlformats.org/officeDocument/2006/relationships" xmlns:p="http://schemas.openxmlformats.org/presentationml/2006/main">
-  <p:cSld>
-    <p:spTree>
-      <p:nvGrpSpPr>
-        <p:cNvPr id="1" name=""/>
-        <p:cNvGrpSpPr/>
-        <p:nvPr/>
-      </p:nvGrpSpPr>
-      <p:grpSpPr>
-        <a:xfrm>
-          <a:off x="0" y="0"/>
-          <a:ext cx="0" cy="0"/>
-          <a:chOff x="0" y="0"/>
-          <a:chExt cx="0" cy="0"/>
-        </a:xfrm>
-      </p:grpSpPr>
-      <p:sp>
-        <p:nvSpPr>
-          <p:cNvPr id="2" name="Inhaltsplatzhalter 1"/>
-          <p:cNvSpPr>
-            <a:spLocks noGrp="1"/>
-          </p:cNvSpPr>
-          <p:nvPr>
-            <p:ph idx="1"/>
-          </p:nvPr>
-        </p:nvSpPr>
-        <p:spPr/>
-        <p:txBody>
-          <a:bodyPr/>
-          <a:lstStyle/>
-          <a:p>
-            <a:endParaRPr lang="de-DE"/>
-          </a:p>
-        </p:txBody>
-      </p:sp>
-      <p:sp>
-        <p:nvSpPr>
-          <p:cNvPr id="3" name="Titel 2"/>
-          <p:cNvSpPr>
-            <a:spLocks noGrp="1"/>
-          </p:cNvSpPr>
-          <p:nvPr>
-            <p:ph type="title"/>
-          </p:nvPr>
-        </p:nvSpPr>
-        <p:spPr/>
-        <p:txBody>
-          <a:bodyPr/>
-          <a:lstStyle/>
-          <a:p>
-            <a:r>
-              <a:rPr lang="de-DE" dirty="0" err="1" smtClean="0"/>
-              <a:t>Hadoops</a:t>
-            </a:r>
-            <a:r>
-              <a:rPr lang="de-DE" dirty="0" smtClean="0"/>
-              <a:t> </a:t>
-            </a:r>
-            <a:r>
-              <a:rPr lang="de-DE" dirty="0" err="1" smtClean="0"/>
-              <a:t>MapReduce</a:t>
-            </a:r>
-            <a:r>
-              <a:rPr lang="de-DE" dirty="0" smtClean="0"/>
-              <a:t> kann als Vorgänger von Spark gesehen werden</a:t>
-            </a:r>
-            <a:endParaRPr lang="de-DE" dirty="0"/>
-          </a:p>
-        </p:txBody>
-      </p:sp>
-    </p:spTree>
-    <p:extLst>
-      <p:ext uri="{BB962C8B-B14F-4D97-AF65-F5344CB8AC3E}">
-        <p14:creationId xmlns:p14="http://schemas.microsoft.com/office/powerpoint/2010/main" val="2868643550"/>
-      </p:ext>
-    </p:extLst>
-  </p:cSld>
-  <p:clrMapOvr>
-    <a:masterClrMapping/>
-  </p:clrMapOvr>
-</p:sld>
-</file>
-
-<file path=ppt/slides/slide4.xml><?xml version="1.0" encoding="utf-8"?>
-<p:sld xmlns:a="http://schemas.openxmlformats.org/drawingml/2006/main" xmlns:r="http://schemas.openxmlformats.org/officeDocument/2006/relationships" xmlns:p="http://schemas.openxmlformats.org/presentationml/2006/main">
-  <p:cSld>
-    <p:spTree>
-      <p:nvGrpSpPr>
-        <p:cNvPr id="1" name=""/>
-        <p:cNvGrpSpPr/>
-        <p:nvPr/>
-      </p:nvGrpSpPr>
-      <p:grpSpPr>
-        <a:xfrm>
-          <a:off x="0" y="0"/>
-          <a:ext cx="0" cy="0"/>
-          <a:chOff x="0" y="0"/>
-          <a:chExt cx="0" cy="0"/>
-        </a:xfrm>
-      </p:grpSpPr>
-      <p:sp>
-        <p:nvSpPr>
-          <p:cNvPr id="2" name="Inhaltsplatzhalter 1"/>
-          <p:cNvSpPr>
-            <a:spLocks noGrp="1"/>
-          </p:cNvSpPr>
-          <p:nvPr>
-            <p:ph idx="1"/>
-          </p:nvPr>
-        </p:nvSpPr>
-        <p:spPr/>
-        <p:txBody>
-          <a:bodyPr/>
-          <a:lstStyle/>
-          <a:p>
-            <a:r>
-              <a:rPr lang="de-DE" dirty="0" smtClean="0"/>
-              <a:t>Stabilität</a:t>
-            </a:r>
-          </a:p>
-          <a:p>
-            <a:r>
-              <a:rPr lang="de-DE" dirty="0" smtClean="0"/>
-              <a:t>Zuverlässigkeit</a:t>
-            </a:r>
-          </a:p>
-          <a:p>
-            <a:r>
-              <a:rPr lang="de-DE" dirty="0" smtClean="0"/>
-              <a:t>Reproduzierbarkeit</a:t>
-            </a:r>
-          </a:p>
-          <a:p>
-            <a:r>
-              <a:rPr lang="de-DE" dirty="0" smtClean="0"/>
-              <a:t>Audit-Fähigkeit</a:t>
-            </a:r>
-          </a:p>
-          <a:p>
-            <a:r>
-              <a:rPr lang="de-DE" dirty="0" smtClean="0"/>
-              <a:t>Professioneller Support</a:t>
-            </a:r>
-          </a:p>
-          <a:p>
-            <a:r>
-              <a:rPr lang="de-DE" dirty="0" smtClean="0"/>
-              <a:t>Einfachheit</a:t>
-            </a:r>
-          </a:p>
-          <a:p>
-            <a:r>
-              <a:rPr lang="de-DE" dirty="0" smtClean="0"/>
-              <a:t>Betreibbarkeit</a:t>
-            </a:r>
-          </a:p>
-          <a:p>
-            <a:r>
-              <a:rPr lang="de-DE" dirty="0" smtClean="0"/>
-              <a:t>Framework</a:t>
-            </a:r>
-          </a:p>
-          <a:p>
-            <a:r>
-              <a:rPr lang="de-DE" dirty="0" smtClean="0"/>
-              <a:t>Modularisierung</a:t>
-            </a:r>
-            <a:endParaRPr lang="en-US" dirty="0"/>
-          </a:p>
-        </p:txBody>
-      </p:sp>
-      <p:sp>
-        <p:nvSpPr>
-          <p:cNvPr id="3" name="Titel 2"/>
-          <p:cNvSpPr>
-            <a:spLocks noGrp="1"/>
-          </p:cNvSpPr>
-          <p:nvPr>
-            <p:ph type="title"/>
-          </p:nvPr>
-        </p:nvSpPr>
-        <p:spPr/>
-        <p:txBody>
-          <a:bodyPr/>
-          <a:lstStyle/>
-          <a:p>
-            <a:r>
-              <a:rPr lang="de-DE" dirty="0" smtClean="0"/>
-              <a:t>Enterprise – Was heißt das eigentlich?</a:t>
-            </a:r>
-            <a:endParaRPr lang="en-US" dirty="0"/>
-          </a:p>
-        </p:txBody>
-      </p:sp>
-    </p:spTree>
-    <p:extLst>
-      <p:ext uri="{BB962C8B-B14F-4D97-AF65-F5344CB8AC3E}">
-        <p14:creationId xmlns:p14="http://schemas.microsoft.com/office/powerpoint/2010/main" val="1636183931"/>
-      </p:ext>
-    </p:extLst>
-  </p:cSld>
-  <p:clrMapOvr>
-    <a:masterClrMapping/>
-  </p:clrMapOvr>
-</p:sld>
-</file>
-
-<file path=ppt/slides/slide5.xml><?xml version="1.0" encoding="utf-8"?>
-<p:sld xmlns:a="http://schemas.openxmlformats.org/drawingml/2006/main" xmlns:r="http://schemas.openxmlformats.org/officeDocument/2006/relationships" xmlns:p="http://schemas.openxmlformats.org/presentationml/2006/main">
-  <p:cSld>
-    <p:spTree>
-      <p:nvGrpSpPr>
-        <p:cNvPr id="1" name=""/>
-        <p:cNvGrpSpPr/>
-        <p:nvPr/>
-      </p:nvGrpSpPr>
-      <p:grpSpPr>
-        <a:xfrm>
-          <a:off x="0" y="0"/>
-          <a:ext cx="0" cy="0"/>
-          <a:chOff x="0" y="0"/>
-          <a:chExt cx="0" cy="0"/>
-        </a:xfrm>
-      </p:grpSpPr>
-      <p:sp>
-        <p:nvSpPr>
-          <p:cNvPr id="3" name="Titel 2"/>
-          <p:cNvSpPr>
-            <a:spLocks noGrp="1"/>
-          </p:cNvSpPr>
-          <p:nvPr>
-            <p:ph type="title"/>
-          </p:nvPr>
-        </p:nvSpPr>
-        <p:spPr/>
-        <p:txBody>
-          <a:bodyPr/>
-          <a:lstStyle/>
-          <a:p>
-            <a:r>
-              <a:rPr lang="en-US"/>
               <a:t>Summary</a:t>
             </a:r>
           </a:p>
@@ -3879,14 +3616,14 @@
                 <a:gridCol w="1145504">
                   <a:extLst>
                     <a:ext uri="{9D8B030D-6E8A-4147-A177-3AD203B41FA5}">
-                      <a16:colId xmlns="" xmlns:a16="http://schemas.microsoft.com/office/drawing/2014/main" val="20000"/>
+                      <a16:colId xmlns:a16="http://schemas.microsoft.com/office/drawing/2014/main" xmlns="" val="20000"/>
                     </a:ext>
                   </a:extLst>
                 </a:gridCol>
                 <a:gridCol w="3842658">
                   <a:extLst>
                     <a:ext uri="{9D8B030D-6E8A-4147-A177-3AD203B41FA5}">
-                      <a16:colId xmlns="" xmlns:a16="http://schemas.microsoft.com/office/drawing/2014/main" val="20001"/>
+                      <a16:colId xmlns:a16="http://schemas.microsoft.com/office/drawing/2014/main" xmlns="" val="20001"/>
                     </a:ext>
                   </a:extLst>
                 </a:gridCol>
@@ -3949,7 +3686,7 @@
                 </a:tc>
                 <a:extLst>
                   <a:ext uri="{0D108BD9-81ED-4DB2-BD59-A6C34878D82A}">
-                    <a16:rowId xmlns="" xmlns:a16="http://schemas.microsoft.com/office/drawing/2014/main" val="10002"/>
+                    <a16:rowId xmlns:a16="http://schemas.microsoft.com/office/drawing/2014/main" xmlns="" val="10002"/>
                   </a:ext>
                 </a:extLst>
               </a:tr>
@@ -4001,10 +3738,17 @@
   <p:clrMapOvr>
     <a:masterClrMapping/>
   </p:clrMapOvr>
+  <p:timing>
+    <p:tnLst>
+      <p:par>
+        <p:cTn id="1" dur="indefinite" restart="never" nodeType="tmRoot"/>
+      </p:par>
+    </p:tnLst>
+  </p:timing>
 </p:sld>
 </file>
 
-<file path=ppt/slides/slide6.xml><?xml version="1.0" encoding="utf-8"?>
+<file path=ppt/slides/slide11.xml><?xml version="1.0" encoding="utf-8"?>
 <p:sld xmlns:a="http://schemas.openxmlformats.org/drawingml/2006/main" xmlns:r="http://schemas.openxmlformats.org/officeDocument/2006/relationships" xmlns:p="http://schemas.openxmlformats.org/presentationml/2006/main">
   <p:cSld>
     <p:spTree>
@@ -4044,6 +3788,73 @@
           <a:bodyPr/>
           <a:lstStyle/>
           <a:p>
+            <a:r>
+              <a:rPr lang="en-US" dirty="0">
+                <a:hlinkClick r:id="rId2"/>
+              </a:rPr>
+              <a:t>https://</a:t>
+            </a:r>
+            <a:r>
+              <a:rPr lang="en-US" dirty="0" smtClean="0">
+                <a:hlinkClick r:id="rId2"/>
+              </a:rPr>
+              <a:t>www.iconfinder.com/icons/1886978/commerce_market_open_shop_shopping_store_icon#size=256</a:t>
+            </a:r>
+            <a:endParaRPr lang="en-US" dirty="0" smtClean="0"/>
+          </a:p>
+          <a:p>
+            <a:r>
+              <a:rPr lang="en-US" dirty="0">
+                <a:hlinkClick r:id="rId3"/>
+              </a:rPr>
+              <a:t>https://</a:t>
+            </a:r>
+            <a:r>
+              <a:rPr lang="en-US" dirty="0" smtClean="0">
+                <a:hlinkClick r:id="rId3"/>
+              </a:rPr>
+              <a:t>www.iconfinder.com/icons/1872628/analysis_data_laptop_pie_tab_icon#size=128</a:t>
+            </a:r>
+            <a:r>
+              <a:rPr lang="en-US" dirty="0" smtClean="0"/>
+              <a:t> </a:t>
+            </a:r>
+          </a:p>
+          <a:p>
+            <a:r>
+              <a:rPr lang="en-US" dirty="0">
+                <a:hlinkClick r:id="rId4"/>
+              </a:rPr>
+              <a:t>https://</a:t>
+            </a:r>
+            <a:r>
+              <a:rPr lang="en-US" dirty="0" smtClean="0">
+                <a:hlinkClick r:id="rId4"/>
+              </a:rPr>
+              <a:t>www.iconfinder.com/icons/1872631/communication_email_envelope_letter_mail_message_send_icon#size=128</a:t>
+            </a:r>
+            <a:r>
+              <a:rPr lang="en-US" dirty="0" smtClean="0"/>
+              <a:t> </a:t>
+            </a:r>
+          </a:p>
+          <a:p>
+            <a:r>
+              <a:rPr lang="en-US" dirty="0">
+                <a:hlinkClick r:id="rId5"/>
+              </a:rPr>
+              <a:t>https://</a:t>
+            </a:r>
+            <a:r>
+              <a:rPr lang="en-US" dirty="0" smtClean="0">
+                <a:hlinkClick r:id="rId5"/>
+              </a:rPr>
+              <a:t>www.iconfinder.com/icons/63466/cloud_computing_data_center_datacenter_hosting_server_servers_icon#size=128</a:t>
+            </a:r>
+            <a:r>
+              <a:rPr lang="en-US" dirty="0" smtClean="0"/>
+              <a:t> </a:t>
+            </a:r>
             <a:endParaRPr lang="en-US" dirty="0"/>
           </a:p>
         </p:txBody>
@@ -4081,10 +3892,17 @@
   <p:clrMapOvr>
     <a:masterClrMapping/>
   </p:clrMapOvr>
+  <p:timing>
+    <p:tnLst>
+      <p:par>
+        <p:cTn id="1" dur="indefinite" restart="never" nodeType="tmRoot"/>
+      </p:par>
+    </p:tnLst>
+  </p:timing>
 </p:sld>
 </file>
 
-<file path=ppt/slides/slide7.xml><?xml version="1.0" encoding="utf-8"?>
+<file path=ppt/slides/slide12.xml><?xml version="1.0" encoding="utf-8"?>
 <p:sld xmlns:a="http://schemas.openxmlformats.org/drawingml/2006/main" xmlns:r="http://schemas.openxmlformats.org/officeDocument/2006/relationships" xmlns:p="http://schemas.openxmlformats.org/presentationml/2006/main">
   <p:cSld>
     <p:spTree>
@@ -5303,10 +5121,17 @@
   <p:clrMapOvr>
     <a:masterClrMapping/>
   </p:clrMapOvr>
+  <p:timing>
+    <p:tnLst>
+      <p:par>
+        <p:cTn id="1" dur="indefinite" restart="never" nodeType="tmRoot"/>
+      </p:par>
+    </p:tnLst>
+  </p:timing>
 </p:sld>
 </file>
 
-<file path=ppt/slides/slide8.xml><?xml version="1.0" encoding="utf-8"?>
+<file path=ppt/slides/slide13.xml><?xml version="1.0" encoding="utf-8"?>
 <p:sld xmlns:a="http://schemas.openxmlformats.org/drawingml/2006/main" xmlns:r="http://schemas.openxmlformats.org/officeDocument/2006/relationships" xmlns:p="http://schemas.openxmlformats.org/presentationml/2006/main">
   <p:cSld>
     <p:spTree>
@@ -5350,6 +5175,3407 @@
   <p:clrMapOvr>
     <a:masterClrMapping/>
   </p:clrMapOvr>
+  <p:timing>
+    <p:tnLst>
+      <p:par>
+        <p:cTn id="1" dur="indefinite" restart="never" nodeType="tmRoot"/>
+      </p:par>
+    </p:tnLst>
+  </p:timing>
+</p:sld>
+</file>
+
+<file path=ppt/slides/slide2.xml><?xml version="1.0" encoding="utf-8"?>
+<p:sld xmlns:a="http://schemas.openxmlformats.org/drawingml/2006/main" xmlns:r="http://schemas.openxmlformats.org/officeDocument/2006/relationships" xmlns:p="http://schemas.openxmlformats.org/presentationml/2006/main">
+  <p:cSld>
+    <p:spTree>
+      <p:nvGrpSpPr>
+        <p:cNvPr id="1" name=""/>
+        <p:cNvGrpSpPr/>
+        <p:nvPr/>
+      </p:nvGrpSpPr>
+      <p:grpSpPr>
+        <a:xfrm>
+          <a:off x="0" y="0"/>
+          <a:ext cx="0" cy="0"/>
+          <a:chOff x="0" y="0"/>
+          <a:chExt cx="0" cy="0"/>
+        </a:xfrm>
+      </p:grpSpPr>
+      <p:sp>
+        <p:nvSpPr>
+          <p:cNvPr id="2" name="Inhaltsplatzhalter 1"/>
+          <p:cNvSpPr>
+            <a:spLocks noGrp="1"/>
+          </p:cNvSpPr>
+          <p:nvPr>
+            <p:ph idx="1"/>
+          </p:nvPr>
+        </p:nvSpPr>
+        <p:spPr/>
+        <p:txBody>
+          <a:bodyPr/>
+          <a:lstStyle/>
+          <a:p>
+            <a:endParaRPr lang="de-DE"/>
+          </a:p>
+        </p:txBody>
+      </p:sp>
+      <p:sp>
+        <p:nvSpPr>
+          <p:cNvPr id="3" name="Titel 2"/>
+          <p:cNvSpPr>
+            <a:spLocks noGrp="1"/>
+          </p:cNvSpPr>
+          <p:nvPr>
+            <p:ph type="title"/>
+          </p:nvPr>
+        </p:nvSpPr>
+        <p:spPr/>
+        <p:txBody>
+          <a:bodyPr/>
+          <a:lstStyle/>
+          <a:p>
+            <a:r>
+              <a:rPr lang="de-DE" dirty="0" smtClean="0"/>
+              <a:t>TODO: Folie zu </a:t>
+            </a:r>
+            <a:r>
+              <a:rPr lang="de-DE" dirty="0" err="1" smtClean="0"/>
+              <a:t>mgm</a:t>
+            </a:r>
+            <a:endParaRPr lang="de-DE" dirty="0"/>
+          </a:p>
+        </p:txBody>
+      </p:sp>
+    </p:spTree>
+    <p:extLst>
+      <p:ext uri="{BB962C8B-B14F-4D97-AF65-F5344CB8AC3E}">
+        <p14:creationId xmlns:p14="http://schemas.microsoft.com/office/powerpoint/2010/main" val="2382039990"/>
+      </p:ext>
+    </p:extLst>
+  </p:cSld>
+  <p:clrMapOvr>
+    <a:masterClrMapping/>
+  </p:clrMapOvr>
+  <p:timing>
+    <p:tnLst>
+      <p:par>
+        <p:cTn id="1" dur="indefinite" restart="never" nodeType="tmRoot"/>
+      </p:par>
+    </p:tnLst>
+  </p:timing>
+</p:sld>
+</file>
+
+<file path=ppt/slides/slide3.xml><?xml version="1.0" encoding="utf-8"?>
+<p:sld xmlns:a="http://schemas.openxmlformats.org/drawingml/2006/main" xmlns:r="http://schemas.openxmlformats.org/officeDocument/2006/relationships" xmlns:p="http://schemas.openxmlformats.org/presentationml/2006/main">
+  <p:cSld>
+    <p:spTree>
+      <p:nvGrpSpPr>
+        <p:cNvPr id="1" name=""/>
+        <p:cNvGrpSpPr/>
+        <p:nvPr/>
+      </p:nvGrpSpPr>
+      <p:grpSpPr>
+        <a:xfrm>
+          <a:off x="0" y="0"/>
+          <a:ext cx="0" cy="0"/>
+          <a:chOff x="0" y="0"/>
+          <a:chExt cx="0" cy="0"/>
+        </a:xfrm>
+      </p:grpSpPr>
+      <p:sp>
+        <p:nvSpPr>
+          <p:cNvPr id="3" name="Titel 2"/>
+          <p:cNvSpPr>
+            <a:spLocks noGrp="1"/>
+          </p:cNvSpPr>
+          <p:nvPr>
+            <p:ph type="title"/>
+          </p:nvPr>
+        </p:nvSpPr>
+        <p:spPr/>
+        <p:txBody>
+          <a:bodyPr/>
+          <a:lstStyle/>
+          <a:p>
+            <a:r>
+              <a:rPr lang="de-DE" dirty="0" smtClean="0"/>
+              <a:t>Problemstellung: Wie erstelle ich Programme, die </a:t>
+            </a:r>
+            <a:r>
+              <a:rPr lang="de-DE" dirty="0" smtClean="0"/>
+              <a:t>steigende Eingabedatenmengen </a:t>
+            </a:r>
+            <a:r>
+              <a:rPr lang="de-DE" dirty="0" smtClean="0"/>
+              <a:t>mit mehr Hardware genauso schnell </a:t>
+            </a:r>
+            <a:r>
+              <a:rPr lang="de-DE" dirty="0" smtClean="0"/>
+              <a:t>verarbeiten?</a:t>
+            </a:r>
+            <a:endParaRPr lang="de-DE" dirty="0"/>
+          </a:p>
+        </p:txBody>
+      </p:sp>
+      <p:sp>
+        <p:nvSpPr>
+          <p:cNvPr id="2" name="Inhaltsplatzhalter 1"/>
+          <p:cNvSpPr>
+            <a:spLocks noGrp="1"/>
+          </p:cNvSpPr>
+          <p:nvPr>
+            <p:ph sz="half" idx="1"/>
+          </p:nvPr>
+        </p:nvSpPr>
+        <p:spPr/>
+        <p:txBody>
+          <a:bodyPr/>
+          <a:lstStyle/>
+          <a:p>
+            <a:r>
+              <a:rPr lang="de-DE" dirty="0" smtClean="0"/>
+              <a:t>Kommt auf die Programme an – im einfachen Fall benötigt das Programm nie eine globale Sicht auf alle Daten, dann kann </a:t>
+            </a:r>
+            <a:r>
+              <a:rPr lang="de-DE" dirty="0" smtClean="0"/>
+              <a:t>man die </a:t>
+            </a:r>
+            <a:r>
+              <a:rPr lang="de-DE" dirty="0" smtClean="0"/>
+              <a:t>Daten und das Programm einfach auf die zur Verfügung stehenden Rechner („Knoten“) verteilen</a:t>
+            </a:r>
+          </a:p>
+          <a:p>
+            <a:r>
+              <a:rPr lang="de-DE" dirty="0"/>
+              <a:t>Hilfsmittel: (Teilweise) Funktionale Formalisierung des Programms mithilfe von Funktionen höherer </a:t>
+            </a:r>
+            <a:r>
+              <a:rPr lang="de-DE" dirty="0" smtClean="0"/>
+              <a:t>Ordnung</a:t>
+            </a:r>
+          </a:p>
+          <a:p>
+            <a:endParaRPr lang="de-DE" dirty="0"/>
+          </a:p>
+          <a:p>
+            <a:pPr marL="358650" lvl="1" indent="0">
+              <a:buNone/>
+            </a:pPr>
+            <a:r>
+              <a:rPr lang="de-DE" dirty="0" err="1"/>
+              <a:t>map</a:t>
+            </a:r>
+            <a:r>
+              <a:rPr lang="de-DE" dirty="0"/>
+              <a:t> :: (a -&gt; b) -&gt; [a] -&gt; [b]  </a:t>
+            </a:r>
+          </a:p>
+          <a:p>
+            <a:pPr marL="358650" lvl="1" indent="0">
+              <a:buNone/>
+            </a:pPr>
+            <a:r>
+              <a:rPr lang="de-DE" dirty="0" err="1"/>
+              <a:t>map</a:t>
+            </a:r>
+            <a:r>
+              <a:rPr lang="de-DE" dirty="0"/>
+              <a:t> _ [] = []  </a:t>
+            </a:r>
+          </a:p>
+          <a:p>
+            <a:pPr marL="358650" lvl="1" indent="0">
+              <a:buNone/>
+            </a:pPr>
+            <a:r>
+              <a:rPr lang="de-DE" dirty="0" err="1"/>
+              <a:t>map</a:t>
+            </a:r>
+            <a:r>
+              <a:rPr lang="de-DE" dirty="0"/>
+              <a:t> f (</a:t>
+            </a:r>
+            <a:r>
+              <a:rPr lang="de-DE" dirty="0" err="1"/>
+              <a:t>x:xs</a:t>
+            </a:r>
+            <a:r>
+              <a:rPr lang="de-DE" dirty="0"/>
+              <a:t>) = f x : </a:t>
+            </a:r>
+            <a:r>
+              <a:rPr lang="de-DE" dirty="0" err="1"/>
+              <a:t>map</a:t>
+            </a:r>
+            <a:r>
+              <a:rPr lang="de-DE" dirty="0"/>
+              <a:t> f </a:t>
+            </a:r>
+            <a:r>
+              <a:rPr lang="de-DE" dirty="0" err="1"/>
+              <a:t>xs</a:t>
+            </a:r>
+            <a:r>
+              <a:rPr lang="de-DE" dirty="0"/>
+              <a:t> </a:t>
+            </a:r>
+            <a:endParaRPr lang="de-DE" dirty="0" smtClean="0"/>
+          </a:p>
+          <a:p>
+            <a:pPr marL="358650" lvl="1" indent="0">
+              <a:buNone/>
+            </a:pPr>
+            <a:endParaRPr lang="de-DE" dirty="0"/>
+          </a:p>
+          <a:p>
+            <a:pPr marL="358650" lvl="1" indent="0">
+              <a:buNone/>
+            </a:pPr>
+            <a:r>
+              <a:rPr lang="en-US" dirty="0"/>
+              <a:t>map(\x -&gt; (take 2 x))["foo","bar","</a:t>
+            </a:r>
+            <a:r>
+              <a:rPr lang="en-US" dirty="0" err="1"/>
+              <a:t>baz</a:t>
+            </a:r>
+            <a:r>
+              <a:rPr lang="en-US" dirty="0"/>
+              <a:t>"]</a:t>
+            </a:r>
+          </a:p>
+          <a:p>
+            <a:pPr marL="358650" lvl="1" indent="0">
+              <a:buNone/>
+            </a:pPr>
+            <a:r>
+              <a:rPr lang="en-US" dirty="0"/>
+              <a:t>["</a:t>
+            </a:r>
+            <a:r>
+              <a:rPr lang="en-US" dirty="0" err="1"/>
+              <a:t>fo</a:t>
+            </a:r>
+            <a:r>
+              <a:rPr lang="en-US" dirty="0"/>
+              <a:t>","</a:t>
+            </a:r>
+            <a:r>
+              <a:rPr lang="en-US" dirty="0" err="1"/>
+              <a:t>ba</a:t>
+            </a:r>
+            <a:r>
+              <a:rPr lang="en-US" dirty="0"/>
+              <a:t>","</a:t>
+            </a:r>
+            <a:r>
+              <a:rPr lang="en-US" dirty="0" err="1"/>
+              <a:t>ba</a:t>
+            </a:r>
+            <a:r>
+              <a:rPr lang="en-US" dirty="0" smtClean="0"/>
+              <a:t>"]</a:t>
+            </a:r>
+            <a:endParaRPr lang="en-US" dirty="0"/>
+          </a:p>
+        </p:txBody>
+      </p:sp>
+      <p:sp>
+        <p:nvSpPr>
+          <p:cNvPr id="4" name="Inhaltsplatzhalter 3"/>
+          <p:cNvSpPr>
+            <a:spLocks noGrp="1"/>
+          </p:cNvSpPr>
+          <p:nvPr>
+            <p:ph sz="half" idx="2"/>
+          </p:nvPr>
+        </p:nvSpPr>
+        <p:spPr/>
+        <p:txBody>
+          <a:bodyPr/>
+          <a:lstStyle/>
+          <a:p>
+            <a:pPr marL="0" indent="0">
+              <a:buNone/>
+            </a:pPr>
+            <a:r>
+              <a:rPr lang="de-DE" b="1" dirty="0">
+                <a:sym typeface="Wingdings" panose="05000000000000000000" pitchFamily="2" charset="2"/>
+              </a:rPr>
+              <a:t>Beispiele</a:t>
+            </a:r>
+          </a:p>
+          <a:p>
+            <a:pPr marL="342900" indent="-342900">
+              <a:buFont typeface="+mj-lt"/>
+              <a:buAutoNum type="arabicPeriod"/>
+            </a:pPr>
+            <a:r>
+              <a:rPr lang="de-DE" dirty="0">
+                <a:sym typeface="Wingdings" panose="05000000000000000000" pitchFamily="2" charset="2"/>
+              </a:rPr>
+              <a:t>Erstelle mir eine Zusammenfassung für jeden Wikipedia-Artikel</a:t>
+            </a:r>
+          </a:p>
+          <a:p>
+            <a:pPr marL="701550" lvl="1" indent="-342900"/>
+            <a:r>
+              <a:rPr lang="de-DE" dirty="0">
+                <a:sym typeface="Wingdings" panose="05000000000000000000" pitchFamily="2" charset="2"/>
+              </a:rPr>
+              <a:t>Eingabe: Alle Wikipedia-Artikel (beständig wachsend + veränderlich)</a:t>
+            </a:r>
+          </a:p>
+          <a:p>
+            <a:pPr marL="701550" lvl="1" indent="-342900"/>
+            <a:r>
+              <a:rPr lang="de-DE" dirty="0">
+                <a:sym typeface="Wingdings" panose="05000000000000000000" pitchFamily="2" charset="2"/>
+              </a:rPr>
+              <a:t>Ausgabe: Artikel-ID  Zusammenfassung</a:t>
+            </a:r>
+          </a:p>
+          <a:p>
+            <a:pPr marL="342900" indent="-342900">
+              <a:buFont typeface="+mj-lt"/>
+              <a:buAutoNum type="arabicPeriod"/>
+            </a:pPr>
+            <a:r>
+              <a:rPr lang="de-DE" dirty="0"/>
+              <a:t>Berechne mir die relevantesten Artikel je nach Term</a:t>
+            </a:r>
+          </a:p>
+          <a:p>
+            <a:pPr marL="701550" lvl="1" indent="-342900"/>
+            <a:r>
+              <a:rPr lang="de-DE" dirty="0"/>
+              <a:t>Eingabe: Alle Wikipedia-Artikel</a:t>
+            </a:r>
+          </a:p>
+          <a:p>
+            <a:pPr marL="701550" lvl="1" indent="-342900"/>
+            <a:r>
+              <a:rPr lang="de-DE" dirty="0"/>
+              <a:t>Ausgabe: Term </a:t>
+            </a:r>
+            <a:r>
+              <a:rPr lang="de-DE" dirty="0">
+                <a:sym typeface="Wingdings" panose="05000000000000000000" pitchFamily="2" charset="2"/>
+              </a:rPr>
+              <a:t> relevanteste Artikel</a:t>
+            </a:r>
+            <a:endParaRPr lang="de-DE" dirty="0"/>
+          </a:p>
+          <a:p>
+            <a:endParaRPr lang="en-US" dirty="0"/>
+          </a:p>
+        </p:txBody>
+      </p:sp>
+    </p:spTree>
+    <p:extLst>
+      <p:ext uri="{BB962C8B-B14F-4D97-AF65-F5344CB8AC3E}">
+        <p14:creationId xmlns:p14="http://schemas.microsoft.com/office/powerpoint/2010/main" val="3513972585"/>
+      </p:ext>
+    </p:extLst>
+  </p:cSld>
+  <p:clrMapOvr>
+    <a:masterClrMapping/>
+  </p:clrMapOvr>
+  <p:timing>
+    <p:tnLst>
+      <p:par>
+        <p:cTn id="1" dur="indefinite" restart="never" nodeType="tmRoot"/>
+      </p:par>
+    </p:tnLst>
+  </p:timing>
+</p:sld>
+</file>
+
+<file path=ppt/slides/slide4.xml><?xml version="1.0" encoding="utf-8"?>
+<p:sld xmlns:a="http://schemas.openxmlformats.org/drawingml/2006/main" xmlns:r="http://schemas.openxmlformats.org/officeDocument/2006/relationships" xmlns:p="http://schemas.openxmlformats.org/presentationml/2006/main">
+  <p:cSld>
+    <p:spTree>
+      <p:nvGrpSpPr>
+        <p:cNvPr id="1" name=""/>
+        <p:cNvGrpSpPr/>
+        <p:nvPr/>
+      </p:nvGrpSpPr>
+      <p:grpSpPr>
+        <a:xfrm>
+          <a:off x="0" y="0"/>
+          <a:ext cx="0" cy="0"/>
+          <a:chOff x="0" y="0"/>
+          <a:chExt cx="0" cy="0"/>
+        </a:xfrm>
+      </p:grpSpPr>
+      <p:sp>
+        <p:nvSpPr>
+          <p:cNvPr id="15" name="Rechteckiger Pfeil 14"/>
+          <p:cNvSpPr/>
+          <p:nvPr/>
+        </p:nvSpPr>
+        <p:spPr bwMode="auto">
+          <a:xfrm rot="16200000" flipV="1">
+            <a:off x="4524812" y="2821742"/>
+            <a:ext cx="643016" cy="3268980"/>
+          </a:xfrm>
+          <a:prstGeom prst="bentArrow">
+            <a:avLst>
+              <a:gd name="adj1" fmla="val 37463"/>
+              <a:gd name="adj2" fmla="val 43694"/>
+              <a:gd name="adj3" fmla="val 25000"/>
+              <a:gd name="adj4" fmla="val 43750"/>
+            </a:avLst>
+          </a:prstGeom>
+          <a:solidFill>
+            <a:schemeClr val="accent6">
+              <a:lumMod val="75000"/>
+            </a:schemeClr>
+          </a:solidFill>
+          <a:ln w="9525" cap="flat" cmpd="sng" algn="ctr">
+            <a:noFill/>
+            <a:prstDash val="solid"/>
+            <a:round/>
+            <a:headEnd type="none" w="med" len="med"/>
+            <a:tailEnd type="none" w="med" len="med"/>
+          </a:ln>
+          <a:effectLst/>
+        </p:spPr>
+        <p:txBody>
+          <a:bodyPr rot="0" spcFirstLastPara="0" vertOverflow="overflow" horzOverflow="overflow" vert="horz" wrap="square" lIns="91440" tIns="45720" rIns="91440" bIns="45720" numCol="1" spcCol="0" rtlCol="0" fromWordArt="0" anchor="ctr" anchorCtr="0" forceAA="0" compatLnSpc="1">
+            <a:prstTxWarp prst="textNoShape">
+              <a:avLst/>
+            </a:prstTxWarp>
+            <a:noAutofit/>
+          </a:bodyPr>
+          <a:lstStyle/>
+          <a:p>
+            <a:pPr marL="0" marR="0" indent="0" algn="ctr" defTabSz="914400" rtl="0" eaLnBrk="1" fontAlgn="base" latinLnBrk="0" hangingPunct="1">
+              <a:lnSpc>
+                <a:spcPct val="100000"/>
+              </a:lnSpc>
+              <a:spcBef>
+                <a:spcPct val="0"/>
+              </a:spcBef>
+              <a:spcAft>
+                <a:spcPts val="600"/>
+              </a:spcAft>
+              <a:buClrTx/>
+              <a:buSzTx/>
+              <a:buFontTx/>
+              <a:buNone/>
+              <a:tabLst/>
+            </a:pPr>
+            <a:endParaRPr kumimoji="0" lang="de-DE" sz="1200" b="0" i="0" u="none" strike="noStrike" cap="none" normalizeH="0" baseline="0" dirty="0" err="1" smtClean="0">
+              <a:ln>
+                <a:noFill/>
+              </a:ln>
+              <a:solidFill>
+                <a:schemeClr val="bg1"/>
+              </a:solidFill>
+              <a:effectLst/>
+              <a:latin typeface="Open Sans" panose="020B0606030504020204" pitchFamily="34" charset="0"/>
+              <a:ea typeface="Open Sans" panose="020B0606030504020204" pitchFamily="34" charset="0"/>
+              <a:cs typeface="Open Sans" panose="020B0606030504020204" pitchFamily="34" charset="0"/>
+            </a:endParaRPr>
+          </a:p>
+        </p:txBody>
+      </p:sp>
+      <p:sp>
+        <p:nvSpPr>
+          <p:cNvPr id="7" name="Rechteckiger Pfeil 6"/>
+          <p:cNvSpPr/>
+          <p:nvPr/>
+        </p:nvSpPr>
+        <p:spPr bwMode="auto">
+          <a:xfrm rot="5400000">
+            <a:off x="4510843" y="738946"/>
+            <a:ext cx="670954" cy="3268980"/>
+          </a:xfrm>
+          <a:prstGeom prst="bentArrow">
+            <a:avLst>
+              <a:gd name="adj1" fmla="val 37463"/>
+              <a:gd name="adj2" fmla="val 43694"/>
+              <a:gd name="adj3" fmla="val 25000"/>
+              <a:gd name="adj4" fmla="val 43750"/>
+            </a:avLst>
+          </a:prstGeom>
+          <a:solidFill>
+            <a:schemeClr val="accent6">
+              <a:lumMod val="75000"/>
+            </a:schemeClr>
+          </a:solidFill>
+          <a:ln w="9525" cap="flat" cmpd="sng" algn="ctr">
+            <a:noFill/>
+            <a:prstDash val="solid"/>
+            <a:round/>
+            <a:headEnd type="none" w="med" len="med"/>
+            <a:tailEnd type="none" w="med" len="med"/>
+          </a:ln>
+          <a:effectLst/>
+        </p:spPr>
+        <p:txBody>
+          <a:bodyPr rot="0" spcFirstLastPara="0" vertOverflow="overflow" horzOverflow="overflow" vert="horz" wrap="square" lIns="91440" tIns="45720" rIns="91440" bIns="45720" numCol="1" spcCol="0" rtlCol="0" fromWordArt="0" anchor="ctr" anchorCtr="0" forceAA="0" compatLnSpc="1">
+            <a:prstTxWarp prst="textNoShape">
+              <a:avLst/>
+            </a:prstTxWarp>
+            <a:noAutofit/>
+          </a:bodyPr>
+          <a:lstStyle/>
+          <a:p>
+            <a:pPr marL="0" marR="0" indent="0" algn="ctr" defTabSz="914400" rtl="0" eaLnBrk="1" fontAlgn="base" latinLnBrk="0" hangingPunct="1">
+              <a:lnSpc>
+                <a:spcPct val="100000"/>
+              </a:lnSpc>
+              <a:spcBef>
+                <a:spcPct val="0"/>
+              </a:spcBef>
+              <a:spcAft>
+                <a:spcPts val="600"/>
+              </a:spcAft>
+              <a:buClrTx/>
+              <a:buSzTx/>
+              <a:buFontTx/>
+              <a:buNone/>
+              <a:tabLst/>
+            </a:pPr>
+            <a:endParaRPr kumimoji="0" lang="de-DE" sz="1200" b="0" i="0" u="none" strike="noStrike" cap="none" normalizeH="0" baseline="0" dirty="0" err="1" smtClean="0">
+              <a:ln>
+                <a:noFill/>
+              </a:ln>
+              <a:solidFill>
+                <a:schemeClr val="bg1"/>
+              </a:solidFill>
+              <a:effectLst/>
+              <a:latin typeface="Open Sans" panose="020B0606030504020204" pitchFamily="34" charset="0"/>
+              <a:ea typeface="Open Sans" panose="020B0606030504020204" pitchFamily="34" charset="0"/>
+              <a:cs typeface="Open Sans" panose="020B0606030504020204" pitchFamily="34" charset="0"/>
+            </a:endParaRPr>
+          </a:p>
+        </p:txBody>
+      </p:sp>
+      <p:sp>
+        <p:nvSpPr>
+          <p:cNvPr id="2" name="Titel 1"/>
+          <p:cNvSpPr>
+            <a:spLocks noGrp="1"/>
+          </p:cNvSpPr>
+          <p:nvPr>
+            <p:ph type="title"/>
+          </p:nvPr>
+        </p:nvSpPr>
+        <p:spPr/>
+        <p:txBody>
+          <a:bodyPr/>
+          <a:lstStyle/>
+          <a:p>
+            <a:r>
+              <a:rPr lang="de-DE" dirty="0" smtClean="0"/>
+              <a:t>Komplexeres Beispiel: Aggregation von Marktforschungsdaten</a:t>
+            </a:r>
+            <a:endParaRPr lang="de-DE" dirty="0"/>
+          </a:p>
+        </p:txBody>
+      </p:sp>
+      <p:pic>
+        <p:nvPicPr>
+          <p:cNvPr id="1026" name="Picture 2" descr="D:\projects\mgm\jug-saxony-workshop\src\slides\resources\images\1490810710_Market_open_shopping_commerce_shop_store.png"/>
+          <p:cNvPicPr>
+            <a:picLocks noChangeAspect="1" noChangeArrowheads="1"/>
+          </p:cNvPicPr>
+          <p:nvPr/>
+        </p:nvPicPr>
+        <p:blipFill>
+          <a:blip r:embed="rId2" cstate="print">
+            <a:extLst>
+              <a:ext uri="{28A0092B-C50C-407E-A947-70E740481C1C}">
+                <a14:useLocalDpi xmlns:a14="http://schemas.microsoft.com/office/drawing/2010/main" val="0"/>
+              </a:ext>
+            </a:extLst>
+          </a:blip>
+          <a:srcRect/>
+          <a:stretch>
+            <a:fillRect/>
+          </a:stretch>
+        </p:blipFill>
+        <p:spPr bwMode="auto">
+          <a:xfrm>
+            <a:off x="1597661" y="1377951"/>
+            <a:ext cx="1522729" cy="1522729"/>
+          </a:xfrm>
+          <a:prstGeom prst="rect">
+            <a:avLst/>
+          </a:prstGeom>
+          <a:noFill/>
+          <a:extLst>
+            <a:ext uri="{909E8E84-426E-40DD-AFC4-6F175D3DCCD1}">
+              <a14:hiddenFill xmlns:a14="http://schemas.microsoft.com/office/drawing/2010/main">
+                <a:solidFill>
+                  <a:srgbClr val="FFFFFF"/>
+                </a:solidFill>
+              </a14:hiddenFill>
+            </a:ext>
+          </a:extLst>
+        </p:spPr>
+      </p:pic>
+      <p:pic>
+        <p:nvPicPr>
+          <p:cNvPr id="6" name="Picture 2" descr="D:\projects\mgm\jug-saxony-workshop\src\slides\resources\images\1490810710_Market_open_shopping_commerce_shop_store.png"/>
+          <p:cNvPicPr>
+            <a:picLocks noChangeAspect="1" noChangeArrowheads="1"/>
+          </p:cNvPicPr>
+          <p:nvPr/>
+        </p:nvPicPr>
+        <p:blipFill>
+          <a:blip r:embed="rId2" cstate="print">
+            <a:extLst>
+              <a:ext uri="{28A0092B-C50C-407E-A947-70E740481C1C}">
+                <a14:useLocalDpi xmlns:a14="http://schemas.microsoft.com/office/drawing/2010/main" val="0"/>
+              </a:ext>
+            </a:extLst>
+          </a:blip>
+          <a:srcRect/>
+          <a:stretch>
+            <a:fillRect/>
+          </a:stretch>
+        </p:blipFill>
+        <p:spPr bwMode="auto">
+          <a:xfrm>
+            <a:off x="1597661" y="3873501"/>
+            <a:ext cx="1522729" cy="1522729"/>
+          </a:xfrm>
+          <a:prstGeom prst="rect">
+            <a:avLst/>
+          </a:prstGeom>
+          <a:noFill/>
+          <a:extLst>
+            <a:ext uri="{909E8E84-426E-40DD-AFC4-6F175D3DCCD1}">
+              <a14:hiddenFill xmlns:a14="http://schemas.microsoft.com/office/drawing/2010/main">
+                <a:solidFill>
+                  <a:srgbClr val="FFFFFF"/>
+                </a:solidFill>
+              </a14:hiddenFill>
+            </a:ext>
+          </a:extLst>
+        </p:spPr>
+      </p:pic>
+      <p:sp>
+        <p:nvSpPr>
+          <p:cNvPr id="4" name="Textfeld 3"/>
+          <p:cNvSpPr txBox="1"/>
+          <p:nvPr/>
+        </p:nvSpPr>
+        <p:spPr bwMode="white">
+          <a:xfrm>
+            <a:off x="1696085" y="2911277"/>
+            <a:ext cx="1325880" cy="307777"/>
+          </a:xfrm>
+          <a:prstGeom prst="rect">
+            <a:avLst/>
+          </a:prstGeom>
+          <a:noFill/>
+          <a:ln>
+            <a:noFill/>
+          </a:ln>
+          <a:extLst>
+            <a:ext uri="{909E8E84-426E-40DD-AFC4-6F175D3DCCD1}">
+              <a14:hiddenFill xmlns:a14="http://schemas.microsoft.com/office/drawing/2010/main">
+                <a:solidFill>
+                  <a:srgbClr val="FFFFFF"/>
+                </a:solidFill>
+              </a14:hiddenFill>
+            </a:ext>
+            <a:ext uri="{91240B29-F687-4F45-9708-019B960494DF}">
+              <a14:hiddenLine xmlns:a14="http://schemas.microsoft.com/office/drawing/2010/main" w="9525" algn="ctr">
+                <a:solidFill>
+                  <a:srgbClr val="000000"/>
+                </a:solidFill>
+                <a:miter lim="800000"/>
+                <a:headEnd/>
+                <a:tailEnd/>
+              </a14:hiddenLine>
+            </a:ext>
+          </a:extLst>
+        </p:spPr>
+        <p:txBody>
+          <a:bodyPr vert="horz" wrap="square" lIns="91440" tIns="45720" rIns="91440" bIns="45720" numCol="1" rtlCol="0" anchor="t" anchorCtr="0" compatLnSpc="1">
+            <a:prstTxWarp prst="textNoShape">
+              <a:avLst/>
+            </a:prstTxWarp>
+            <a:spAutoFit/>
+          </a:bodyPr>
+          <a:lstStyle/>
+          <a:p>
+            <a:r>
+              <a:rPr lang="de-DE" sz="1400" kern="0" dirty="0" smtClean="0"/>
+              <a:t>Händler 1</a:t>
+            </a:r>
+            <a:endParaRPr lang="de-DE" sz="1400" kern="0" dirty="0" smtClean="0"/>
+          </a:p>
+        </p:txBody>
+      </p:sp>
+      <p:sp>
+        <p:nvSpPr>
+          <p:cNvPr id="8" name="Textfeld 7"/>
+          <p:cNvSpPr txBox="1"/>
+          <p:nvPr/>
+        </p:nvSpPr>
+        <p:spPr bwMode="white">
+          <a:xfrm>
+            <a:off x="1696085" y="5410637"/>
+            <a:ext cx="1325880" cy="307777"/>
+          </a:xfrm>
+          <a:prstGeom prst="rect">
+            <a:avLst/>
+          </a:prstGeom>
+          <a:noFill/>
+          <a:ln>
+            <a:noFill/>
+          </a:ln>
+          <a:extLst>
+            <a:ext uri="{909E8E84-426E-40DD-AFC4-6F175D3DCCD1}">
+              <a14:hiddenFill xmlns:a14="http://schemas.microsoft.com/office/drawing/2010/main">
+                <a:solidFill>
+                  <a:srgbClr val="FFFFFF"/>
+                </a:solidFill>
+              </a14:hiddenFill>
+            </a:ext>
+            <a:ext uri="{91240B29-F687-4F45-9708-019B960494DF}">
+              <a14:hiddenLine xmlns:a14="http://schemas.microsoft.com/office/drawing/2010/main" w="9525" algn="ctr">
+                <a:solidFill>
+                  <a:srgbClr val="000000"/>
+                </a:solidFill>
+                <a:miter lim="800000"/>
+                <a:headEnd/>
+                <a:tailEnd/>
+              </a14:hiddenLine>
+            </a:ext>
+          </a:extLst>
+        </p:spPr>
+        <p:txBody>
+          <a:bodyPr vert="horz" wrap="square" lIns="91440" tIns="45720" rIns="91440" bIns="45720" numCol="1" rtlCol="0" anchor="t" anchorCtr="0" compatLnSpc="1">
+            <a:prstTxWarp prst="textNoShape">
+              <a:avLst/>
+            </a:prstTxWarp>
+            <a:spAutoFit/>
+          </a:bodyPr>
+          <a:lstStyle/>
+          <a:p>
+            <a:r>
+              <a:rPr lang="de-DE" sz="1400" kern="0" dirty="0" smtClean="0"/>
+              <a:t>Händler 2</a:t>
+            </a:r>
+            <a:endParaRPr lang="de-DE" sz="1400" kern="0" dirty="0" smtClean="0"/>
+          </a:p>
+        </p:txBody>
+      </p:sp>
+      <p:pic>
+        <p:nvPicPr>
+          <p:cNvPr id="1027" name="Picture 3" descr="D:\projects\mgm\jug-saxony-workshop\src\slides\resources\images\1490810830_07.png"/>
+          <p:cNvPicPr>
+            <a:picLocks noChangeAspect="1" noChangeArrowheads="1"/>
+          </p:cNvPicPr>
+          <p:nvPr/>
+        </p:nvPicPr>
+        <p:blipFill>
+          <a:blip r:embed="rId3">
+            <a:extLst>
+              <a:ext uri="{28A0092B-C50C-407E-A947-70E740481C1C}">
+                <a14:useLocalDpi xmlns:a14="http://schemas.microsoft.com/office/drawing/2010/main" val="0"/>
+              </a:ext>
+            </a:extLst>
+          </a:blip>
+          <a:srcRect/>
+          <a:stretch>
+            <a:fillRect/>
+          </a:stretch>
+        </p:blipFill>
+        <p:spPr bwMode="auto">
+          <a:xfrm>
+            <a:off x="4037330" y="1732915"/>
+            <a:ext cx="812800" cy="812800"/>
+          </a:xfrm>
+          <a:prstGeom prst="rect">
+            <a:avLst/>
+          </a:prstGeom>
+          <a:noFill/>
+          <a:extLst>
+            <a:ext uri="{909E8E84-426E-40DD-AFC4-6F175D3DCCD1}">
+              <a14:hiddenFill xmlns:a14="http://schemas.microsoft.com/office/drawing/2010/main">
+                <a:solidFill>
+                  <a:srgbClr val="FFFFFF"/>
+                </a:solidFill>
+              </a14:hiddenFill>
+            </a:ext>
+          </a:extLst>
+        </p:spPr>
+      </p:pic>
+      <p:pic>
+        <p:nvPicPr>
+          <p:cNvPr id="11" name="Picture 3" descr="D:\projects\mgm\jug-saxony-workshop\src\slides\resources\images\1490810830_07.png"/>
+          <p:cNvPicPr>
+            <a:picLocks noChangeAspect="1" noChangeArrowheads="1"/>
+          </p:cNvPicPr>
+          <p:nvPr/>
+        </p:nvPicPr>
+        <p:blipFill>
+          <a:blip r:embed="rId3">
+            <a:extLst>
+              <a:ext uri="{28A0092B-C50C-407E-A947-70E740481C1C}">
+                <a14:useLocalDpi xmlns:a14="http://schemas.microsoft.com/office/drawing/2010/main" val="0"/>
+              </a:ext>
+            </a:extLst>
+          </a:blip>
+          <a:srcRect/>
+          <a:stretch>
+            <a:fillRect/>
+          </a:stretch>
+        </p:blipFill>
+        <p:spPr bwMode="auto">
+          <a:xfrm>
+            <a:off x="4037330" y="4228465"/>
+            <a:ext cx="812800" cy="812800"/>
+          </a:xfrm>
+          <a:prstGeom prst="rect">
+            <a:avLst/>
+          </a:prstGeom>
+          <a:noFill/>
+          <a:extLst>
+            <a:ext uri="{909E8E84-426E-40DD-AFC4-6F175D3DCCD1}">
+              <a14:hiddenFill xmlns:a14="http://schemas.microsoft.com/office/drawing/2010/main">
+                <a:solidFill>
+                  <a:srgbClr val="FFFFFF"/>
+                </a:solidFill>
+              </a14:hiddenFill>
+            </a:ext>
+          </a:extLst>
+        </p:spPr>
+      </p:pic>
+      <p:pic>
+        <p:nvPicPr>
+          <p:cNvPr id="1029" name="Picture 5" descr="D:\projects\mgm\jug-saxony-workshop\src\slides\resources\images\1490810845_04.png"/>
+          <p:cNvPicPr>
+            <a:picLocks noChangeAspect="1" noChangeArrowheads="1"/>
+          </p:cNvPicPr>
+          <p:nvPr/>
+        </p:nvPicPr>
+        <p:blipFill>
+          <a:blip r:embed="rId4">
+            <a:extLst>
+              <a:ext uri="{28A0092B-C50C-407E-A947-70E740481C1C}">
+                <a14:useLocalDpi xmlns:a14="http://schemas.microsoft.com/office/drawing/2010/main" val="0"/>
+              </a:ext>
+            </a:extLst>
+          </a:blip>
+          <a:srcRect/>
+          <a:stretch>
+            <a:fillRect/>
+          </a:stretch>
+        </p:blipFill>
+        <p:spPr bwMode="auto">
+          <a:xfrm>
+            <a:off x="8689340" y="2609454"/>
+            <a:ext cx="1625600" cy="1625600"/>
+          </a:xfrm>
+          <a:prstGeom prst="rect">
+            <a:avLst/>
+          </a:prstGeom>
+          <a:noFill/>
+          <a:extLst>
+            <a:ext uri="{909E8E84-426E-40DD-AFC4-6F175D3DCCD1}">
+              <a14:hiddenFill xmlns:a14="http://schemas.microsoft.com/office/drawing/2010/main">
+                <a:solidFill>
+                  <a:srgbClr val="FFFFFF"/>
+                </a:solidFill>
+              </a14:hiddenFill>
+            </a:ext>
+          </a:extLst>
+        </p:spPr>
+      </p:pic>
+      <p:pic>
+        <p:nvPicPr>
+          <p:cNvPr id="1030" name="Picture 6" descr="D:\projects\mgm\jug-saxony-workshop\src\slides\resources\images\1490810940_data-center-px-png.png"/>
+          <p:cNvPicPr>
+            <a:picLocks noChangeAspect="1" noChangeArrowheads="1"/>
+          </p:cNvPicPr>
+          <p:nvPr/>
+        </p:nvPicPr>
+        <p:blipFill>
+          <a:blip r:embed="rId5">
+            <a:extLst>
+              <a:ext uri="{28A0092B-C50C-407E-A947-70E740481C1C}">
+                <a14:useLocalDpi xmlns:a14="http://schemas.microsoft.com/office/drawing/2010/main" val="0"/>
+              </a:ext>
+            </a:extLst>
+          </a:blip>
+          <a:srcRect/>
+          <a:stretch>
+            <a:fillRect/>
+          </a:stretch>
+        </p:blipFill>
+        <p:spPr bwMode="auto">
+          <a:xfrm>
+            <a:off x="5612130" y="2812654"/>
+            <a:ext cx="1219200" cy="1219200"/>
+          </a:xfrm>
+          <a:prstGeom prst="rect">
+            <a:avLst/>
+          </a:prstGeom>
+          <a:noFill/>
+          <a:extLst>
+            <a:ext uri="{909E8E84-426E-40DD-AFC4-6F175D3DCCD1}">
+              <a14:hiddenFill xmlns:a14="http://schemas.microsoft.com/office/drawing/2010/main">
+                <a:solidFill>
+                  <a:srgbClr val="FFFFFF"/>
+                </a:solidFill>
+              </a14:hiddenFill>
+            </a:ext>
+          </a:extLst>
+        </p:spPr>
+      </p:pic>
+      <p:sp>
+        <p:nvSpPr>
+          <p:cNvPr id="9" name="Pfeil nach rechts 8"/>
+          <p:cNvSpPr/>
+          <p:nvPr/>
+        </p:nvSpPr>
+        <p:spPr bwMode="auto">
+          <a:xfrm>
+            <a:off x="7155180" y="3095030"/>
+            <a:ext cx="1314450" cy="654447"/>
+          </a:xfrm>
+          <a:prstGeom prst="rightArrow">
+            <a:avLst/>
+          </a:prstGeom>
+          <a:solidFill>
+            <a:schemeClr val="accent6">
+              <a:lumMod val="75000"/>
+            </a:schemeClr>
+          </a:solidFill>
+          <a:ln w="9525" cap="flat" cmpd="sng" algn="ctr">
+            <a:noFill/>
+            <a:prstDash val="solid"/>
+            <a:round/>
+            <a:headEnd type="none" w="med" len="med"/>
+            <a:tailEnd type="none" w="med" len="med"/>
+          </a:ln>
+          <a:effectLst/>
+        </p:spPr>
+        <p:txBody>
+          <a:bodyPr rot="0" spcFirstLastPara="0" vertOverflow="overflow" horzOverflow="overflow" vert="horz" wrap="square" lIns="91440" tIns="45720" rIns="91440" bIns="45720" numCol="1" spcCol="0" rtlCol="0" fromWordArt="0" anchor="ctr" anchorCtr="0" forceAA="0" compatLnSpc="1">
+            <a:prstTxWarp prst="textNoShape">
+              <a:avLst/>
+            </a:prstTxWarp>
+            <a:noAutofit/>
+          </a:bodyPr>
+          <a:lstStyle/>
+          <a:p>
+            <a:pPr>
+              <a:spcAft>
+                <a:spcPts val="600"/>
+              </a:spcAft>
+            </a:pPr>
+            <a:endParaRPr lang="de-DE" sz="1200" dirty="0" err="1">
+              <a:solidFill>
+                <a:schemeClr val="bg1"/>
+              </a:solidFill>
+              <a:latin typeface="Open Sans" panose="020B0606030504020204" pitchFamily="34" charset="0"/>
+              <a:ea typeface="Open Sans" panose="020B0606030504020204" pitchFamily="34" charset="0"/>
+              <a:cs typeface="Open Sans" panose="020B0606030504020204" pitchFamily="34" charset="0"/>
+            </a:endParaRPr>
+          </a:p>
+        </p:txBody>
+      </p:sp>
+    </p:spTree>
+    <p:extLst>
+      <p:ext uri="{BB962C8B-B14F-4D97-AF65-F5344CB8AC3E}">
+        <p14:creationId xmlns:p14="http://schemas.microsoft.com/office/powerpoint/2010/main" val="3993608850"/>
+      </p:ext>
+    </p:extLst>
+  </p:cSld>
+  <p:clrMapOvr>
+    <a:masterClrMapping/>
+  </p:clrMapOvr>
+  <p:timing>
+    <p:tnLst>
+      <p:par>
+        <p:cTn id="1" dur="indefinite" restart="never" nodeType="tmRoot"/>
+      </p:par>
+    </p:tnLst>
+  </p:timing>
+</p:sld>
+</file>
+
+<file path=ppt/slides/slide5.xml><?xml version="1.0" encoding="utf-8"?>
+<p:sld xmlns:a="http://schemas.openxmlformats.org/drawingml/2006/main" xmlns:r="http://schemas.openxmlformats.org/officeDocument/2006/relationships" xmlns:p="http://schemas.openxmlformats.org/presentationml/2006/main">
+  <p:cSld>
+    <p:spTree>
+      <p:nvGrpSpPr>
+        <p:cNvPr id="1" name=""/>
+        <p:cNvGrpSpPr/>
+        <p:nvPr/>
+      </p:nvGrpSpPr>
+      <p:grpSpPr>
+        <a:xfrm>
+          <a:off x="0" y="0"/>
+          <a:ext cx="0" cy="0"/>
+          <a:chOff x="0" y="0"/>
+          <a:chExt cx="0" cy="0"/>
+        </a:xfrm>
+      </p:grpSpPr>
+      <p:sp>
+        <p:nvSpPr>
+          <p:cNvPr id="2" name="Titel 1"/>
+          <p:cNvSpPr>
+            <a:spLocks noGrp="1"/>
+          </p:cNvSpPr>
+          <p:nvPr>
+            <p:ph type="title"/>
+          </p:nvPr>
+        </p:nvSpPr>
+        <p:spPr/>
+        <p:txBody>
+          <a:bodyPr/>
+          <a:lstStyle/>
+          <a:p>
+            <a:r>
+              <a:rPr lang="de-DE" dirty="0" smtClean="0"/>
+              <a:t>Eingabedaten: Verkaufsdaten</a:t>
+            </a:r>
+            <a:endParaRPr lang="de-DE" dirty="0"/>
+          </a:p>
+        </p:txBody>
+      </p:sp>
+      <p:sp>
+        <p:nvSpPr>
+          <p:cNvPr id="3" name="Inhaltsplatzhalter 2"/>
+          <p:cNvSpPr>
+            <a:spLocks noGrp="1"/>
+          </p:cNvSpPr>
+          <p:nvPr>
+            <p:ph sz="half" idx="1"/>
+          </p:nvPr>
+        </p:nvSpPr>
+        <p:spPr/>
+        <p:txBody>
+          <a:bodyPr/>
+          <a:lstStyle/>
+          <a:p>
+            <a:pPr marL="0" indent="0">
+              <a:buNone/>
+            </a:pPr>
+            <a:r>
+              <a:rPr lang="de-DE" b="1" dirty="0"/>
+              <a:t>Händler 1: </a:t>
+            </a:r>
+            <a:r>
+              <a:rPr lang="de-DE" b="1" dirty="0" err="1" smtClean="0"/>
+              <a:t>MideaMarkt</a:t>
+            </a:r>
+            <a:endParaRPr lang="de-DE" b="1" dirty="0" smtClean="0"/>
+          </a:p>
+          <a:p>
+            <a:pPr marL="0" indent="0">
+              <a:buNone/>
+            </a:pPr>
+            <a:r>
+              <a:rPr lang="de-DE" dirty="0"/>
+              <a:t>Verkaufszeitraum: 2017-02-11T00:00:00ZP1D</a:t>
+            </a:r>
+            <a:endParaRPr lang="de-DE" dirty="0" smtClean="0"/>
+          </a:p>
+          <a:p>
+            <a:pPr marL="0" indent="0">
+              <a:buNone/>
+            </a:pPr>
+            <a:endParaRPr lang="de-DE" dirty="0"/>
+          </a:p>
+        </p:txBody>
+      </p:sp>
+      <p:sp>
+        <p:nvSpPr>
+          <p:cNvPr id="5" name="Inhaltsplatzhalter 4"/>
+          <p:cNvSpPr>
+            <a:spLocks noGrp="1"/>
+          </p:cNvSpPr>
+          <p:nvPr>
+            <p:ph sz="half" idx="2"/>
+          </p:nvPr>
+        </p:nvSpPr>
+        <p:spPr/>
+        <p:txBody>
+          <a:bodyPr/>
+          <a:lstStyle/>
+          <a:p>
+            <a:pPr marL="0" indent="0">
+              <a:buNone/>
+            </a:pPr>
+            <a:r>
+              <a:rPr lang="de-DE" b="1" dirty="0"/>
+              <a:t>Händler 2: </a:t>
+            </a:r>
+            <a:r>
+              <a:rPr lang="de-DE" b="1" dirty="0" err="1" smtClean="0"/>
+              <a:t>Sutarn</a:t>
+            </a:r>
+            <a:endParaRPr lang="de-DE" b="1" dirty="0" smtClean="0"/>
+          </a:p>
+          <a:p>
+            <a:pPr marL="0" indent="0">
+              <a:buNone/>
+            </a:pPr>
+            <a:r>
+              <a:rPr lang="de-DE" dirty="0"/>
+              <a:t>Verkaufszeitraum: 2017-02-11T00:00:00ZP1D</a:t>
+            </a:r>
+          </a:p>
+          <a:p>
+            <a:pPr marL="0" indent="0">
+              <a:buNone/>
+            </a:pPr>
+            <a:endParaRPr lang="de-DE" dirty="0"/>
+          </a:p>
+        </p:txBody>
+      </p:sp>
+      <p:graphicFrame>
+        <p:nvGraphicFramePr>
+          <p:cNvPr id="6" name="Tabelle 5"/>
+          <p:cNvGraphicFramePr>
+            <a:graphicFrameLocks noGrp="1"/>
+          </p:cNvGraphicFramePr>
+          <p:nvPr>
+            <p:extLst>
+              <p:ext uri="{D42A27DB-BD31-4B8C-83A1-F6EECF244321}">
+                <p14:modId xmlns:p14="http://schemas.microsoft.com/office/powerpoint/2010/main" val="4238399807"/>
+              </p:ext>
+            </p:extLst>
+          </p:nvPr>
+        </p:nvGraphicFramePr>
+        <p:xfrm>
+          <a:off x="457200" y="2331296"/>
+          <a:ext cx="5280661" cy="2225040"/>
+        </p:xfrm>
+        <a:graphic>
+          <a:graphicData uri="http://schemas.openxmlformats.org/drawingml/2006/table">
+            <a:tbl>
+              <a:tblPr firstRow="1" bandRow="1">
+                <a:tableStyleId>{93296810-A885-4BE3-A3E7-6D5BEEA58F35}</a:tableStyleId>
+              </a:tblPr>
+              <a:tblGrid>
+                <a:gridCol w="1657350"/>
+                <a:gridCol w="1874520"/>
+                <a:gridCol w="1005840"/>
+                <a:gridCol w="742951"/>
+              </a:tblGrid>
+              <a:tr h="370840">
+                <a:tc>
+                  <a:txBody>
+                    <a:bodyPr/>
+                    <a:lstStyle/>
+                    <a:p>
+                      <a:r>
+                        <a:rPr lang="de-DE" dirty="0" smtClean="0"/>
+                        <a:t>Produkt</a:t>
+                      </a:r>
+                      <a:endParaRPr lang="de-DE" dirty="0"/>
+                    </a:p>
+                  </a:txBody>
+                  <a:tcPr/>
+                </a:tc>
+                <a:tc>
+                  <a:txBody>
+                    <a:bodyPr/>
+                    <a:lstStyle/>
+                    <a:p>
+                      <a:pPr algn="ctr"/>
+                      <a:r>
+                        <a:rPr lang="de-DE" dirty="0" smtClean="0"/>
+                        <a:t>Produktgruppe</a:t>
+                      </a:r>
+                      <a:endParaRPr lang="de-DE" dirty="0"/>
+                    </a:p>
+                  </a:txBody>
+                  <a:tcPr/>
+                </a:tc>
+                <a:tc>
+                  <a:txBody>
+                    <a:bodyPr/>
+                    <a:lstStyle/>
+                    <a:p>
+                      <a:pPr algn="r"/>
+                      <a:r>
+                        <a:rPr lang="de-DE" dirty="0" smtClean="0"/>
+                        <a:t>Anzahl</a:t>
+                      </a:r>
+                      <a:endParaRPr lang="de-DE" dirty="0"/>
+                    </a:p>
+                  </a:txBody>
+                  <a:tcPr/>
+                </a:tc>
+                <a:tc>
+                  <a:txBody>
+                    <a:bodyPr/>
+                    <a:lstStyle/>
+                    <a:p>
+                      <a:pPr algn="r"/>
+                      <a:r>
+                        <a:rPr lang="de-DE" dirty="0" smtClean="0"/>
+                        <a:t>Preis</a:t>
+                      </a:r>
+                      <a:endParaRPr lang="de-DE" dirty="0"/>
+                    </a:p>
+                  </a:txBody>
+                  <a:tcPr/>
+                </a:tc>
+              </a:tr>
+              <a:tr h="370840">
+                <a:tc>
+                  <a:txBody>
+                    <a:bodyPr/>
+                    <a:lstStyle/>
+                    <a:p>
+                      <a:r>
+                        <a:rPr lang="de-DE" dirty="0" err="1" smtClean="0"/>
+                        <a:t>Galaxy</a:t>
+                      </a:r>
+                      <a:r>
+                        <a:rPr lang="de-DE" dirty="0" smtClean="0"/>
+                        <a:t> J3</a:t>
+                      </a:r>
+                      <a:endParaRPr lang="de-DE" dirty="0"/>
+                    </a:p>
+                  </a:txBody>
+                  <a:tcPr/>
+                </a:tc>
+                <a:tc>
+                  <a:txBody>
+                    <a:bodyPr/>
+                    <a:lstStyle/>
+                    <a:p>
+                      <a:pPr algn="ctr"/>
+                      <a:r>
+                        <a:rPr lang="de-DE" dirty="0" smtClean="0"/>
+                        <a:t>Smartphone</a:t>
+                      </a:r>
+                      <a:endParaRPr lang="de-DE" dirty="0"/>
+                    </a:p>
+                  </a:txBody>
+                  <a:tcPr/>
+                </a:tc>
+                <a:tc>
+                  <a:txBody>
+                    <a:bodyPr/>
+                    <a:lstStyle/>
+                    <a:p>
+                      <a:pPr algn="r"/>
+                      <a:r>
+                        <a:rPr lang="de-DE" dirty="0" smtClean="0"/>
+                        <a:t>5</a:t>
+                      </a:r>
+                      <a:endParaRPr lang="de-DE" dirty="0"/>
+                    </a:p>
+                  </a:txBody>
+                  <a:tcPr/>
+                </a:tc>
+                <a:tc>
+                  <a:txBody>
+                    <a:bodyPr/>
+                    <a:lstStyle/>
+                    <a:p>
+                      <a:pPr algn="r"/>
+                      <a:r>
+                        <a:rPr lang="de-DE" dirty="0" smtClean="0"/>
+                        <a:t>150€</a:t>
+                      </a:r>
+                      <a:endParaRPr lang="de-DE" dirty="0"/>
+                    </a:p>
+                  </a:txBody>
+                  <a:tcPr/>
+                </a:tc>
+              </a:tr>
+              <a:tr h="370840">
+                <a:tc>
+                  <a:txBody>
+                    <a:bodyPr/>
+                    <a:lstStyle/>
+                    <a:p>
+                      <a:r>
+                        <a:rPr lang="de-DE" dirty="0" err="1" smtClean="0"/>
+                        <a:t>Xperia</a:t>
+                      </a:r>
+                      <a:r>
+                        <a:rPr lang="de-DE" dirty="0" smtClean="0"/>
+                        <a:t> E5</a:t>
+                      </a:r>
+                      <a:endParaRPr lang="de-DE" dirty="0"/>
+                    </a:p>
+                  </a:txBody>
+                  <a:tcPr/>
+                </a:tc>
+                <a:tc>
+                  <a:txBody>
+                    <a:bodyPr/>
+                    <a:lstStyle/>
+                    <a:p>
+                      <a:pPr algn="ctr"/>
+                      <a:r>
+                        <a:rPr lang="de-DE" dirty="0" smtClean="0"/>
+                        <a:t>Smartphone</a:t>
+                      </a:r>
+                      <a:endParaRPr lang="de-DE" dirty="0"/>
+                    </a:p>
+                  </a:txBody>
+                  <a:tcPr/>
+                </a:tc>
+                <a:tc>
+                  <a:txBody>
+                    <a:bodyPr/>
+                    <a:lstStyle/>
+                    <a:p>
+                      <a:pPr algn="r"/>
+                      <a:r>
+                        <a:rPr lang="de-DE" dirty="0" smtClean="0"/>
+                        <a:t>3</a:t>
+                      </a:r>
+                      <a:endParaRPr lang="de-DE" dirty="0"/>
+                    </a:p>
+                  </a:txBody>
+                  <a:tcPr/>
+                </a:tc>
+                <a:tc>
+                  <a:txBody>
+                    <a:bodyPr/>
+                    <a:lstStyle/>
+                    <a:p>
+                      <a:pPr algn="r"/>
+                      <a:r>
+                        <a:rPr lang="de-DE" dirty="0" smtClean="0"/>
+                        <a:t>140€</a:t>
+                      </a:r>
+                      <a:endParaRPr lang="de-DE" dirty="0"/>
+                    </a:p>
+                  </a:txBody>
+                  <a:tcPr/>
+                </a:tc>
+              </a:tr>
+              <a:tr h="370840">
+                <a:tc>
+                  <a:txBody>
+                    <a:bodyPr/>
+                    <a:lstStyle/>
+                    <a:p>
+                      <a:r>
+                        <a:rPr lang="de-DE" dirty="0" smtClean="0"/>
+                        <a:t>KU6519</a:t>
+                      </a:r>
+                      <a:endParaRPr lang="de-DE" dirty="0"/>
+                    </a:p>
+                  </a:txBody>
+                  <a:tcPr/>
+                </a:tc>
+                <a:tc>
+                  <a:txBody>
+                    <a:bodyPr/>
+                    <a:lstStyle/>
+                    <a:p>
+                      <a:pPr algn="ctr"/>
+                      <a:r>
+                        <a:rPr lang="de-DE" dirty="0" smtClean="0"/>
+                        <a:t>Fernseher</a:t>
+                      </a:r>
+                      <a:endParaRPr lang="de-DE" dirty="0"/>
+                    </a:p>
+                  </a:txBody>
+                  <a:tcPr/>
+                </a:tc>
+                <a:tc>
+                  <a:txBody>
+                    <a:bodyPr/>
+                    <a:lstStyle/>
+                    <a:p>
+                      <a:pPr algn="r"/>
+                      <a:r>
+                        <a:rPr lang="de-DE" dirty="0" smtClean="0"/>
+                        <a:t>12</a:t>
+                      </a:r>
+                      <a:endParaRPr lang="de-DE" dirty="0"/>
+                    </a:p>
+                  </a:txBody>
+                  <a:tcPr/>
+                </a:tc>
+                <a:tc>
+                  <a:txBody>
+                    <a:bodyPr/>
+                    <a:lstStyle/>
+                    <a:p>
+                      <a:pPr algn="r"/>
+                      <a:r>
+                        <a:rPr lang="de-DE" dirty="0" smtClean="0"/>
+                        <a:t>900€</a:t>
+                      </a:r>
+                      <a:endParaRPr lang="de-DE" dirty="0"/>
+                    </a:p>
+                  </a:txBody>
+                  <a:tcPr/>
+                </a:tc>
+              </a:tr>
+              <a:tr h="370840">
+                <a:tc>
+                  <a:txBody>
+                    <a:bodyPr/>
+                    <a:lstStyle/>
+                    <a:p>
+                      <a:r>
+                        <a:rPr lang="de-DE" dirty="0" smtClean="0"/>
+                        <a:t>LT-40VF43A</a:t>
+                      </a:r>
+                      <a:endParaRPr lang="de-DE" dirty="0"/>
+                    </a:p>
+                  </a:txBody>
+                  <a:tcPr/>
+                </a:tc>
+                <a:tc>
+                  <a:txBody>
+                    <a:bodyPr/>
+                    <a:lstStyle/>
+                    <a:p>
+                      <a:pPr algn="ctr"/>
+                      <a:r>
+                        <a:rPr lang="de-DE" dirty="0" smtClean="0"/>
+                        <a:t>Fernseher</a:t>
+                      </a:r>
+                      <a:endParaRPr lang="de-DE" dirty="0"/>
+                    </a:p>
+                  </a:txBody>
+                  <a:tcPr/>
+                </a:tc>
+                <a:tc>
+                  <a:txBody>
+                    <a:bodyPr/>
+                    <a:lstStyle/>
+                    <a:p>
+                      <a:pPr algn="r"/>
+                      <a:r>
+                        <a:rPr lang="de-DE" dirty="0" smtClean="0"/>
+                        <a:t>4</a:t>
+                      </a:r>
+                      <a:endParaRPr lang="de-DE" dirty="0"/>
+                    </a:p>
+                  </a:txBody>
+                  <a:tcPr/>
+                </a:tc>
+                <a:tc>
+                  <a:txBody>
+                    <a:bodyPr/>
+                    <a:lstStyle/>
+                    <a:p>
+                      <a:pPr algn="r"/>
+                      <a:r>
+                        <a:rPr lang="de-DE" dirty="0" smtClean="0"/>
+                        <a:t>300€</a:t>
+                      </a:r>
+                      <a:endParaRPr lang="de-DE" dirty="0"/>
+                    </a:p>
+                  </a:txBody>
+                  <a:tcPr/>
+                </a:tc>
+              </a:tr>
+              <a:tr h="370840">
+                <a:tc>
+                  <a:txBody>
+                    <a:bodyPr/>
+                    <a:lstStyle/>
+                    <a:p>
+                      <a:r>
+                        <a:rPr lang="de-DE" dirty="0" smtClean="0"/>
+                        <a:t>USB</a:t>
+                      </a:r>
+                      <a:r>
+                        <a:rPr lang="de-DE" baseline="0" dirty="0" smtClean="0"/>
+                        <a:t> 1,5m</a:t>
+                      </a:r>
+                      <a:endParaRPr lang="de-DE" dirty="0"/>
+                    </a:p>
+                  </a:txBody>
+                  <a:tcPr/>
+                </a:tc>
+                <a:tc>
+                  <a:txBody>
+                    <a:bodyPr/>
+                    <a:lstStyle/>
+                    <a:p>
+                      <a:pPr algn="ctr"/>
+                      <a:r>
+                        <a:rPr lang="de-DE" dirty="0" smtClean="0"/>
+                        <a:t>Kabel</a:t>
+                      </a:r>
+                      <a:endParaRPr lang="de-DE" dirty="0"/>
+                    </a:p>
+                  </a:txBody>
+                  <a:tcPr/>
+                </a:tc>
+                <a:tc>
+                  <a:txBody>
+                    <a:bodyPr/>
+                    <a:lstStyle/>
+                    <a:p>
+                      <a:pPr algn="r"/>
+                      <a:r>
+                        <a:rPr lang="de-DE" dirty="0" smtClean="0"/>
+                        <a:t>200</a:t>
+                      </a:r>
+                      <a:endParaRPr lang="de-DE" dirty="0"/>
+                    </a:p>
+                  </a:txBody>
+                  <a:tcPr/>
+                </a:tc>
+                <a:tc>
+                  <a:txBody>
+                    <a:bodyPr/>
+                    <a:lstStyle/>
+                    <a:p>
+                      <a:pPr algn="r"/>
+                      <a:r>
+                        <a:rPr lang="de-DE" dirty="0" smtClean="0"/>
+                        <a:t>5€</a:t>
+                      </a:r>
+                      <a:endParaRPr lang="de-DE" dirty="0"/>
+                    </a:p>
+                  </a:txBody>
+                  <a:tcPr/>
+                </a:tc>
+              </a:tr>
+            </a:tbl>
+          </a:graphicData>
+        </a:graphic>
+      </p:graphicFrame>
+      <p:graphicFrame>
+        <p:nvGraphicFramePr>
+          <p:cNvPr id="7" name="Tabelle 6"/>
+          <p:cNvGraphicFramePr>
+            <a:graphicFrameLocks noGrp="1"/>
+          </p:cNvGraphicFramePr>
+          <p:nvPr>
+            <p:extLst>
+              <p:ext uri="{D42A27DB-BD31-4B8C-83A1-F6EECF244321}">
+                <p14:modId xmlns:p14="http://schemas.microsoft.com/office/powerpoint/2010/main" val="1983309484"/>
+              </p:ext>
+            </p:extLst>
+          </p:nvPr>
+        </p:nvGraphicFramePr>
+        <p:xfrm>
+          <a:off x="6147925" y="2331296"/>
+          <a:ext cx="5280661" cy="2595880"/>
+        </p:xfrm>
+        <a:graphic>
+          <a:graphicData uri="http://schemas.openxmlformats.org/drawingml/2006/table">
+            <a:tbl>
+              <a:tblPr firstRow="1" bandRow="1">
+                <a:tableStyleId>{93296810-A885-4BE3-A3E7-6D5BEEA58F35}</a:tableStyleId>
+              </a:tblPr>
+              <a:tblGrid>
+                <a:gridCol w="1657350"/>
+                <a:gridCol w="1874520"/>
+                <a:gridCol w="1005840"/>
+                <a:gridCol w="742951"/>
+              </a:tblGrid>
+              <a:tr h="370840">
+                <a:tc>
+                  <a:txBody>
+                    <a:bodyPr/>
+                    <a:lstStyle/>
+                    <a:p>
+                      <a:r>
+                        <a:rPr lang="de-DE" dirty="0" smtClean="0"/>
+                        <a:t>Produkt</a:t>
+                      </a:r>
+                      <a:endParaRPr lang="de-DE" dirty="0"/>
+                    </a:p>
+                  </a:txBody>
+                  <a:tcPr/>
+                </a:tc>
+                <a:tc>
+                  <a:txBody>
+                    <a:bodyPr/>
+                    <a:lstStyle/>
+                    <a:p>
+                      <a:pPr algn="ctr"/>
+                      <a:r>
+                        <a:rPr lang="de-DE" dirty="0" smtClean="0"/>
+                        <a:t>Produktgruppe</a:t>
+                      </a:r>
+                      <a:endParaRPr lang="de-DE" dirty="0"/>
+                    </a:p>
+                  </a:txBody>
+                  <a:tcPr/>
+                </a:tc>
+                <a:tc>
+                  <a:txBody>
+                    <a:bodyPr/>
+                    <a:lstStyle/>
+                    <a:p>
+                      <a:pPr algn="r"/>
+                      <a:r>
+                        <a:rPr lang="de-DE" dirty="0" smtClean="0"/>
+                        <a:t>Anzahl</a:t>
+                      </a:r>
+                      <a:endParaRPr lang="de-DE" dirty="0"/>
+                    </a:p>
+                  </a:txBody>
+                  <a:tcPr/>
+                </a:tc>
+                <a:tc>
+                  <a:txBody>
+                    <a:bodyPr/>
+                    <a:lstStyle/>
+                    <a:p>
+                      <a:pPr algn="r"/>
+                      <a:r>
+                        <a:rPr lang="de-DE" dirty="0" smtClean="0"/>
+                        <a:t>Preis</a:t>
+                      </a:r>
+                      <a:endParaRPr lang="de-DE" dirty="0"/>
+                    </a:p>
+                  </a:txBody>
+                  <a:tcPr/>
+                </a:tc>
+              </a:tr>
+              <a:tr h="370840">
+                <a:tc>
+                  <a:txBody>
+                    <a:bodyPr/>
+                    <a:lstStyle/>
+                    <a:p>
+                      <a:r>
+                        <a:rPr lang="de-DE" dirty="0" smtClean="0"/>
+                        <a:t>Moto G4</a:t>
+                      </a:r>
+                      <a:endParaRPr lang="de-DE" dirty="0"/>
+                    </a:p>
+                  </a:txBody>
+                  <a:tcPr/>
+                </a:tc>
+                <a:tc>
+                  <a:txBody>
+                    <a:bodyPr/>
+                    <a:lstStyle/>
+                    <a:p>
+                      <a:pPr algn="ctr"/>
+                      <a:r>
+                        <a:rPr lang="de-DE" dirty="0" smtClean="0"/>
+                        <a:t>Smartphone</a:t>
+                      </a:r>
+                      <a:endParaRPr lang="de-DE" dirty="0"/>
+                    </a:p>
+                  </a:txBody>
+                  <a:tcPr/>
+                </a:tc>
+                <a:tc>
+                  <a:txBody>
+                    <a:bodyPr/>
+                    <a:lstStyle/>
+                    <a:p>
+                      <a:pPr algn="r"/>
+                      <a:r>
+                        <a:rPr lang="de-DE" dirty="0" smtClean="0"/>
+                        <a:t>7</a:t>
+                      </a:r>
+                      <a:endParaRPr lang="de-DE" dirty="0"/>
+                    </a:p>
+                  </a:txBody>
+                  <a:tcPr/>
+                </a:tc>
+                <a:tc>
+                  <a:txBody>
+                    <a:bodyPr/>
+                    <a:lstStyle/>
+                    <a:p>
+                      <a:pPr algn="r"/>
+                      <a:r>
+                        <a:rPr lang="de-DE" dirty="0" smtClean="0"/>
+                        <a:t>160€</a:t>
+                      </a:r>
+                      <a:endParaRPr lang="de-DE" dirty="0"/>
+                    </a:p>
+                  </a:txBody>
+                  <a:tcPr/>
+                </a:tc>
+              </a:tr>
+              <a:tr h="370840">
+                <a:tc>
+                  <a:txBody>
+                    <a:bodyPr/>
+                    <a:lstStyle/>
+                    <a:p>
+                      <a:r>
+                        <a:rPr lang="de-DE" dirty="0" err="1" smtClean="0"/>
+                        <a:t>Xperia</a:t>
+                      </a:r>
+                      <a:r>
+                        <a:rPr lang="de-DE" dirty="0" smtClean="0"/>
+                        <a:t> E5</a:t>
+                      </a:r>
+                      <a:endParaRPr lang="de-DE" dirty="0"/>
+                    </a:p>
+                  </a:txBody>
+                  <a:tcPr/>
+                </a:tc>
+                <a:tc>
+                  <a:txBody>
+                    <a:bodyPr/>
+                    <a:lstStyle/>
+                    <a:p>
+                      <a:pPr algn="ctr"/>
+                      <a:r>
+                        <a:rPr lang="de-DE" dirty="0" smtClean="0"/>
+                        <a:t>Smartphone</a:t>
+                      </a:r>
+                      <a:endParaRPr lang="de-DE" dirty="0"/>
+                    </a:p>
+                  </a:txBody>
+                  <a:tcPr/>
+                </a:tc>
+                <a:tc>
+                  <a:txBody>
+                    <a:bodyPr/>
+                    <a:lstStyle/>
+                    <a:p>
+                      <a:pPr algn="r"/>
+                      <a:r>
+                        <a:rPr lang="de-DE" dirty="0" smtClean="0"/>
+                        <a:t>2</a:t>
+                      </a:r>
+                      <a:endParaRPr lang="de-DE" dirty="0"/>
+                    </a:p>
+                  </a:txBody>
+                  <a:tcPr/>
+                </a:tc>
+                <a:tc>
+                  <a:txBody>
+                    <a:bodyPr/>
+                    <a:lstStyle/>
+                    <a:p>
+                      <a:pPr algn="r"/>
+                      <a:r>
+                        <a:rPr lang="de-DE" dirty="0" smtClean="0"/>
+                        <a:t>130€</a:t>
+                      </a:r>
+                      <a:endParaRPr lang="de-DE" dirty="0"/>
+                    </a:p>
+                  </a:txBody>
+                  <a:tcPr/>
+                </a:tc>
+              </a:tr>
+              <a:tr h="370840">
+                <a:tc>
+                  <a:txBody>
+                    <a:bodyPr/>
+                    <a:lstStyle/>
+                    <a:p>
+                      <a:r>
+                        <a:rPr lang="de-DE" dirty="0" smtClean="0"/>
+                        <a:t>LT-40VF43A</a:t>
+                      </a:r>
+                      <a:endParaRPr lang="de-DE" dirty="0"/>
+                    </a:p>
+                  </a:txBody>
+                  <a:tcPr/>
+                </a:tc>
+                <a:tc>
+                  <a:txBody>
+                    <a:bodyPr/>
+                    <a:lstStyle/>
+                    <a:p>
+                      <a:pPr algn="ctr"/>
+                      <a:r>
+                        <a:rPr lang="de-DE" dirty="0" smtClean="0"/>
+                        <a:t>Fernseher</a:t>
+                      </a:r>
+                      <a:endParaRPr lang="de-DE" dirty="0"/>
+                    </a:p>
+                  </a:txBody>
+                  <a:tcPr/>
+                </a:tc>
+                <a:tc>
+                  <a:txBody>
+                    <a:bodyPr/>
+                    <a:lstStyle/>
+                    <a:p>
+                      <a:pPr algn="r"/>
+                      <a:r>
+                        <a:rPr lang="de-DE" dirty="0" smtClean="0"/>
+                        <a:t>1</a:t>
+                      </a:r>
+                      <a:endParaRPr lang="de-DE" dirty="0"/>
+                    </a:p>
+                  </a:txBody>
+                  <a:tcPr/>
+                </a:tc>
+                <a:tc>
+                  <a:txBody>
+                    <a:bodyPr/>
+                    <a:lstStyle/>
+                    <a:p>
+                      <a:pPr algn="r"/>
+                      <a:r>
+                        <a:rPr lang="de-DE" dirty="0" smtClean="0"/>
+                        <a:t>320</a:t>
+                      </a:r>
+                      <a:r>
+                        <a:rPr lang="de-DE" dirty="0" smtClean="0"/>
+                        <a:t>€</a:t>
+                      </a:r>
+                      <a:endParaRPr lang="de-DE" dirty="0"/>
+                    </a:p>
+                  </a:txBody>
+                  <a:tcPr/>
+                </a:tc>
+              </a:tr>
+              <a:tr h="370840">
+                <a:tc>
+                  <a:txBody>
+                    <a:bodyPr/>
+                    <a:lstStyle/>
+                    <a:p>
+                      <a:r>
+                        <a:rPr lang="de-DE" dirty="0" smtClean="0"/>
+                        <a:t>J6289</a:t>
+                      </a:r>
+                      <a:endParaRPr lang="de-DE" dirty="0"/>
+                    </a:p>
+                  </a:txBody>
+                  <a:tcPr/>
+                </a:tc>
+                <a:tc>
+                  <a:txBody>
+                    <a:bodyPr/>
+                    <a:lstStyle/>
+                    <a:p>
+                      <a:pPr algn="ctr"/>
+                      <a:r>
+                        <a:rPr lang="de-DE" dirty="0" smtClean="0"/>
+                        <a:t>Fernseher</a:t>
+                      </a:r>
+                      <a:endParaRPr lang="de-DE" dirty="0"/>
+                    </a:p>
+                  </a:txBody>
+                  <a:tcPr/>
+                </a:tc>
+                <a:tc>
+                  <a:txBody>
+                    <a:bodyPr/>
+                    <a:lstStyle/>
+                    <a:p>
+                      <a:pPr algn="r"/>
+                      <a:r>
+                        <a:rPr lang="de-DE" dirty="0" smtClean="0"/>
+                        <a:t>8</a:t>
+                      </a:r>
+                      <a:endParaRPr lang="de-DE" dirty="0"/>
+                    </a:p>
+                  </a:txBody>
+                  <a:tcPr/>
+                </a:tc>
+                <a:tc>
+                  <a:txBody>
+                    <a:bodyPr/>
+                    <a:lstStyle/>
+                    <a:p>
+                      <a:pPr algn="r"/>
+                      <a:r>
+                        <a:rPr lang="de-DE" dirty="0" smtClean="0"/>
+                        <a:t>400€</a:t>
+                      </a:r>
+                      <a:endParaRPr lang="de-DE" dirty="0"/>
+                    </a:p>
+                  </a:txBody>
+                  <a:tcPr/>
+                </a:tc>
+              </a:tr>
+              <a:tr h="370840">
+                <a:tc>
+                  <a:txBody>
+                    <a:bodyPr/>
+                    <a:lstStyle/>
+                    <a:p>
+                      <a:r>
+                        <a:rPr lang="de-DE" dirty="0" smtClean="0"/>
+                        <a:t>USB 1,5m</a:t>
+                      </a:r>
+                      <a:endParaRPr lang="de-DE" dirty="0"/>
+                    </a:p>
+                  </a:txBody>
+                  <a:tcPr/>
+                </a:tc>
+                <a:tc>
+                  <a:txBody>
+                    <a:bodyPr/>
+                    <a:lstStyle/>
+                    <a:p>
+                      <a:pPr algn="ctr"/>
+                      <a:r>
+                        <a:rPr lang="de-DE" dirty="0" smtClean="0"/>
+                        <a:t>Kabel</a:t>
+                      </a:r>
+                      <a:endParaRPr lang="de-DE" dirty="0"/>
+                    </a:p>
+                  </a:txBody>
+                  <a:tcPr/>
+                </a:tc>
+                <a:tc>
+                  <a:txBody>
+                    <a:bodyPr/>
+                    <a:lstStyle/>
+                    <a:p>
+                      <a:pPr algn="r"/>
+                      <a:r>
+                        <a:rPr lang="de-DE" dirty="0" smtClean="0"/>
+                        <a:t>150</a:t>
+                      </a:r>
+                      <a:endParaRPr lang="de-DE" dirty="0"/>
+                    </a:p>
+                  </a:txBody>
+                  <a:tcPr/>
+                </a:tc>
+                <a:tc>
+                  <a:txBody>
+                    <a:bodyPr/>
+                    <a:lstStyle/>
+                    <a:p>
+                      <a:pPr algn="r"/>
+                      <a:r>
+                        <a:rPr lang="de-DE" dirty="0" smtClean="0"/>
+                        <a:t>4€</a:t>
+                      </a:r>
+                      <a:endParaRPr lang="de-DE" dirty="0"/>
+                    </a:p>
+                  </a:txBody>
+                  <a:tcPr/>
+                </a:tc>
+              </a:tr>
+              <a:tr h="370840">
+                <a:tc>
+                  <a:txBody>
+                    <a:bodyPr/>
+                    <a:lstStyle/>
+                    <a:p>
+                      <a:r>
+                        <a:rPr lang="de-DE" dirty="0" smtClean="0"/>
+                        <a:t>USB</a:t>
+                      </a:r>
+                      <a:r>
+                        <a:rPr lang="de-DE" baseline="0" dirty="0" smtClean="0"/>
+                        <a:t> 3m</a:t>
+                      </a:r>
+                      <a:endParaRPr lang="de-DE" dirty="0"/>
+                    </a:p>
+                  </a:txBody>
+                  <a:tcPr/>
+                </a:tc>
+                <a:tc>
+                  <a:txBody>
+                    <a:bodyPr/>
+                    <a:lstStyle/>
+                    <a:p>
+                      <a:pPr algn="ctr"/>
+                      <a:r>
+                        <a:rPr lang="de-DE" dirty="0" smtClean="0"/>
+                        <a:t>Kabel</a:t>
+                      </a:r>
+                      <a:endParaRPr lang="de-DE" dirty="0"/>
+                    </a:p>
+                  </a:txBody>
+                  <a:tcPr/>
+                </a:tc>
+                <a:tc>
+                  <a:txBody>
+                    <a:bodyPr/>
+                    <a:lstStyle/>
+                    <a:p>
+                      <a:pPr algn="r"/>
+                      <a:r>
+                        <a:rPr lang="de-DE" dirty="0" smtClean="0"/>
+                        <a:t>35</a:t>
+                      </a:r>
+                      <a:endParaRPr lang="de-DE" dirty="0"/>
+                    </a:p>
+                  </a:txBody>
+                  <a:tcPr/>
+                </a:tc>
+                <a:tc>
+                  <a:txBody>
+                    <a:bodyPr/>
+                    <a:lstStyle/>
+                    <a:p>
+                      <a:pPr algn="r"/>
+                      <a:r>
+                        <a:rPr lang="de-DE" dirty="0" smtClean="0"/>
+                        <a:t>6€</a:t>
+                      </a:r>
+                      <a:endParaRPr lang="de-DE" dirty="0"/>
+                    </a:p>
+                  </a:txBody>
+                  <a:tcPr/>
+                </a:tc>
+              </a:tr>
+            </a:tbl>
+          </a:graphicData>
+        </a:graphic>
+      </p:graphicFrame>
+    </p:spTree>
+    <p:extLst>
+      <p:ext uri="{BB962C8B-B14F-4D97-AF65-F5344CB8AC3E}">
+        <p14:creationId xmlns:p14="http://schemas.microsoft.com/office/powerpoint/2010/main" val="3520691469"/>
+      </p:ext>
+    </p:extLst>
+  </p:cSld>
+  <p:clrMapOvr>
+    <a:masterClrMapping/>
+  </p:clrMapOvr>
+  <p:timing>
+    <p:tnLst>
+      <p:par>
+        <p:cTn id="1" dur="indefinite" restart="never" nodeType="tmRoot"/>
+      </p:par>
+    </p:tnLst>
+  </p:timing>
+</p:sld>
+</file>
+
+<file path=ppt/slides/slide6.xml><?xml version="1.0" encoding="utf-8"?>
+<p:sld xmlns:a="http://schemas.openxmlformats.org/drawingml/2006/main" xmlns:r="http://schemas.openxmlformats.org/officeDocument/2006/relationships" xmlns:p="http://schemas.openxmlformats.org/presentationml/2006/main">
+  <p:cSld>
+    <p:spTree>
+      <p:nvGrpSpPr>
+        <p:cNvPr id="1" name=""/>
+        <p:cNvGrpSpPr/>
+        <p:nvPr/>
+      </p:nvGrpSpPr>
+      <p:grpSpPr>
+        <a:xfrm>
+          <a:off x="0" y="0"/>
+          <a:ext cx="0" cy="0"/>
+          <a:chOff x="0" y="0"/>
+          <a:chExt cx="0" cy="0"/>
+        </a:xfrm>
+      </p:grpSpPr>
+      <p:sp>
+        <p:nvSpPr>
+          <p:cNvPr id="2" name="Titel 1"/>
+          <p:cNvSpPr>
+            <a:spLocks noGrp="1"/>
+          </p:cNvSpPr>
+          <p:nvPr>
+            <p:ph type="title"/>
+          </p:nvPr>
+        </p:nvSpPr>
+        <p:spPr/>
+        <p:txBody>
+          <a:bodyPr/>
+          <a:lstStyle/>
+          <a:p>
+            <a:r>
+              <a:rPr lang="de-DE" dirty="0" smtClean="0"/>
+              <a:t>Ausgabedaten: Nach Produkten aggregierter Bericht pro Produktgruppe</a:t>
+            </a:r>
+            <a:endParaRPr lang="de-DE" dirty="0"/>
+          </a:p>
+        </p:txBody>
+      </p:sp>
+      <p:sp>
+        <p:nvSpPr>
+          <p:cNvPr id="3" name="Inhaltsplatzhalter 2"/>
+          <p:cNvSpPr>
+            <a:spLocks noGrp="1"/>
+          </p:cNvSpPr>
+          <p:nvPr>
+            <p:ph sz="half" idx="1"/>
+          </p:nvPr>
+        </p:nvSpPr>
+        <p:spPr/>
+        <p:txBody>
+          <a:bodyPr/>
+          <a:lstStyle/>
+          <a:p>
+            <a:r>
+              <a:rPr lang="de-DE" dirty="0" smtClean="0"/>
+              <a:t>Bericht für Produktgruppe Fernseher</a:t>
+            </a:r>
+          </a:p>
+          <a:p>
+            <a:pPr marL="0" indent="0">
+              <a:buNone/>
+            </a:pPr>
+            <a:endParaRPr lang="de-DE" dirty="0" smtClean="0"/>
+          </a:p>
+          <a:p>
+            <a:pPr marL="0" indent="0">
+              <a:buNone/>
+            </a:pPr>
+            <a:endParaRPr lang="de-DE" dirty="0"/>
+          </a:p>
+          <a:p>
+            <a:pPr marL="0" indent="0">
+              <a:buNone/>
+            </a:pPr>
+            <a:endParaRPr lang="de-DE" dirty="0" smtClean="0"/>
+          </a:p>
+          <a:p>
+            <a:pPr marL="0" indent="0">
+              <a:buNone/>
+            </a:pPr>
+            <a:endParaRPr lang="de-DE" dirty="0"/>
+          </a:p>
+          <a:p>
+            <a:pPr marL="0" indent="0">
+              <a:buNone/>
+            </a:pPr>
+            <a:endParaRPr lang="de-DE" dirty="0" smtClean="0"/>
+          </a:p>
+          <a:p>
+            <a:pPr marL="0" indent="0">
+              <a:buNone/>
+            </a:pPr>
+            <a:endParaRPr lang="de-DE" dirty="0"/>
+          </a:p>
+          <a:p>
+            <a:r>
+              <a:rPr lang="de-DE" dirty="0" smtClean="0"/>
+              <a:t>Bericht für Produktgruppe Kabel</a:t>
+            </a:r>
+          </a:p>
+        </p:txBody>
+      </p:sp>
+      <p:sp>
+        <p:nvSpPr>
+          <p:cNvPr id="5" name="Inhaltsplatzhalter 4"/>
+          <p:cNvSpPr>
+            <a:spLocks noGrp="1"/>
+          </p:cNvSpPr>
+          <p:nvPr>
+            <p:ph sz="half" idx="2"/>
+          </p:nvPr>
+        </p:nvSpPr>
+        <p:spPr/>
+        <p:txBody>
+          <a:bodyPr/>
+          <a:lstStyle/>
+          <a:p>
+            <a:r>
+              <a:rPr lang="de-DE" dirty="0"/>
+              <a:t>Bericht für Produktgruppe </a:t>
+            </a:r>
+            <a:r>
+              <a:rPr lang="de-DE" dirty="0" smtClean="0"/>
+              <a:t>Smartphones</a:t>
+            </a:r>
+            <a:endParaRPr lang="de-DE" dirty="0"/>
+          </a:p>
+        </p:txBody>
+      </p:sp>
+      <p:graphicFrame>
+        <p:nvGraphicFramePr>
+          <p:cNvPr id="4" name="Tabelle 3"/>
+          <p:cNvGraphicFramePr>
+            <a:graphicFrameLocks noGrp="1"/>
+          </p:cNvGraphicFramePr>
+          <p:nvPr>
+            <p:extLst>
+              <p:ext uri="{D42A27DB-BD31-4B8C-83A1-F6EECF244321}">
+                <p14:modId xmlns:p14="http://schemas.microsoft.com/office/powerpoint/2010/main" val="2898839988"/>
+              </p:ext>
+            </p:extLst>
+          </p:nvPr>
+        </p:nvGraphicFramePr>
+        <p:xfrm>
+          <a:off x="843280" y="1853776"/>
+          <a:ext cx="3579749" cy="1854200"/>
+        </p:xfrm>
+        <a:graphic>
+          <a:graphicData uri="http://schemas.openxmlformats.org/drawingml/2006/table">
+            <a:tbl>
+              <a:tblPr firstRow="1" lastRow="1" bandRow="1">
+                <a:tableStyleId>{93296810-A885-4BE3-A3E7-6D5BEEA58F35}</a:tableStyleId>
+              </a:tblPr>
+              <a:tblGrid>
+                <a:gridCol w="1512189"/>
+                <a:gridCol w="995680"/>
+                <a:gridCol w="1071880"/>
+              </a:tblGrid>
+              <a:tr h="370840">
+                <a:tc>
+                  <a:txBody>
+                    <a:bodyPr/>
+                    <a:lstStyle/>
+                    <a:p>
+                      <a:r>
+                        <a:rPr lang="de-DE" dirty="0" smtClean="0"/>
+                        <a:t>Produkt</a:t>
+                      </a:r>
+                      <a:endParaRPr lang="de-DE" dirty="0"/>
+                    </a:p>
+                  </a:txBody>
+                  <a:tcPr/>
+                </a:tc>
+                <a:tc>
+                  <a:txBody>
+                    <a:bodyPr/>
+                    <a:lstStyle/>
+                    <a:p>
+                      <a:pPr algn="r"/>
+                      <a:r>
+                        <a:rPr lang="de-DE" dirty="0" smtClean="0"/>
+                        <a:t>Anzahl</a:t>
+                      </a:r>
+                      <a:endParaRPr lang="de-DE" dirty="0"/>
+                    </a:p>
+                  </a:txBody>
+                  <a:tcPr/>
+                </a:tc>
+                <a:tc>
+                  <a:txBody>
+                    <a:bodyPr/>
+                    <a:lstStyle/>
+                    <a:p>
+                      <a:pPr algn="r"/>
+                      <a:r>
+                        <a:rPr lang="de-DE" dirty="0" smtClean="0"/>
+                        <a:t>Umsatz</a:t>
+                      </a:r>
+                      <a:endParaRPr lang="de-DE" dirty="0"/>
+                    </a:p>
+                  </a:txBody>
+                  <a:tcPr/>
+                </a:tc>
+              </a:tr>
+              <a:tr h="370840">
+                <a:tc>
+                  <a:txBody>
+                    <a:bodyPr/>
+                    <a:lstStyle/>
+                    <a:p>
+                      <a:pPr marL="0" marR="0" indent="0" algn="l" defTabSz="914400" rtl="0" eaLnBrk="1" fontAlgn="auto" latinLnBrk="0" hangingPunct="1">
+                        <a:lnSpc>
+                          <a:spcPct val="100000"/>
+                        </a:lnSpc>
+                        <a:spcBef>
+                          <a:spcPts val="0"/>
+                        </a:spcBef>
+                        <a:spcAft>
+                          <a:spcPts val="0"/>
+                        </a:spcAft>
+                        <a:buClrTx/>
+                        <a:buSzTx/>
+                        <a:buFontTx/>
+                        <a:buNone/>
+                        <a:tabLst/>
+                        <a:defRPr/>
+                      </a:pPr>
+                      <a:r>
+                        <a:rPr lang="de-DE" dirty="0" smtClean="0"/>
+                        <a:t>KU6519</a:t>
+                      </a:r>
+                    </a:p>
+                  </a:txBody>
+                  <a:tcPr/>
+                </a:tc>
+                <a:tc>
+                  <a:txBody>
+                    <a:bodyPr/>
+                    <a:lstStyle/>
+                    <a:p>
+                      <a:pPr algn="r"/>
+                      <a:r>
+                        <a:rPr lang="de-DE" dirty="0" smtClean="0"/>
+                        <a:t>12</a:t>
+                      </a:r>
+                      <a:endParaRPr lang="de-DE" dirty="0"/>
+                    </a:p>
+                  </a:txBody>
+                  <a:tcPr/>
+                </a:tc>
+                <a:tc>
+                  <a:txBody>
+                    <a:bodyPr/>
+                    <a:lstStyle/>
+                    <a:p>
+                      <a:pPr algn="r"/>
+                      <a:r>
+                        <a:rPr lang="de-DE" dirty="0" smtClean="0"/>
+                        <a:t>10.800€</a:t>
+                      </a:r>
+                      <a:endParaRPr lang="de-DE" dirty="0"/>
+                    </a:p>
+                  </a:txBody>
+                  <a:tcPr/>
+                </a:tc>
+              </a:tr>
+              <a:tr h="370840">
+                <a:tc>
+                  <a:txBody>
+                    <a:bodyPr/>
+                    <a:lstStyle/>
+                    <a:p>
+                      <a:pPr marL="0" marR="0" indent="0" algn="l" defTabSz="914400" rtl="0" eaLnBrk="1" fontAlgn="auto" latinLnBrk="0" hangingPunct="1">
+                        <a:lnSpc>
+                          <a:spcPct val="100000"/>
+                        </a:lnSpc>
+                        <a:spcBef>
+                          <a:spcPts val="0"/>
+                        </a:spcBef>
+                        <a:spcAft>
+                          <a:spcPts val="0"/>
+                        </a:spcAft>
+                        <a:buClrTx/>
+                        <a:buSzTx/>
+                        <a:buFontTx/>
+                        <a:buNone/>
+                        <a:tabLst/>
+                        <a:defRPr/>
+                      </a:pPr>
+                      <a:r>
+                        <a:rPr lang="de-DE" dirty="0" smtClean="0"/>
+                        <a:t>LT-40VF43A</a:t>
+                      </a:r>
+                    </a:p>
+                  </a:txBody>
+                  <a:tcPr/>
+                </a:tc>
+                <a:tc>
+                  <a:txBody>
+                    <a:bodyPr/>
+                    <a:lstStyle/>
+                    <a:p>
+                      <a:pPr algn="r"/>
+                      <a:r>
+                        <a:rPr lang="de-DE" dirty="0" smtClean="0"/>
+                        <a:t>5</a:t>
+                      </a:r>
+                      <a:endParaRPr lang="de-DE" dirty="0"/>
+                    </a:p>
+                  </a:txBody>
+                  <a:tcPr/>
+                </a:tc>
+                <a:tc>
+                  <a:txBody>
+                    <a:bodyPr/>
+                    <a:lstStyle/>
+                    <a:p>
+                      <a:pPr algn="r"/>
+                      <a:r>
+                        <a:rPr lang="de-DE" dirty="0" smtClean="0"/>
+                        <a:t>1.520€</a:t>
+                      </a:r>
+                      <a:endParaRPr lang="de-DE" dirty="0"/>
+                    </a:p>
+                  </a:txBody>
+                  <a:tcPr/>
+                </a:tc>
+              </a:tr>
+              <a:tr h="370840">
+                <a:tc>
+                  <a:txBody>
+                    <a:bodyPr/>
+                    <a:lstStyle/>
+                    <a:p>
+                      <a:pPr marL="0" marR="0" indent="0" algn="l" defTabSz="914400" rtl="0" eaLnBrk="1" fontAlgn="auto" latinLnBrk="0" hangingPunct="1">
+                        <a:lnSpc>
+                          <a:spcPct val="100000"/>
+                        </a:lnSpc>
+                        <a:spcBef>
+                          <a:spcPts val="0"/>
+                        </a:spcBef>
+                        <a:spcAft>
+                          <a:spcPts val="0"/>
+                        </a:spcAft>
+                        <a:buClrTx/>
+                        <a:buSzTx/>
+                        <a:buFontTx/>
+                        <a:buNone/>
+                        <a:tabLst/>
+                        <a:defRPr/>
+                      </a:pPr>
+                      <a:r>
+                        <a:rPr lang="de-DE" dirty="0" smtClean="0"/>
+                        <a:t>J6289</a:t>
+                      </a:r>
+                    </a:p>
+                  </a:txBody>
+                  <a:tcPr/>
+                </a:tc>
+                <a:tc>
+                  <a:txBody>
+                    <a:bodyPr/>
+                    <a:lstStyle/>
+                    <a:p>
+                      <a:pPr algn="r"/>
+                      <a:r>
+                        <a:rPr lang="de-DE" dirty="0" smtClean="0"/>
+                        <a:t>8</a:t>
+                      </a:r>
+                      <a:endParaRPr lang="de-DE" dirty="0"/>
+                    </a:p>
+                  </a:txBody>
+                  <a:tcPr/>
+                </a:tc>
+                <a:tc>
+                  <a:txBody>
+                    <a:bodyPr/>
+                    <a:lstStyle/>
+                    <a:p>
+                      <a:pPr algn="r"/>
+                      <a:r>
+                        <a:rPr lang="de-DE" dirty="0" smtClean="0"/>
+                        <a:t>3.200€</a:t>
+                      </a:r>
+                      <a:endParaRPr lang="de-DE" dirty="0"/>
+                    </a:p>
+                  </a:txBody>
+                  <a:tcPr/>
+                </a:tc>
+              </a:tr>
+              <a:tr h="370840">
+                <a:tc>
+                  <a:txBody>
+                    <a:bodyPr/>
+                    <a:lstStyle/>
+                    <a:p>
+                      <a:r>
+                        <a:rPr lang="de-DE" dirty="0" smtClean="0"/>
+                        <a:t>Summe</a:t>
+                      </a:r>
+                      <a:endParaRPr lang="de-DE" dirty="0"/>
+                    </a:p>
+                  </a:txBody>
+                  <a:tcPr/>
+                </a:tc>
+                <a:tc>
+                  <a:txBody>
+                    <a:bodyPr/>
+                    <a:lstStyle/>
+                    <a:p>
+                      <a:pPr algn="r"/>
+                      <a:r>
+                        <a:rPr lang="de-DE" dirty="0" smtClean="0"/>
+                        <a:t>25</a:t>
+                      </a:r>
+                      <a:endParaRPr lang="de-DE" dirty="0"/>
+                    </a:p>
+                  </a:txBody>
+                  <a:tcPr/>
+                </a:tc>
+                <a:tc>
+                  <a:txBody>
+                    <a:bodyPr/>
+                    <a:lstStyle/>
+                    <a:p>
+                      <a:pPr algn="r"/>
+                      <a:r>
+                        <a:rPr lang="de-DE" dirty="0" smtClean="0"/>
+                        <a:t>15.520€</a:t>
+                      </a:r>
+                      <a:endParaRPr lang="de-DE" dirty="0"/>
+                    </a:p>
+                  </a:txBody>
+                  <a:tcPr/>
+                </a:tc>
+              </a:tr>
+            </a:tbl>
+          </a:graphicData>
+        </a:graphic>
+      </p:graphicFrame>
+      <p:graphicFrame>
+        <p:nvGraphicFramePr>
+          <p:cNvPr id="6" name="Tabelle 5"/>
+          <p:cNvGraphicFramePr>
+            <a:graphicFrameLocks noGrp="1"/>
+          </p:cNvGraphicFramePr>
+          <p:nvPr>
+            <p:extLst>
+              <p:ext uri="{D42A27DB-BD31-4B8C-83A1-F6EECF244321}">
+                <p14:modId xmlns:p14="http://schemas.microsoft.com/office/powerpoint/2010/main" val="1396789501"/>
+              </p:ext>
+            </p:extLst>
+          </p:nvPr>
+        </p:nvGraphicFramePr>
+        <p:xfrm>
+          <a:off x="6516370" y="1853776"/>
+          <a:ext cx="3579749" cy="1854200"/>
+        </p:xfrm>
+        <a:graphic>
+          <a:graphicData uri="http://schemas.openxmlformats.org/drawingml/2006/table">
+            <a:tbl>
+              <a:tblPr firstRow="1" lastRow="1" bandRow="1">
+                <a:tableStyleId>{93296810-A885-4BE3-A3E7-6D5BEEA58F35}</a:tableStyleId>
+              </a:tblPr>
+              <a:tblGrid>
+                <a:gridCol w="1512189"/>
+                <a:gridCol w="995680"/>
+                <a:gridCol w="1071880"/>
+              </a:tblGrid>
+              <a:tr h="370840">
+                <a:tc>
+                  <a:txBody>
+                    <a:bodyPr/>
+                    <a:lstStyle/>
+                    <a:p>
+                      <a:r>
+                        <a:rPr lang="de-DE" dirty="0" smtClean="0"/>
+                        <a:t>Produkt</a:t>
+                      </a:r>
+                      <a:endParaRPr lang="de-DE" dirty="0"/>
+                    </a:p>
+                  </a:txBody>
+                  <a:tcPr/>
+                </a:tc>
+                <a:tc>
+                  <a:txBody>
+                    <a:bodyPr/>
+                    <a:lstStyle/>
+                    <a:p>
+                      <a:pPr algn="r"/>
+                      <a:r>
+                        <a:rPr lang="de-DE" smtClean="0"/>
+                        <a:t>Anzahl</a:t>
+                      </a:r>
+                      <a:endParaRPr lang="de-DE" dirty="0"/>
+                    </a:p>
+                  </a:txBody>
+                  <a:tcPr/>
+                </a:tc>
+                <a:tc>
+                  <a:txBody>
+                    <a:bodyPr/>
+                    <a:lstStyle/>
+                    <a:p>
+                      <a:pPr algn="r"/>
+                      <a:r>
+                        <a:rPr lang="de-DE" smtClean="0"/>
+                        <a:t>Umsatz</a:t>
+                      </a:r>
+                      <a:endParaRPr lang="de-DE" dirty="0"/>
+                    </a:p>
+                  </a:txBody>
+                  <a:tcPr/>
+                </a:tc>
+              </a:tr>
+              <a:tr h="370840">
+                <a:tc>
+                  <a:txBody>
+                    <a:bodyPr/>
+                    <a:lstStyle/>
+                    <a:p>
+                      <a:r>
+                        <a:rPr lang="de-DE" dirty="0" err="1" smtClean="0"/>
+                        <a:t>Galaxy</a:t>
+                      </a:r>
+                      <a:r>
+                        <a:rPr lang="de-DE" dirty="0" smtClean="0"/>
+                        <a:t> J3</a:t>
+                      </a:r>
+                      <a:endParaRPr lang="de-DE" dirty="0"/>
+                    </a:p>
+                  </a:txBody>
+                  <a:tcPr/>
+                </a:tc>
+                <a:tc>
+                  <a:txBody>
+                    <a:bodyPr/>
+                    <a:lstStyle/>
+                    <a:p>
+                      <a:pPr algn="r"/>
+                      <a:r>
+                        <a:rPr lang="de-DE" dirty="0" smtClean="0"/>
+                        <a:t>5</a:t>
+                      </a:r>
+                      <a:endParaRPr lang="de-DE" dirty="0"/>
+                    </a:p>
+                  </a:txBody>
+                  <a:tcPr/>
+                </a:tc>
+                <a:tc>
+                  <a:txBody>
+                    <a:bodyPr/>
+                    <a:lstStyle/>
+                    <a:p>
+                      <a:pPr algn="r"/>
+                      <a:r>
+                        <a:rPr lang="de-DE" dirty="0" smtClean="0"/>
+                        <a:t>750€</a:t>
+                      </a:r>
+                      <a:endParaRPr lang="de-DE" dirty="0"/>
+                    </a:p>
+                  </a:txBody>
+                  <a:tcPr/>
+                </a:tc>
+              </a:tr>
+              <a:tr h="370840">
+                <a:tc>
+                  <a:txBody>
+                    <a:bodyPr/>
+                    <a:lstStyle/>
+                    <a:p>
+                      <a:r>
+                        <a:rPr lang="de-DE" dirty="0" err="1" smtClean="0"/>
+                        <a:t>Xperia</a:t>
+                      </a:r>
+                      <a:r>
+                        <a:rPr lang="de-DE" dirty="0" smtClean="0"/>
+                        <a:t> E5</a:t>
+                      </a:r>
+                      <a:endParaRPr lang="de-DE" dirty="0"/>
+                    </a:p>
+                  </a:txBody>
+                  <a:tcPr/>
+                </a:tc>
+                <a:tc>
+                  <a:txBody>
+                    <a:bodyPr/>
+                    <a:lstStyle/>
+                    <a:p>
+                      <a:pPr algn="r"/>
+                      <a:r>
+                        <a:rPr lang="de-DE" dirty="0" smtClean="0"/>
+                        <a:t>5</a:t>
+                      </a:r>
+                      <a:endParaRPr lang="de-DE" dirty="0"/>
+                    </a:p>
+                  </a:txBody>
+                  <a:tcPr/>
+                </a:tc>
+                <a:tc>
+                  <a:txBody>
+                    <a:bodyPr/>
+                    <a:lstStyle/>
+                    <a:p>
+                      <a:pPr algn="r"/>
+                      <a:r>
+                        <a:rPr lang="de-DE" dirty="0" smtClean="0"/>
+                        <a:t>680€</a:t>
+                      </a:r>
+                      <a:endParaRPr lang="de-DE" dirty="0"/>
+                    </a:p>
+                  </a:txBody>
+                  <a:tcPr/>
+                </a:tc>
+              </a:tr>
+              <a:tr h="370840">
+                <a:tc>
+                  <a:txBody>
+                    <a:bodyPr/>
+                    <a:lstStyle/>
+                    <a:p>
+                      <a:r>
+                        <a:rPr lang="de-DE" dirty="0" smtClean="0"/>
+                        <a:t>Moto G4</a:t>
+                      </a:r>
+                      <a:endParaRPr lang="de-DE" dirty="0"/>
+                    </a:p>
+                  </a:txBody>
+                  <a:tcPr/>
+                </a:tc>
+                <a:tc>
+                  <a:txBody>
+                    <a:bodyPr/>
+                    <a:lstStyle/>
+                    <a:p>
+                      <a:pPr algn="r"/>
+                      <a:r>
+                        <a:rPr lang="de-DE" dirty="0" smtClean="0"/>
+                        <a:t>7</a:t>
+                      </a:r>
+                      <a:endParaRPr lang="de-DE" dirty="0"/>
+                    </a:p>
+                  </a:txBody>
+                  <a:tcPr/>
+                </a:tc>
+                <a:tc>
+                  <a:txBody>
+                    <a:bodyPr/>
+                    <a:lstStyle/>
+                    <a:p>
+                      <a:pPr algn="r"/>
+                      <a:r>
+                        <a:rPr lang="de-DE" dirty="0" smtClean="0"/>
+                        <a:t>1.120€</a:t>
+                      </a:r>
+                      <a:endParaRPr lang="de-DE" dirty="0"/>
+                    </a:p>
+                  </a:txBody>
+                  <a:tcPr/>
+                </a:tc>
+              </a:tr>
+              <a:tr h="370840">
+                <a:tc>
+                  <a:txBody>
+                    <a:bodyPr/>
+                    <a:lstStyle/>
+                    <a:p>
+                      <a:r>
+                        <a:rPr lang="de-DE" dirty="0" smtClean="0"/>
+                        <a:t>Summe</a:t>
+                      </a:r>
+                      <a:endParaRPr lang="de-DE" dirty="0"/>
+                    </a:p>
+                  </a:txBody>
+                  <a:tcPr/>
+                </a:tc>
+                <a:tc>
+                  <a:txBody>
+                    <a:bodyPr/>
+                    <a:lstStyle/>
+                    <a:p>
+                      <a:pPr algn="r"/>
+                      <a:r>
+                        <a:rPr lang="de-DE" dirty="0" smtClean="0"/>
+                        <a:t>17</a:t>
+                      </a:r>
+                      <a:endParaRPr lang="de-DE" dirty="0"/>
+                    </a:p>
+                  </a:txBody>
+                  <a:tcPr/>
+                </a:tc>
+                <a:tc>
+                  <a:txBody>
+                    <a:bodyPr/>
+                    <a:lstStyle/>
+                    <a:p>
+                      <a:pPr algn="r"/>
+                      <a:r>
+                        <a:rPr lang="de-DE" dirty="0" smtClean="0"/>
+                        <a:t>2.550€</a:t>
+                      </a:r>
+                      <a:endParaRPr lang="de-DE" dirty="0"/>
+                    </a:p>
+                  </a:txBody>
+                  <a:tcPr/>
+                </a:tc>
+              </a:tr>
+            </a:tbl>
+          </a:graphicData>
+        </a:graphic>
+      </p:graphicFrame>
+      <p:graphicFrame>
+        <p:nvGraphicFramePr>
+          <p:cNvPr id="7" name="Tabelle 6"/>
+          <p:cNvGraphicFramePr>
+            <a:graphicFrameLocks noGrp="1"/>
+          </p:cNvGraphicFramePr>
+          <p:nvPr>
+            <p:extLst>
+              <p:ext uri="{D42A27DB-BD31-4B8C-83A1-F6EECF244321}">
+                <p14:modId xmlns:p14="http://schemas.microsoft.com/office/powerpoint/2010/main" val="2544465875"/>
+              </p:ext>
+            </p:extLst>
+          </p:nvPr>
+        </p:nvGraphicFramePr>
+        <p:xfrm>
+          <a:off x="843280" y="4280746"/>
+          <a:ext cx="3579749" cy="1483360"/>
+        </p:xfrm>
+        <a:graphic>
+          <a:graphicData uri="http://schemas.openxmlformats.org/drawingml/2006/table">
+            <a:tbl>
+              <a:tblPr firstRow="1" lastRow="1" bandRow="1">
+                <a:tableStyleId>{93296810-A885-4BE3-A3E7-6D5BEEA58F35}</a:tableStyleId>
+              </a:tblPr>
+              <a:tblGrid>
+                <a:gridCol w="1512189"/>
+                <a:gridCol w="995680"/>
+                <a:gridCol w="1071880"/>
+              </a:tblGrid>
+              <a:tr h="370840">
+                <a:tc>
+                  <a:txBody>
+                    <a:bodyPr/>
+                    <a:lstStyle/>
+                    <a:p>
+                      <a:r>
+                        <a:rPr lang="de-DE" dirty="0" smtClean="0"/>
+                        <a:t>Produkt</a:t>
+                      </a:r>
+                      <a:endParaRPr lang="de-DE" dirty="0"/>
+                    </a:p>
+                  </a:txBody>
+                  <a:tcPr/>
+                </a:tc>
+                <a:tc>
+                  <a:txBody>
+                    <a:bodyPr/>
+                    <a:lstStyle/>
+                    <a:p>
+                      <a:pPr algn="r"/>
+                      <a:r>
+                        <a:rPr lang="de-DE" smtClean="0"/>
+                        <a:t>Anzahl</a:t>
+                      </a:r>
+                      <a:endParaRPr lang="de-DE" dirty="0"/>
+                    </a:p>
+                  </a:txBody>
+                  <a:tcPr/>
+                </a:tc>
+                <a:tc>
+                  <a:txBody>
+                    <a:bodyPr/>
+                    <a:lstStyle/>
+                    <a:p>
+                      <a:pPr algn="r"/>
+                      <a:r>
+                        <a:rPr lang="de-DE" smtClean="0"/>
+                        <a:t>Umsatz</a:t>
+                      </a:r>
+                      <a:endParaRPr lang="de-DE" dirty="0"/>
+                    </a:p>
+                  </a:txBody>
+                  <a:tcPr/>
+                </a:tc>
+              </a:tr>
+              <a:tr h="370840">
+                <a:tc>
+                  <a:txBody>
+                    <a:bodyPr/>
+                    <a:lstStyle/>
+                    <a:p>
+                      <a:r>
+                        <a:rPr lang="de-DE" dirty="0" smtClean="0"/>
+                        <a:t>USB</a:t>
+                      </a:r>
+                      <a:r>
+                        <a:rPr lang="de-DE" baseline="0" dirty="0" smtClean="0"/>
+                        <a:t> 1,5m</a:t>
+                      </a:r>
+                      <a:endParaRPr lang="de-DE" dirty="0"/>
+                    </a:p>
+                  </a:txBody>
+                  <a:tcPr/>
+                </a:tc>
+                <a:tc>
+                  <a:txBody>
+                    <a:bodyPr/>
+                    <a:lstStyle/>
+                    <a:p>
+                      <a:pPr algn="r"/>
+                      <a:r>
+                        <a:rPr lang="de-DE" dirty="0" smtClean="0"/>
+                        <a:t>350</a:t>
+                      </a:r>
+                      <a:endParaRPr lang="de-DE" dirty="0"/>
+                    </a:p>
+                  </a:txBody>
+                  <a:tcPr/>
+                </a:tc>
+                <a:tc>
+                  <a:txBody>
+                    <a:bodyPr/>
+                    <a:lstStyle/>
+                    <a:p>
+                      <a:pPr algn="r"/>
+                      <a:r>
+                        <a:rPr lang="de-DE" dirty="0" smtClean="0"/>
+                        <a:t>1.600€</a:t>
+                      </a:r>
+                      <a:endParaRPr lang="de-DE" dirty="0"/>
+                    </a:p>
+                  </a:txBody>
+                  <a:tcPr/>
+                </a:tc>
+              </a:tr>
+              <a:tr h="370840">
+                <a:tc>
+                  <a:txBody>
+                    <a:bodyPr/>
+                    <a:lstStyle/>
+                    <a:p>
+                      <a:r>
+                        <a:rPr lang="de-DE" dirty="0" smtClean="0"/>
+                        <a:t>USB</a:t>
+                      </a:r>
+                      <a:r>
+                        <a:rPr lang="de-DE" baseline="0" dirty="0" smtClean="0"/>
+                        <a:t> 3m</a:t>
+                      </a:r>
+                      <a:endParaRPr lang="de-DE" dirty="0"/>
+                    </a:p>
+                  </a:txBody>
+                  <a:tcPr/>
+                </a:tc>
+                <a:tc>
+                  <a:txBody>
+                    <a:bodyPr/>
+                    <a:lstStyle/>
+                    <a:p>
+                      <a:pPr algn="r"/>
+                      <a:r>
+                        <a:rPr lang="de-DE" dirty="0" smtClean="0"/>
+                        <a:t>35</a:t>
+                      </a:r>
+                      <a:endParaRPr lang="de-DE" dirty="0"/>
+                    </a:p>
+                  </a:txBody>
+                  <a:tcPr/>
+                </a:tc>
+                <a:tc>
+                  <a:txBody>
+                    <a:bodyPr/>
+                    <a:lstStyle/>
+                    <a:p>
+                      <a:pPr algn="r"/>
+                      <a:r>
+                        <a:rPr lang="de-DE" dirty="0" smtClean="0"/>
+                        <a:t>210€</a:t>
+                      </a:r>
+                      <a:endParaRPr lang="de-DE" dirty="0"/>
+                    </a:p>
+                  </a:txBody>
+                  <a:tcPr/>
+                </a:tc>
+              </a:tr>
+              <a:tr h="370840">
+                <a:tc>
+                  <a:txBody>
+                    <a:bodyPr/>
+                    <a:lstStyle/>
+                    <a:p>
+                      <a:r>
+                        <a:rPr lang="de-DE" dirty="0" smtClean="0"/>
+                        <a:t>Summe</a:t>
+                      </a:r>
+                      <a:endParaRPr lang="de-DE" dirty="0"/>
+                    </a:p>
+                  </a:txBody>
+                  <a:tcPr/>
+                </a:tc>
+                <a:tc>
+                  <a:txBody>
+                    <a:bodyPr/>
+                    <a:lstStyle/>
+                    <a:p>
+                      <a:pPr algn="r"/>
+                      <a:r>
+                        <a:rPr lang="de-DE" dirty="0" smtClean="0"/>
+                        <a:t>385</a:t>
+                      </a:r>
+                      <a:endParaRPr lang="de-DE" dirty="0"/>
+                    </a:p>
+                  </a:txBody>
+                  <a:tcPr/>
+                </a:tc>
+                <a:tc>
+                  <a:txBody>
+                    <a:bodyPr/>
+                    <a:lstStyle/>
+                    <a:p>
+                      <a:pPr algn="r"/>
+                      <a:r>
+                        <a:rPr lang="de-DE" dirty="0" smtClean="0"/>
+                        <a:t>1.810€</a:t>
+                      </a:r>
+                      <a:endParaRPr lang="de-DE" dirty="0"/>
+                    </a:p>
+                  </a:txBody>
+                  <a:tcPr/>
+                </a:tc>
+              </a:tr>
+            </a:tbl>
+          </a:graphicData>
+        </a:graphic>
+      </p:graphicFrame>
+    </p:spTree>
+    <p:extLst>
+      <p:ext uri="{BB962C8B-B14F-4D97-AF65-F5344CB8AC3E}">
+        <p14:creationId xmlns:p14="http://schemas.microsoft.com/office/powerpoint/2010/main" val="1897376976"/>
+      </p:ext>
+    </p:extLst>
+  </p:cSld>
+  <p:clrMapOvr>
+    <a:masterClrMapping/>
+  </p:clrMapOvr>
+  <p:timing>
+    <p:tnLst>
+      <p:par>
+        <p:cTn id="1" dur="indefinite" restart="never" nodeType="tmRoot"/>
+      </p:par>
+    </p:tnLst>
+  </p:timing>
+</p:sld>
+</file>
+
+<file path=ppt/slides/slide7.xml><?xml version="1.0" encoding="utf-8"?>
+<p:sld xmlns:a="http://schemas.openxmlformats.org/drawingml/2006/main" xmlns:r="http://schemas.openxmlformats.org/officeDocument/2006/relationships" xmlns:p="http://schemas.openxmlformats.org/presentationml/2006/main">
+  <p:cSld>
+    <p:spTree>
+      <p:nvGrpSpPr>
+        <p:cNvPr id="1" name=""/>
+        <p:cNvGrpSpPr/>
+        <p:nvPr/>
+      </p:nvGrpSpPr>
+      <p:grpSpPr>
+        <a:xfrm>
+          <a:off x="0" y="0"/>
+          <a:ext cx="0" cy="0"/>
+          <a:chOff x="0" y="0"/>
+          <a:chExt cx="0" cy="0"/>
+        </a:xfrm>
+      </p:grpSpPr>
+      <p:sp>
+        <p:nvSpPr>
+          <p:cNvPr id="2" name="Titel 1"/>
+          <p:cNvSpPr>
+            <a:spLocks noGrp="1"/>
+          </p:cNvSpPr>
+          <p:nvPr>
+            <p:ph type="title"/>
+          </p:nvPr>
+        </p:nvSpPr>
+        <p:spPr/>
+        <p:txBody>
+          <a:bodyPr/>
+          <a:lstStyle/>
+          <a:p>
+            <a:r>
+              <a:rPr lang="de-DE" dirty="0" smtClean="0"/>
+              <a:t>Beispiele für Funktionen höherer Ordnung, die Spark unterstützt</a:t>
+            </a:r>
+            <a:endParaRPr lang="de-DE" dirty="0"/>
+          </a:p>
+        </p:txBody>
+      </p:sp>
+      <p:sp>
+        <p:nvSpPr>
+          <p:cNvPr id="3" name="Inhaltsplatzhalter 2"/>
+          <p:cNvSpPr>
+            <a:spLocks noGrp="1"/>
+          </p:cNvSpPr>
+          <p:nvPr>
+            <p:ph sz="half" idx="1"/>
+          </p:nvPr>
+        </p:nvSpPr>
+        <p:spPr/>
+        <p:txBody>
+          <a:bodyPr/>
+          <a:lstStyle/>
+          <a:p>
+            <a:r>
+              <a:rPr lang="de-DE" dirty="0" err="1" smtClean="0"/>
+              <a:t>map</a:t>
+            </a:r>
+            <a:endParaRPr lang="de-DE" dirty="0" smtClean="0"/>
+          </a:p>
+          <a:p>
+            <a:r>
+              <a:rPr lang="de-DE" dirty="0" err="1" smtClean="0"/>
+              <a:t>filter</a:t>
+            </a:r>
+            <a:endParaRPr lang="de-DE" dirty="0" smtClean="0"/>
+          </a:p>
+          <a:p>
+            <a:r>
+              <a:rPr lang="de-DE" dirty="0" err="1" smtClean="0"/>
+              <a:t>flatMap</a:t>
+            </a:r>
+            <a:endParaRPr lang="de-DE" dirty="0" smtClean="0"/>
+          </a:p>
+          <a:p>
+            <a:r>
+              <a:rPr lang="de-DE" dirty="0" err="1" smtClean="0"/>
+              <a:t>mapPartitions</a:t>
+            </a:r>
+            <a:endParaRPr lang="de-DE" dirty="0" smtClean="0"/>
+          </a:p>
+          <a:p>
+            <a:r>
+              <a:rPr lang="de-DE" dirty="0" err="1" smtClean="0"/>
+              <a:t>reduce</a:t>
+            </a:r>
+            <a:endParaRPr lang="de-DE" dirty="0" smtClean="0"/>
+          </a:p>
+          <a:p>
+            <a:r>
+              <a:rPr lang="de-DE" dirty="0" err="1" smtClean="0"/>
+              <a:t>reduceByKey</a:t>
+            </a:r>
+            <a:r>
+              <a:rPr lang="de-DE" dirty="0" smtClean="0"/>
+              <a:t> / </a:t>
+            </a:r>
+            <a:r>
+              <a:rPr lang="de-DE" dirty="0" err="1" smtClean="0"/>
+              <a:t>aggregateByKey</a:t>
+            </a:r>
+            <a:endParaRPr lang="de-DE" dirty="0" smtClean="0"/>
+          </a:p>
+          <a:p>
+            <a:endParaRPr lang="de-DE" dirty="0"/>
+          </a:p>
+        </p:txBody>
+      </p:sp>
+      <p:sp>
+        <p:nvSpPr>
+          <p:cNvPr id="4" name="Inhaltsplatzhalter 3"/>
+          <p:cNvSpPr>
+            <a:spLocks noGrp="1"/>
+          </p:cNvSpPr>
+          <p:nvPr>
+            <p:ph sz="half" idx="2"/>
+          </p:nvPr>
+        </p:nvSpPr>
+        <p:spPr/>
+        <p:txBody>
+          <a:bodyPr/>
+          <a:lstStyle/>
+          <a:p>
+            <a:pPr marL="0" indent="0">
+              <a:buNone/>
+            </a:pPr>
+            <a:r>
+              <a:rPr lang="de-DE" dirty="0" smtClean="0"/>
+              <a:t>Anwendung auf das Beispiel</a:t>
+            </a:r>
+            <a:endParaRPr lang="de-DE" dirty="0"/>
+          </a:p>
+        </p:txBody>
+      </p:sp>
+    </p:spTree>
+    <p:extLst>
+      <p:ext uri="{BB962C8B-B14F-4D97-AF65-F5344CB8AC3E}">
+        <p14:creationId xmlns:p14="http://schemas.microsoft.com/office/powerpoint/2010/main" val="3964364665"/>
+      </p:ext>
+    </p:extLst>
+  </p:cSld>
+  <p:clrMapOvr>
+    <a:masterClrMapping/>
+  </p:clrMapOvr>
+  <p:timing>
+    <p:tnLst>
+      <p:par>
+        <p:cTn id="1" dur="indefinite" restart="never" nodeType="tmRoot"/>
+      </p:par>
+    </p:tnLst>
+  </p:timing>
+</p:sld>
+</file>
+
+<file path=ppt/slides/slide8.xml><?xml version="1.0" encoding="utf-8"?>
+<p:sld xmlns:a="http://schemas.openxmlformats.org/drawingml/2006/main" xmlns:r="http://schemas.openxmlformats.org/officeDocument/2006/relationships" xmlns:p="http://schemas.openxmlformats.org/presentationml/2006/main">
+  <p:cSld>
+    <p:spTree>
+      <p:nvGrpSpPr>
+        <p:cNvPr id="1" name=""/>
+        <p:cNvGrpSpPr/>
+        <p:nvPr/>
+      </p:nvGrpSpPr>
+      <p:grpSpPr>
+        <a:xfrm>
+          <a:off x="0" y="0"/>
+          <a:ext cx="0" cy="0"/>
+          <a:chOff x="0" y="0"/>
+          <a:chExt cx="0" cy="0"/>
+        </a:xfrm>
+      </p:grpSpPr>
+      <p:pic>
+        <p:nvPicPr>
+          <p:cNvPr id="4" name="Inhaltsplatzhalter 3"/>
+          <p:cNvPicPr>
+            <a:picLocks noGrp="1" noChangeAspect="1"/>
+          </p:cNvPicPr>
+          <p:nvPr>
+            <p:ph idx="1"/>
+          </p:nvPr>
+        </p:nvPicPr>
+        <p:blipFill>
+          <a:blip r:embed="rId2">
+            <a:extLst>
+              <a:ext uri="{28A0092B-C50C-407E-A947-70E740481C1C}">
+                <a14:useLocalDpi xmlns:a14="http://schemas.microsoft.com/office/drawing/2010/main" val="0"/>
+              </a:ext>
+            </a:extLst>
+          </a:blip>
+          <a:stretch>
+            <a:fillRect/>
+          </a:stretch>
+        </p:blipFill>
+        <p:spPr>
+          <a:xfrm>
+            <a:off x="2663031" y="1947069"/>
+            <a:ext cx="6791325" cy="3333750"/>
+          </a:xfrm>
+        </p:spPr>
+      </p:pic>
+      <p:sp>
+        <p:nvSpPr>
+          <p:cNvPr id="3" name="Titel 2"/>
+          <p:cNvSpPr>
+            <a:spLocks noGrp="1"/>
+          </p:cNvSpPr>
+          <p:nvPr>
+            <p:ph type="title"/>
+          </p:nvPr>
+        </p:nvSpPr>
+        <p:spPr/>
+        <p:txBody>
+          <a:bodyPr/>
+          <a:lstStyle/>
+          <a:p>
+            <a:r>
+              <a:rPr lang="de-DE" dirty="0" smtClean="0"/>
+              <a:t>Enterprise – Was heißt das eigentlich?</a:t>
+            </a:r>
+            <a:endParaRPr lang="en-US" dirty="0"/>
+          </a:p>
+        </p:txBody>
+      </p:sp>
+    </p:spTree>
+    <p:extLst>
+      <p:ext uri="{BB962C8B-B14F-4D97-AF65-F5344CB8AC3E}">
+        <p14:creationId xmlns:p14="http://schemas.microsoft.com/office/powerpoint/2010/main" val="1636183931"/>
+      </p:ext>
+    </p:extLst>
+  </p:cSld>
+  <p:clrMapOvr>
+    <a:masterClrMapping/>
+  </p:clrMapOvr>
+  <p:timing>
+    <p:tnLst>
+      <p:par>
+        <p:cTn id="1" dur="indefinite" restart="never" nodeType="tmRoot"/>
+      </p:par>
+    </p:tnLst>
+  </p:timing>
+</p:sld>
+</file>
+
+<file path=ppt/slides/slide9.xml><?xml version="1.0" encoding="utf-8"?>
+<p:sld xmlns:a="http://schemas.openxmlformats.org/drawingml/2006/main" xmlns:r="http://schemas.openxmlformats.org/officeDocument/2006/relationships" xmlns:p="http://schemas.openxmlformats.org/presentationml/2006/main">
+  <p:cSld>
+    <p:spTree>
+      <p:nvGrpSpPr>
+        <p:cNvPr id="1" name=""/>
+        <p:cNvGrpSpPr/>
+        <p:nvPr/>
+      </p:nvGrpSpPr>
+      <p:grpSpPr>
+        <a:xfrm>
+          <a:off x="0" y="0"/>
+          <a:ext cx="0" cy="0"/>
+          <a:chOff x="0" y="0"/>
+          <a:chExt cx="0" cy="0"/>
+        </a:xfrm>
+      </p:grpSpPr>
+      <p:sp>
+        <p:nvSpPr>
+          <p:cNvPr id="2" name="Inhaltsplatzhalter 1"/>
+          <p:cNvSpPr>
+            <a:spLocks noGrp="1"/>
+          </p:cNvSpPr>
+          <p:nvPr>
+            <p:ph idx="1"/>
+          </p:nvPr>
+        </p:nvSpPr>
+        <p:spPr/>
+        <p:txBody>
+          <a:bodyPr/>
+          <a:lstStyle/>
+          <a:p>
+            <a:r>
+              <a:rPr lang="de-DE" dirty="0" smtClean="0"/>
+              <a:t>Stabilität</a:t>
+            </a:r>
+          </a:p>
+          <a:p>
+            <a:r>
+              <a:rPr lang="de-DE" dirty="0" smtClean="0"/>
+              <a:t>Zuverlässigkeit</a:t>
+            </a:r>
+          </a:p>
+          <a:p>
+            <a:r>
+              <a:rPr lang="de-DE" dirty="0" smtClean="0"/>
+              <a:t>Reproduzierbarkeit</a:t>
+            </a:r>
+          </a:p>
+          <a:p>
+            <a:r>
+              <a:rPr lang="de-DE" dirty="0" smtClean="0"/>
+              <a:t>Audit-Fähigkeit</a:t>
+            </a:r>
+          </a:p>
+          <a:p>
+            <a:r>
+              <a:rPr lang="de-DE" dirty="0" smtClean="0"/>
+              <a:t>Professioneller Support</a:t>
+            </a:r>
+          </a:p>
+          <a:p>
+            <a:r>
+              <a:rPr lang="de-DE" dirty="0" smtClean="0"/>
+              <a:t>Einfachheit</a:t>
+            </a:r>
+          </a:p>
+          <a:p>
+            <a:r>
+              <a:rPr lang="de-DE" dirty="0" smtClean="0"/>
+              <a:t>Betreibbarkeit</a:t>
+            </a:r>
+          </a:p>
+          <a:p>
+            <a:r>
+              <a:rPr lang="de-DE" dirty="0" smtClean="0"/>
+              <a:t>Framework</a:t>
+            </a:r>
+          </a:p>
+          <a:p>
+            <a:r>
+              <a:rPr lang="de-DE" dirty="0" smtClean="0"/>
+              <a:t>Modularisierung</a:t>
+            </a:r>
+            <a:endParaRPr lang="en-US" dirty="0"/>
+          </a:p>
+        </p:txBody>
+      </p:sp>
+      <p:sp>
+        <p:nvSpPr>
+          <p:cNvPr id="3" name="Titel 2"/>
+          <p:cNvSpPr>
+            <a:spLocks noGrp="1"/>
+          </p:cNvSpPr>
+          <p:nvPr>
+            <p:ph type="title"/>
+          </p:nvPr>
+        </p:nvSpPr>
+        <p:spPr/>
+        <p:txBody>
+          <a:bodyPr/>
+          <a:lstStyle/>
+          <a:p>
+            <a:r>
+              <a:rPr lang="de-DE" dirty="0" smtClean="0"/>
+              <a:t>Zusammenfassung</a:t>
+            </a:r>
+            <a:endParaRPr lang="en-US" dirty="0"/>
+          </a:p>
+        </p:txBody>
+      </p:sp>
+    </p:spTree>
+    <p:extLst>
+      <p:ext uri="{BB962C8B-B14F-4D97-AF65-F5344CB8AC3E}">
+        <p14:creationId xmlns:p14="http://schemas.microsoft.com/office/powerpoint/2010/main" val="325110386"/>
+      </p:ext>
+    </p:extLst>
+  </p:cSld>
+  <p:clrMapOvr>
+    <a:masterClrMapping/>
+  </p:clrMapOvr>
+  <p:timing>
+    <p:tnLst>
+      <p:par>
+        <p:cTn id="1" dur="indefinite" restart="never" nodeType="tmRoot"/>
+      </p:par>
+    </p:tnLst>
+  </p:timing>
 </p:sld>
 </file>
 

</xml_diff>

<commit_message>
Added images and updated the slides
</commit_message>
<xml_diff>
--- a/src/slides/resources/2017-03-31-JUG-Saxony-Workshop-de.pptx
+++ b/src/slides/resources/2017-03-31-JUG-Saxony-Workshop-de.pptx
@@ -7815,7 +7815,7 @@
                 <a:ea typeface="Open Sans" panose="020B0606030504020204" pitchFamily="34" charset="0"/>
                 <a:cs typeface="Open Sans" panose="020B0606030504020204" pitchFamily="34" charset="0"/>
               </a:rPr>
-              <a:t>3</a:t>
+              <a:t>2</a:t>
             </a:r>
             <a:endParaRPr kumimoji="0" lang="de-DE" sz="1200" b="0" i="0" u="none" strike="noStrike" cap="none" normalizeH="0" baseline="0" dirty="0" smtClean="0">
               <a:ln>
@@ -7903,7 +7903,7 @@
                 <a:ea typeface="Open Sans" panose="020B0606030504020204" pitchFamily="34" charset="0"/>
                 <a:cs typeface="Open Sans" panose="020B0606030504020204" pitchFamily="34" charset="0"/>
               </a:rPr>
-              <a:t>4</a:t>
+              <a:t>2</a:t>
             </a:r>
             <a:endParaRPr kumimoji="0" lang="de-DE" sz="1200" b="0" i="0" u="none" strike="noStrike" cap="none" normalizeH="0" baseline="0" dirty="0" smtClean="0">
               <a:ln>
@@ -7991,7 +7991,7 @@
                 <a:ea typeface="Open Sans" panose="020B0606030504020204" pitchFamily="34" charset="0"/>
                 <a:cs typeface="Open Sans" panose="020B0606030504020204" pitchFamily="34" charset="0"/>
               </a:rPr>
-              <a:t>5</a:t>
+              <a:t>3</a:t>
             </a:r>
             <a:endParaRPr kumimoji="0" lang="de-DE" sz="1200" b="0" i="0" u="none" strike="noStrike" cap="none" normalizeH="0" baseline="0" dirty="0" smtClean="0">
               <a:ln>
@@ -8255,7 +8255,7 @@
                 <a:ea typeface="Open Sans" panose="020B0606030504020204" pitchFamily="34" charset="0"/>
                 <a:cs typeface="Open Sans" panose="020B0606030504020204" pitchFamily="34" charset="0"/>
               </a:rPr>
-              <a:t>3</a:t>
+              <a:t>2</a:t>
             </a:r>
             <a:endParaRPr kumimoji="0" lang="de-DE" sz="1200" b="0" i="0" u="none" strike="noStrike" cap="none" normalizeH="0" baseline="0" dirty="0" smtClean="0">
               <a:ln>
@@ -8343,7 +8343,7 @@
                 <a:ea typeface="Open Sans" panose="020B0606030504020204" pitchFamily="34" charset="0"/>
                 <a:cs typeface="Open Sans" panose="020B0606030504020204" pitchFamily="34" charset="0"/>
               </a:rPr>
-              <a:t>4</a:t>
+              <a:t>2</a:t>
             </a:r>
             <a:endParaRPr kumimoji="0" lang="de-DE" sz="1200" b="0" i="0" u="none" strike="noStrike" cap="none" normalizeH="0" baseline="0" dirty="0" smtClean="0">
               <a:ln>
@@ -8431,7 +8431,7 @@
                 <a:ea typeface="Open Sans" panose="020B0606030504020204" pitchFamily="34" charset="0"/>
                 <a:cs typeface="Open Sans" panose="020B0606030504020204" pitchFamily="34" charset="0"/>
               </a:rPr>
-              <a:t>5</a:t>
+              <a:t>3</a:t>
             </a:r>
             <a:endParaRPr kumimoji="0" lang="de-DE" sz="1200" b="0" i="0" u="none" strike="noStrike" cap="none" normalizeH="0" baseline="0" dirty="0" smtClean="0">
               <a:ln>
@@ -8519,7 +8519,7 @@
                 <a:ea typeface="Open Sans" panose="020B0606030504020204" pitchFamily="34" charset="0"/>
                 <a:cs typeface="Open Sans" panose="020B0606030504020204" pitchFamily="34" charset="0"/>
               </a:rPr>
-              <a:t>6</a:t>
+              <a:t>4</a:t>
             </a:r>
             <a:endParaRPr kumimoji="0" lang="de-DE" sz="1200" b="0" i="0" u="none" strike="noStrike" cap="none" normalizeH="0" baseline="0" dirty="0" smtClean="0">
               <a:ln>
@@ -8607,7 +8607,7 @@
                 <a:ea typeface="Open Sans" panose="020B0606030504020204" pitchFamily="34" charset="0"/>
                 <a:cs typeface="Open Sans" panose="020B0606030504020204" pitchFamily="34" charset="0"/>
               </a:rPr>
-              <a:t>11</a:t>
+              <a:t>7</a:t>
             </a:r>
             <a:endParaRPr kumimoji="0" lang="de-DE" b="1" i="0" u="none" strike="noStrike" cap="none" normalizeH="0" baseline="0" dirty="0" smtClean="0">
               <a:ln>
@@ -8637,9 +8637,586 @@
   <p:timing>
     <p:tnLst>
       <p:par>
-        <p:cTn id="1" dur="indefinite" restart="never" nodeType="tmRoot"/>
+        <p:cTn id="1" dur="indefinite" restart="never" nodeType="tmRoot">
+          <p:childTnLst>
+            <p:seq concurrent="1" nextAc="seek">
+              <p:cTn id="2" dur="indefinite" nodeType="mainSeq">
+                <p:childTnLst>
+                  <p:par>
+                    <p:cTn id="3" fill="hold">
+                      <p:stCondLst>
+                        <p:cond delay="indefinite"/>
+                      </p:stCondLst>
+                      <p:childTnLst>
+                        <p:par>
+                          <p:cTn id="4" fill="hold">
+                            <p:stCondLst>
+                              <p:cond delay="0"/>
+                            </p:stCondLst>
+                            <p:childTnLst>
+                              <p:par>
+                                <p:cTn id="5" presetID="1" presetClass="entr" presetSubtype="0" fill="hold" grpId="0" nodeType="clickEffect">
+                                  <p:stCondLst>
+                                    <p:cond delay="0"/>
+                                  </p:stCondLst>
+                                  <p:childTnLst>
+                                    <p:set>
+                                      <p:cBhvr>
+                                        <p:cTn id="6" dur="1" fill="hold">
+                                          <p:stCondLst>
+                                            <p:cond delay="0"/>
+                                          </p:stCondLst>
+                                        </p:cTn>
+                                        <p:tgtEl>
+                                          <p:spTgt spid="4"/>
+                                        </p:tgtEl>
+                                        <p:attrNameLst>
+                                          <p:attrName>style.visibility</p:attrName>
+                                        </p:attrNameLst>
+                                      </p:cBhvr>
+                                      <p:to>
+                                        <p:strVal val="visible"/>
+                                      </p:to>
+                                    </p:set>
+                                  </p:childTnLst>
+                                </p:cTn>
+                              </p:par>
+                            </p:childTnLst>
+                          </p:cTn>
+                        </p:par>
+                      </p:childTnLst>
+                    </p:cTn>
+                  </p:par>
+                  <p:par>
+                    <p:cTn id="7" fill="hold">
+                      <p:stCondLst>
+                        <p:cond delay="indefinite"/>
+                      </p:stCondLst>
+                      <p:childTnLst>
+                        <p:par>
+                          <p:cTn id="8" fill="hold">
+                            <p:stCondLst>
+                              <p:cond delay="0"/>
+                            </p:stCondLst>
+                            <p:childTnLst>
+                              <p:par>
+                                <p:cTn id="9" presetID="1" presetClass="entr" presetSubtype="0" fill="hold" grpId="0" nodeType="clickEffect">
+                                  <p:stCondLst>
+                                    <p:cond delay="0"/>
+                                  </p:stCondLst>
+                                  <p:childTnLst>
+                                    <p:set>
+                                      <p:cBhvr>
+                                        <p:cTn id="10" dur="1" fill="hold">
+                                          <p:stCondLst>
+                                            <p:cond delay="0"/>
+                                          </p:stCondLst>
+                                        </p:cTn>
+                                        <p:tgtEl>
+                                          <p:spTgt spid="24"/>
+                                        </p:tgtEl>
+                                        <p:attrNameLst>
+                                          <p:attrName>style.visibility</p:attrName>
+                                        </p:attrNameLst>
+                                      </p:cBhvr>
+                                      <p:to>
+                                        <p:strVal val="visible"/>
+                                      </p:to>
+                                    </p:set>
+                                  </p:childTnLst>
+                                </p:cTn>
+                              </p:par>
+                            </p:childTnLst>
+                          </p:cTn>
+                        </p:par>
+                      </p:childTnLst>
+                    </p:cTn>
+                  </p:par>
+                  <p:par>
+                    <p:cTn id="11" fill="hold">
+                      <p:stCondLst>
+                        <p:cond delay="indefinite"/>
+                      </p:stCondLst>
+                      <p:childTnLst>
+                        <p:par>
+                          <p:cTn id="12" fill="hold">
+                            <p:stCondLst>
+                              <p:cond delay="0"/>
+                            </p:stCondLst>
+                            <p:childTnLst>
+                              <p:par>
+                                <p:cTn id="13" presetID="1" presetClass="entr" presetSubtype="0" fill="hold" grpId="0" nodeType="clickEffect">
+                                  <p:stCondLst>
+                                    <p:cond delay="0"/>
+                                  </p:stCondLst>
+                                  <p:childTnLst>
+                                    <p:set>
+                                      <p:cBhvr>
+                                        <p:cTn id="14" dur="1" fill="hold">
+                                          <p:stCondLst>
+                                            <p:cond delay="0"/>
+                                          </p:stCondLst>
+                                        </p:cTn>
+                                        <p:tgtEl>
+                                          <p:spTgt spid="25"/>
+                                        </p:tgtEl>
+                                        <p:attrNameLst>
+                                          <p:attrName>style.visibility</p:attrName>
+                                        </p:attrNameLst>
+                                      </p:cBhvr>
+                                      <p:to>
+                                        <p:strVal val="visible"/>
+                                      </p:to>
+                                    </p:set>
+                                  </p:childTnLst>
+                                </p:cTn>
+                              </p:par>
+                            </p:childTnLst>
+                          </p:cTn>
+                        </p:par>
+                      </p:childTnLst>
+                    </p:cTn>
+                  </p:par>
+                  <p:par>
+                    <p:cTn id="15" fill="hold">
+                      <p:stCondLst>
+                        <p:cond delay="indefinite"/>
+                      </p:stCondLst>
+                      <p:childTnLst>
+                        <p:par>
+                          <p:cTn id="16" fill="hold">
+                            <p:stCondLst>
+                              <p:cond delay="0"/>
+                            </p:stCondLst>
+                            <p:childTnLst>
+                              <p:par>
+                                <p:cTn id="17" presetID="1" presetClass="entr" presetSubtype="0" fill="hold" grpId="0" nodeType="clickEffect">
+                                  <p:stCondLst>
+                                    <p:cond delay="0"/>
+                                  </p:stCondLst>
+                                  <p:childTnLst>
+                                    <p:set>
+                                      <p:cBhvr>
+                                        <p:cTn id="18" dur="1" fill="hold">
+                                          <p:stCondLst>
+                                            <p:cond delay="0"/>
+                                          </p:stCondLst>
+                                        </p:cTn>
+                                        <p:tgtEl>
+                                          <p:spTgt spid="26"/>
+                                        </p:tgtEl>
+                                        <p:attrNameLst>
+                                          <p:attrName>style.visibility</p:attrName>
+                                        </p:attrNameLst>
+                                      </p:cBhvr>
+                                      <p:to>
+                                        <p:strVal val="visible"/>
+                                      </p:to>
+                                    </p:set>
+                                  </p:childTnLst>
+                                </p:cTn>
+                              </p:par>
+                            </p:childTnLst>
+                          </p:cTn>
+                        </p:par>
+                      </p:childTnLst>
+                    </p:cTn>
+                  </p:par>
+                  <p:par>
+                    <p:cTn id="19" fill="hold">
+                      <p:stCondLst>
+                        <p:cond delay="indefinite"/>
+                      </p:stCondLst>
+                      <p:childTnLst>
+                        <p:par>
+                          <p:cTn id="20" fill="hold">
+                            <p:stCondLst>
+                              <p:cond delay="0"/>
+                            </p:stCondLst>
+                            <p:childTnLst>
+                              <p:par>
+                                <p:cTn id="21" presetID="1" presetClass="entr" presetSubtype="0" fill="hold" grpId="0" nodeType="clickEffect">
+                                  <p:stCondLst>
+                                    <p:cond delay="0"/>
+                                  </p:stCondLst>
+                                  <p:childTnLst>
+                                    <p:set>
+                                      <p:cBhvr>
+                                        <p:cTn id="22" dur="1" fill="hold">
+                                          <p:stCondLst>
+                                            <p:cond delay="0"/>
+                                          </p:stCondLst>
+                                        </p:cTn>
+                                        <p:tgtEl>
+                                          <p:spTgt spid="27"/>
+                                        </p:tgtEl>
+                                        <p:attrNameLst>
+                                          <p:attrName>style.visibility</p:attrName>
+                                        </p:attrNameLst>
+                                      </p:cBhvr>
+                                      <p:to>
+                                        <p:strVal val="visible"/>
+                                      </p:to>
+                                    </p:set>
+                                  </p:childTnLst>
+                                </p:cTn>
+                              </p:par>
+                            </p:childTnLst>
+                          </p:cTn>
+                        </p:par>
+                      </p:childTnLst>
+                    </p:cTn>
+                  </p:par>
+                  <p:par>
+                    <p:cTn id="23" fill="hold">
+                      <p:stCondLst>
+                        <p:cond delay="indefinite"/>
+                      </p:stCondLst>
+                      <p:childTnLst>
+                        <p:par>
+                          <p:cTn id="24" fill="hold">
+                            <p:stCondLst>
+                              <p:cond delay="0"/>
+                            </p:stCondLst>
+                            <p:childTnLst>
+                              <p:par>
+                                <p:cTn id="25" presetID="1" presetClass="entr" presetSubtype="0" fill="hold" grpId="0" nodeType="clickEffect">
+                                  <p:stCondLst>
+                                    <p:cond delay="0"/>
+                                  </p:stCondLst>
+                                  <p:childTnLst>
+                                    <p:set>
+                                      <p:cBhvr>
+                                        <p:cTn id="26" dur="1" fill="hold">
+                                          <p:stCondLst>
+                                            <p:cond delay="0"/>
+                                          </p:stCondLst>
+                                        </p:cTn>
+                                        <p:tgtEl>
+                                          <p:spTgt spid="28"/>
+                                        </p:tgtEl>
+                                        <p:attrNameLst>
+                                          <p:attrName>style.visibility</p:attrName>
+                                        </p:attrNameLst>
+                                      </p:cBhvr>
+                                      <p:to>
+                                        <p:strVal val="visible"/>
+                                      </p:to>
+                                    </p:set>
+                                  </p:childTnLst>
+                                </p:cTn>
+                              </p:par>
+                            </p:childTnLst>
+                          </p:cTn>
+                        </p:par>
+                      </p:childTnLst>
+                    </p:cTn>
+                  </p:par>
+                  <p:par>
+                    <p:cTn id="27" fill="hold">
+                      <p:stCondLst>
+                        <p:cond delay="indefinite"/>
+                      </p:stCondLst>
+                      <p:childTnLst>
+                        <p:par>
+                          <p:cTn id="28" fill="hold">
+                            <p:stCondLst>
+                              <p:cond delay="0"/>
+                            </p:stCondLst>
+                            <p:childTnLst>
+                              <p:par>
+                                <p:cTn id="29" presetID="1" presetClass="entr" presetSubtype="0" fill="hold" grpId="0" nodeType="clickEffect">
+                                  <p:stCondLst>
+                                    <p:cond delay="0"/>
+                                  </p:stCondLst>
+                                  <p:childTnLst>
+                                    <p:set>
+                                      <p:cBhvr>
+                                        <p:cTn id="30" dur="1" fill="hold">
+                                          <p:stCondLst>
+                                            <p:cond delay="0"/>
+                                          </p:stCondLst>
+                                        </p:cTn>
+                                        <p:tgtEl>
+                                          <p:spTgt spid="29"/>
+                                        </p:tgtEl>
+                                        <p:attrNameLst>
+                                          <p:attrName>style.visibility</p:attrName>
+                                        </p:attrNameLst>
+                                      </p:cBhvr>
+                                      <p:to>
+                                        <p:strVal val="visible"/>
+                                      </p:to>
+                                    </p:set>
+                                  </p:childTnLst>
+                                </p:cTn>
+                              </p:par>
+                            </p:childTnLst>
+                          </p:cTn>
+                        </p:par>
+                      </p:childTnLst>
+                    </p:cTn>
+                  </p:par>
+                  <p:par>
+                    <p:cTn id="31" fill="hold">
+                      <p:stCondLst>
+                        <p:cond delay="indefinite"/>
+                      </p:stCondLst>
+                      <p:childTnLst>
+                        <p:par>
+                          <p:cTn id="32" fill="hold">
+                            <p:stCondLst>
+                              <p:cond delay="0"/>
+                            </p:stCondLst>
+                            <p:childTnLst>
+                              <p:par>
+                                <p:cTn id="33" presetID="1" presetClass="entr" presetSubtype="0" fill="hold" grpId="0" nodeType="clickEffect">
+                                  <p:stCondLst>
+                                    <p:cond delay="0"/>
+                                  </p:stCondLst>
+                                  <p:childTnLst>
+                                    <p:set>
+                                      <p:cBhvr>
+                                        <p:cTn id="34" dur="1" fill="hold">
+                                          <p:stCondLst>
+                                            <p:cond delay="0"/>
+                                          </p:stCondLst>
+                                        </p:cTn>
+                                        <p:tgtEl>
+                                          <p:spTgt spid="30"/>
+                                        </p:tgtEl>
+                                        <p:attrNameLst>
+                                          <p:attrName>style.visibility</p:attrName>
+                                        </p:attrNameLst>
+                                      </p:cBhvr>
+                                      <p:to>
+                                        <p:strVal val="visible"/>
+                                      </p:to>
+                                    </p:set>
+                                  </p:childTnLst>
+                                </p:cTn>
+                              </p:par>
+                            </p:childTnLst>
+                          </p:cTn>
+                        </p:par>
+                      </p:childTnLst>
+                    </p:cTn>
+                  </p:par>
+                  <p:par>
+                    <p:cTn id="35" fill="hold">
+                      <p:stCondLst>
+                        <p:cond delay="indefinite"/>
+                      </p:stCondLst>
+                      <p:childTnLst>
+                        <p:par>
+                          <p:cTn id="36" fill="hold">
+                            <p:stCondLst>
+                              <p:cond delay="0"/>
+                            </p:stCondLst>
+                            <p:childTnLst>
+                              <p:par>
+                                <p:cTn id="37" presetID="1" presetClass="entr" presetSubtype="0" fill="hold" grpId="0" nodeType="clickEffect">
+                                  <p:stCondLst>
+                                    <p:cond delay="0"/>
+                                  </p:stCondLst>
+                                  <p:childTnLst>
+                                    <p:set>
+                                      <p:cBhvr>
+                                        <p:cTn id="38" dur="1" fill="hold">
+                                          <p:stCondLst>
+                                            <p:cond delay="0"/>
+                                          </p:stCondLst>
+                                        </p:cTn>
+                                        <p:tgtEl>
+                                          <p:spTgt spid="31"/>
+                                        </p:tgtEl>
+                                        <p:attrNameLst>
+                                          <p:attrName>style.visibility</p:attrName>
+                                        </p:attrNameLst>
+                                      </p:cBhvr>
+                                      <p:to>
+                                        <p:strVal val="visible"/>
+                                      </p:to>
+                                    </p:set>
+                                  </p:childTnLst>
+                                </p:cTn>
+                              </p:par>
+                            </p:childTnLst>
+                          </p:cTn>
+                        </p:par>
+                      </p:childTnLst>
+                    </p:cTn>
+                  </p:par>
+                  <p:par>
+                    <p:cTn id="39" fill="hold">
+                      <p:stCondLst>
+                        <p:cond delay="indefinite"/>
+                      </p:stCondLst>
+                      <p:childTnLst>
+                        <p:par>
+                          <p:cTn id="40" fill="hold">
+                            <p:stCondLst>
+                              <p:cond delay="0"/>
+                            </p:stCondLst>
+                            <p:childTnLst>
+                              <p:par>
+                                <p:cTn id="41" presetID="1" presetClass="entr" presetSubtype="0" fill="hold" grpId="0" nodeType="clickEffect">
+                                  <p:stCondLst>
+                                    <p:cond delay="0"/>
+                                  </p:stCondLst>
+                                  <p:childTnLst>
+                                    <p:set>
+                                      <p:cBhvr>
+                                        <p:cTn id="42" dur="1" fill="hold">
+                                          <p:stCondLst>
+                                            <p:cond delay="0"/>
+                                          </p:stCondLst>
+                                        </p:cTn>
+                                        <p:tgtEl>
+                                          <p:spTgt spid="32"/>
+                                        </p:tgtEl>
+                                        <p:attrNameLst>
+                                          <p:attrName>style.visibility</p:attrName>
+                                        </p:attrNameLst>
+                                      </p:cBhvr>
+                                      <p:to>
+                                        <p:strVal val="visible"/>
+                                      </p:to>
+                                    </p:set>
+                                  </p:childTnLst>
+                                </p:cTn>
+                              </p:par>
+                            </p:childTnLst>
+                          </p:cTn>
+                        </p:par>
+                      </p:childTnLst>
+                    </p:cTn>
+                  </p:par>
+                  <p:par>
+                    <p:cTn id="43" fill="hold">
+                      <p:stCondLst>
+                        <p:cond delay="indefinite"/>
+                      </p:stCondLst>
+                      <p:childTnLst>
+                        <p:par>
+                          <p:cTn id="44" fill="hold">
+                            <p:stCondLst>
+                              <p:cond delay="0"/>
+                            </p:stCondLst>
+                            <p:childTnLst>
+                              <p:par>
+                                <p:cTn id="45" presetID="1" presetClass="entr" presetSubtype="0" fill="hold" grpId="0" nodeType="clickEffect">
+                                  <p:stCondLst>
+                                    <p:cond delay="0"/>
+                                  </p:stCondLst>
+                                  <p:childTnLst>
+                                    <p:set>
+                                      <p:cBhvr>
+                                        <p:cTn id="46" dur="1" fill="hold">
+                                          <p:stCondLst>
+                                            <p:cond delay="0"/>
+                                          </p:stCondLst>
+                                        </p:cTn>
+                                        <p:tgtEl>
+                                          <p:spTgt spid="33"/>
+                                        </p:tgtEl>
+                                        <p:attrNameLst>
+                                          <p:attrName>style.visibility</p:attrName>
+                                        </p:attrNameLst>
+                                      </p:cBhvr>
+                                      <p:to>
+                                        <p:strVal val="visible"/>
+                                      </p:to>
+                                    </p:set>
+                                  </p:childTnLst>
+                                </p:cTn>
+                              </p:par>
+                            </p:childTnLst>
+                          </p:cTn>
+                        </p:par>
+                      </p:childTnLst>
+                    </p:cTn>
+                  </p:par>
+                  <p:par>
+                    <p:cTn id="47" fill="hold">
+                      <p:stCondLst>
+                        <p:cond delay="indefinite"/>
+                      </p:stCondLst>
+                      <p:childTnLst>
+                        <p:par>
+                          <p:cTn id="48" fill="hold">
+                            <p:stCondLst>
+                              <p:cond delay="0"/>
+                            </p:stCondLst>
+                            <p:childTnLst>
+                              <p:par>
+                                <p:cTn id="49" presetID="1" presetClass="entr" presetSubtype="0" fill="hold" grpId="0" nodeType="clickEffect">
+                                  <p:stCondLst>
+                                    <p:cond delay="0"/>
+                                  </p:stCondLst>
+                                  <p:childTnLst>
+                                    <p:set>
+                                      <p:cBhvr>
+                                        <p:cTn id="50" dur="1" fill="hold">
+                                          <p:stCondLst>
+                                            <p:cond delay="0"/>
+                                          </p:stCondLst>
+                                        </p:cTn>
+                                        <p:tgtEl>
+                                          <p:spTgt spid="34"/>
+                                        </p:tgtEl>
+                                        <p:attrNameLst>
+                                          <p:attrName>style.visibility</p:attrName>
+                                        </p:attrNameLst>
+                                      </p:cBhvr>
+                                      <p:to>
+                                        <p:strVal val="visible"/>
+                                      </p:to>
+                                    </p:set>
+                                  </p:childTnLst>
+                                </p:cTn>
+                              </p:par>
+                            </p:childTnLst>
+                          </p:cTn>
+                        </p:par>
+                      </p:childTnLst>
+                    </p:cTn>
+                  </p:par>
+                </p:childTnLst>
+              </p:cTn>
+              <p:prevCondLst>
+                <p:cond evt="onPrev" delay="0">
+                  <p:tgtEl>
+                    <p:sldTgt/>
+                  </p:tgtEl>
+                </p:cond>
+              </p:prevCondLst>
+              <p:nextCondLst>
+                <p:cond evt="onNext" delay="0">
+                  <p:tgtEl>
+                    <p:sldTgt/>
+                  </p:tgtEl>
+                </p:cond>
+              </p:nextCondLst>
+            </p:seq>
+          </p:childTnLst>
+        </p:cTn>
       </p:par>
     </p:tnLst>
+    <p:bldLst>
+      <p:bldP spid="4" grpId="0" animBg="1"/>
+      <p:bldP spid="24" grpId="0" animBg="1"/>
+      <p:bldP spid="25" grpId="0" animBg="1"/>
+      <p:bldP spid="26" grpId="0" animBg="1"/>
+      <p:bldP spid="27" grpId="0" animBg="1"/>
+      <p:bldP spid="28" grpId="0" animBg="1"/>
+      <p:bldP spid="29" grpId="0" animBg="1"/>
+      <p:bldP spid="30" grpId="0" animBg="1"/>
+      <p:bldP spid="31" grpId="0" animBg="1"/>
+      <p:bldP spid="32" grpId="0" animBg="1"/>
+      <p:bldP spid="33" grpId="0" animBg="1"/>
+      <p:bldP spid="34" grpId="0" animBg="1"/>
+    </p:bldLst>
   </p:timing>
 </p:sld>
 </file>

</xml_diff>

<commit_message>
Worked on slide 13
</commit_message>
<xml_diff>
--- a/src/slides/resources/2017-03-31-JUG-Saxony-Workshop-de.pptx
+++ b/src/slides/resources/2017-03-31-JUG-Saxony-Workshop-de.pptx
@@ -158,7 +158,7 @@
   </p:defaultTextStyle>
   <p:extLst>
     <p:ext uri="{EFAFB233-063F-42B5-8137-9DF3F51BA10A}">
-      <p15:sldGuideLst xmlns="" xmlns:p15="http://schemas.microsoft.com/office/powerpoint/2012/main">
+      <p15:sldGuideLst xmlns:p15="http://schemas.microsoft.com/office/powerpoint/2012/main" xmlns="">
         <p15:guide id="1" orient="horz" pos="2084">
           <p15:clr>
             <a:srgbClr val="A4A3A4"/>
@@ -172,7 +172,7 @@
       </p15:sldGuideLst>
     </p:ext>
     <p:ext uri="{2D200454-40CA-4A62-9FC3-DE9A4176ACB9}">
-      <p15:notesGuideLst xmlns="" xmlns:p15="http://schemas.microsoft.com/office/powerpoint/2012/main">
+      <p15:notesGuideLst xmlns:p15="http://schemas.microsoft.com/office/powerpoint/2012/main" xmlns="">
         <p15:guide id="1" orient="horz" pos="3024">
           <p15:clr>
             <a:srgbClr val="A4A3A4"/>
@@ -13833,13 +13833,13 @@
           <p:nvPr>
             <p:extLst>
               <p:ext uri="{D42A27DB-BD31-4B8C-83A1-F6EECF244321}">
-                <p14:modId xmlns:p14="http://schemas.microsoft.com/office/powerpoint/2010/main" val="1569628402"/>
+                <p14:modId xmlns:p14="http://schemas.microsoft.com/office/powerpoint/2010/main" val="3906161676"/>
               </p:ext>
             </p:extLst>
           </p:nvPr>
         </p:nvGraphicFramePr>
         <p:xfrm>
-          <a:off x="887712" y="3531172"/>
+          <a:off x="887712" y="3959797"/>
           <a:ext cx="2571582" cy="1645920"/>
         </p:xfrm>
         <a:graphic>
@@ -14153,13 +14153,13 @@
           <p:nvPr>
             <p:extLst>
               <p:ext uri="{D42A27DB-BD31-4B8C-83A1-F6EECF244321}">
-                <p14:modId xmlns:p14="http://schemas.microsoft.com/office/powerpoint/2010/main" val="1753465283"/>
+                <p14:modId xmlns:p14="http://schemas.microsoft.com/office/powerpoint/2010/main" val="2352890675"/>
               </p:ext>
             </p:extLst>
           </p:nvPr>
         </p:nvGraphicFramePr>
         <p:xfrm>
-          <a:off x="887712" y="1852362"/>
+          <a:off x="887712" y="2280987"/>
           <a:ext cx="2571582" cy="1371600"/>
         </p:xfrm>
         <a:graphic>
@@ -14435,7 +14435,7 @@
         </p:nvSpPr>
         <p:spPr bwMode="auto">
           <a:xfrm>
-            <a:off x="3509730" y="1882341"/>
+            <a:off x="3509730" y="2310966"/>
             <a:ext cx="236036" cy="219661"/>
           </a:xfrm>
           <a:prstGeom prst="ellipse">
@@ -14511,7 +14511,7 @@
         </p:nvSpPr>
         <p:spPr bwMode="auto">
           <a:xfrm>
-            <a:off x="3509730" y="2157692"/>
+            <a:off x="3509730" y="2586317"/>
             <a:ext cx="236036" cy="219661"/>
           </a:xfrm>
           <a:prstGeom prst="ellipse">
@@ -14587,7 +14587,7 @@
         </p:nvSpPr>
         <p:spPr bwMode="auto">
           <a:xfrm>
-            <a:off x="3509730" y="2433043"/>
+            <a:off x="3509730" y="2861668"/>
             <a:ext cx="236036" cy="219661"/>
           </a:xfrm>
           <a:prstGeom prst="ellipse">
@@ -14663,7 +14663,7 @@
         </p:nvSpPr>
         <p:spPr bwMode="auto">
           <a:xfrm>
-            <a:off x="3509730" y="2708394"/>
+            <a:off x="3509730" y="3137019"/>
             <a:ext cx="236036" cy="219661"/>
           </a:xfrm>
           <a:prstGeom prst="ellipse">
@@ -14739,7 +14739,7 @@
         </p:nvSpPr>
         <p:spPr bwMode="auto">
           <a:xfrm>
-            <a:off x="3509730" y="2983745"/>
+            <a:off x="3509730" y="3412370"/>
             <a:ext cx="236036" cy="219661"/>
           </a:xfrm>
           <a:prstGeom prst="ellipse">
@@ -14815,7 +14815,7 @@
         </p:nvSpPr>
         <p:spPr bwMode="auto">
           <a:xfrm>
-            <a:off x="3505018" y="3558184"/>
+            <a:off x="3505018" y="3986809"/>
             <a:ext cx="236036" cy="219661"/>
           </a:xfrm>
           <a:prstGeom prst="ellipse">
@@ -14891,7 +14891,7 @@
         </p:nvSpPr>
         <p:spPr bwMode="auto">
           <a:xfrm>
-            <a:off x="3505018" y="3833535"/>
+            <a:off x="3505018" y="4262160"/>
             <a:ext cx="236036" cy="219661"/>
           </a:xfrm>
           <a:prstGeom prst="ellipse">
@@ -14967,7 +14967,7 @@
         </p:nvSpPr>
         <p:spPr bwMode="auto">
           <a:xfrm>
-            <a:off x="3505018" y="4108886"/>
+            <a:off x="3505018" y="4537511"/>
             <a:ext cx="236036" cy="219661"/>
           </a:xfrm>
           <a:prstGeom prst="ellipse">
@@ -15043,7 +15043,7 @@
         </p:nvSpPr>
         <p:spPr bwMode="auto">
           <a:xfrm>
-            <a:off x="3505018" y="4384237"/>
+            <a:off x="3505018" y="4812862"/>
             <a:ext cx="236036" cy="219661"/>
           </a:xfrm>
           <a:prstGeom prst="ellipse">
@@ -15119,7 +15119,7 @@
         </p:nvSpPr>
         <p:spPr bwMode="auto">
           <a:xfrm>
-            <a:off x="3505018" y="4659588"/>
+            <a:off x="3505018" y="5088213"/>
             <a:ext cx="236036" cy="219661"/>
           </a:xfrm>
           <a:prstGeom prst="ellipse">
@@ -15195,7 +15195,7 @@
         </p:nvSpPr>
         <p:spPr bwMode="auto">
           <a:xfrm>
-            <a:off x="3505018" y="4939266"/>
+            <a:off x="3505018" y="5367891"/>
             <a:ext cx="236036" cy="219661"/>
           </a:xfrm>
           <a:prstGeom prst="ellipse">
@@ -15263,64 +15263,6 @@
           </a:p>
         </p:txBody>
       </p:sp>
-      <p:cxnSp>
-        <p:nvCxnSpPr>
-          <p:cNvPr id="29" name="Gerade Verbindung mit Pfeil 28"/>
-          <p:cNvCxnSpPr/>
-          <p:nvPr/>
-        </p:nvCxnSpPr>
-        <p:spPr bwMode="auto">
-          <a:xfrm flipH="1">
-            <a:off x="3942608" y="1638795"/>
-            <a:ext cx="4013861" cy="0"/>
-          </a:xfrm>
-          <a:prstGeom prst="straightConnector1">
-            <a:avLst/>
-          </a:prstGeom>
-          <a:solidFill>
-            <a:schemeClr val="accent1"/>
-          </a:solidFill>
-          <a:ln w="57150" cap="flat" cmpd="sng" algn="ctr">
-            <a:solidFill>
-              <a:schemeClr val="tx1"/>
-            </a:solidFill>
-            <a:prstDash val="solid"/>
-            <a:round/>
-            <a:headEnd type="none" w="med" len="med"/>
-            <a:tailEnd type="triangle" w="med" len="med"/>
-          </a:ln>
-          <a:effectLst/>
-        </p:spPr>
-      </p:cxnSp>
-      <p:cxnSp>
-        <p:nvCxnSpPr>
-          <p:cNvPr id="31" name="Gerade Verbindung mit Pfeil 30"/>
-          <p:cNvCxnSpPr/>
-          <p:nvPr/>
-        </p:nvCxnSpPr>
-        <p:spPr bwMode="auto">
-          <a:xfrm>
-            <a:off x="3942608" y="5783283"/>
-            <a:ext cx="4013860" cy="0"/>
-          </a:xfrm>
-          <a:prstGeom prst="straightConnector1">
-            <a:avLst/>
-          </a:prstGeom>
-          <a:solidFill>
-            <a:schemeClr val="accent1"/>
-          </a:solidFill>
-          <a:ln w="57150" cap="flat" cmpd="sng" algn="ctr">
-            <a:solidFill>
-              <a:schemeClr val="tx1"/>
-            </a:solidFill>
-            <a:prstDash val="solid"/>
-            <a:round/>
-            <a:headEnd type="none" w="med" len="med"/>
-            <a:tailEnd type="triangle" w="med" len="med"/>
-          </a:ln>
-          <a:effectLst/>
-        </p:spPr>
-      </p:cxnSp>
       <p:sp>
         <p:nvSpPr>
           <p:cNvPr id="34" name="Rechteck 33"/>
@@ -15329,14 +15271,14 @@
         </p:nvSpPr>
         <p:spPr bwMode="auto">
           <a:xfrm>
-            <a:off x="4214751" y="2057068"/>
-            <a:ext cx="3469573" cy="3395381"/>
+            <a:off x="4214751" y="2530627"/>
+            <a:ext cx="3469573" cy="2226545"/>
           </a:xfrm>
           <a:prstGeom prst="rect">
             <a:avLst/>
           </a:prstGeom>
           <a:noFill/>
-          <a:ln>
+          <a:ln w="12700">
             <a:headEnd type="none" w="med" len="med"/>
             <a:tailEnd type="none" w="med" len="med"/>
           </a:ln>
@@ -15404,7 +15346,7 @@
         </p:nvSpPr>
         <p:spPr bwMode="auto">
           <a:xfrm>
-            <a:off x="5682343" y="2791490"/>
+            <a:off x="5682343" y="3080153"/>
             <a:ext cx="534389" cy="604170"/>
           </a:xfrm>
           <a:prstGeom prst="foldedCorner">
@@ -15472,7 +15414,7 @@
         </p:nvSpPr>
         <p:spPr bwMode="auto">
           <a:xfrm>
-            <a:off x="5682343" y="4747011"/>
+            <a:off x="5682342" y="3991077"/>
             <a:ext cx="534389" cy="604170"/>
           </a:xfrm>
           <a:prstGeom prst="foldedCorner">
@@ -15543,8 +15485,8 @@
         </p:nvCxnSpPr>
         <p:spPr bwMode="auto">
           <a:xfrm flipV="1">
-            <a:off x="3745766" y="3093575"/>
-            <a:ext cx="1936577" cy="1"/>
+            <a:off x="3745766" y="3382238"/>
+            <a:ext cx="1936577" cy="139963"/>
           </a:xfrm>
           <a:prstGeom prst="straightConnector1">
             <a:avLst/>
@@ -15556,7 +15498,7 @@
             <a:solidFill>
               <a:schemeClr val="tx1"/>
             </a:solidFill>
-            <a:prstDash val="solid"/>
+            <a:prstDash val="dash"/>
             <a:round/>
             <a:headEnd type="none" w="med" len="med"/>
             <a:tailEnd type="arrow"/>
@@ -15575,8 +15517,8 @@
         </p:nvCxnSpPr>
         <p:spPr bwMode="auto">
           <a:xfrm flipV="1">
-            <a:off x="3741054" y="5049096"/>
-            <a:ext cx="1941289" cy="1"/>
+            <a:off x="3741054" y="4293162"/>
+            <a:ext cx="1941288" cy="1184560"/>
           </a:xfrm>
           <a:prstGeom prst="straightConnector1">
             <a:avLst/>
@@ -15588,7 +15530,7 @@
             <a:solidFill>
               <a:schemeClr val="tx1"/>
             </a:solidFill>
-            <a:prstDash val="solid"/>
+            <a:prstDash val="dash"/>
             <a:round/>
             <a:headEnd type="none" w="med" len="med"/>
             <a:tailEnd type="arrow"/>
@@ -15619,7 +15561,7 @@
         </p:blipFill>
         <p:spPr bwMode="auto">
           <a:xfrm>
-            <a:off x="4309751" y="2135495"/>
+            <a:off x="4309751" y="2621270"/>
             <a:ext cx="1125619" cy="629494"/>
           </a:xfrm>
           <a:prstGeom prst="rect">
@@ -15637,6 +15579,362 @@
           </a:extLst>
         </p:spPr>
       </p:pic>
+      <p:sp>
+        <p:nvSpPr>
+          <p:cNvPr id="3" name="Rechteck 2"/>
+          <p:cNvSpPr/>
+          <p:nvPr/>
+        </p:nvSpPr>
+        <p:spPr bwMode="auto">
+          <a:xfrm>
+            <a:off x="8320087" y="1680456"/>
+            <a:ext cx="2562225" cy="4291719"/>
+          </a:xfrm>
+          <a:prstGeom prst="rect">
+            <a:avLst/>
+          </a:prstGeom>
+          <a:solidFill>
+            <a:schemeClr val="bg1">
+              <a:lumMod val="95000"/>
+            </a:schemeClr>
+          </a:solidFill>
+          <a:ln w="9525" cap="flat" cmpd="sng" algn="ctr">
+            <a:solidFill>
+              <a:schemeClr val="tx1"/>
+            </a:solidFill>
+            <a:prstDash val="solid"/>
+            <a:round/>
+            <a:headEnd type="none" w="med" len="med"/>
+            <a:tailEnd type="none" w="med" len="med"/>
+          </a:ln>
+          <a:effectLst/>
+        </p:spPr>
+        <p:txBody>
+          <a:bodyPr rot="0" spcFirstLastPara="0" vertOverflow="overflow" horzOverflow="overflow" vert="horz" wrap="square" lIns="91440" tIns="45720" rIns="91440" bIns="45720" numCol="1" spcCol="0" rtlCol="0" fromWordArt="0" anchor="t" anchorCtr="0" forceAA="0" compatLnSpc="1">
+            <a:prstTxWarp prst="textNoShape">
+              <a:avLst/>
+            </a:prstTxWarp>
+            <a:noAutofit/>
+          </a:bodyPr>
+          <a:lstStyle/>
+          <a:p>
+            <a:pPr marL="0" marR="0" indent="0" algn="l" defTabSz="914400" rtl="0" eaLnBrk="1" fontAlgn="base" latinLnBrk="0" hangingPunct="1">
+              <a:lnSpc>
+                <a:spcPct val="100000"/>
+              </a:lnSpc>
+              <a:spcBef>
+                <a:spcPct val="0"/>
+              </a:spcBef>
+              <a:spcAft>
+                <a:spcPts val="600"/>
+              </a:spcAft>
+              <a:buClrTx/>
+              <a:buSzTx/>
+              <a:buFontTx/>
+              <a:buNone/>
+              <a:tabLst/>
+            </a:pPr>
+            <a:r>
+              <a:rPr kumimoji="0" lang="de-DE" sz="1200" b="0" i="0" u="none" strike="noStrike" cap="none" normalizeH="0" dirty="0" smtClean="0">
+                <a:ln>
+                  <a:noFill/>
+                </a:ln>
+                <a:effectLst/>
+                <a:latin typeface="Open Sans" panose="020B0606030504020204" pitchFamily="34" charset="0"/>
+                <a:ea typeface="Open Sans" panose="020B0606030504020204" pitchFamily="34" charset="0"/>
+                <a:cs typeface="Open Sans" panose="020B0606030504020204" pitchFamily="34" charset="0"/>
+              </a:rPr>
+              <a:t>Framework</a:t>
+            </a:r>
+            <a:endParaRPr kumimoji="0" lang="en-US" sz="1200" b="0" i="0" u="none" strike="noStrike" cap="none" normalizeH="0" dirty="0" err="1" smtClean="0">
+              <a:ln>
+                <a:noFill/>
+              </a:ln>
+              <a:effectLst/>
+              <a:latin typeface="Open Sans" panose="020B0606030504020204" pitchFamily="34" charset="0"/>
+              <a:ea typeface="Open Sans" panose="020B0606030504020204" pitchFamily="34" charset="0"/>
+              <a:cs typeface="Open Sans" panose="020B0606030504020204" pitchFamily="34" charset="0"/>
+            </a:endParaRPr>
+          </a:p>
+        </p:txBody>
+      </p:sp>
+      <p:sp>
+        <p:nvSpPr>
+          <p:cNvPr id="32" name="Rechteck 31"/>
+          <p:cNvSpPr/>
+          <p:nvPr/>
+        </p:nvSpPr>
+        <p:spPr bwMode="auto">
+          <a:xfrm>
+            <a:off x="8843962" y="2088391"/>
+            <a:ext cx="1514475" cy="2828656"/>
+          </a:xfrm>
+          <a:prstGeom prst="rect">
+            <a:avLst/>
+          </a:prstGeom>
+          <a:solidFill>
+            <a:srgbClr val="A7D9FF"/>
+          </a:solidFill>
+          <a:ln w="9525" cap="flat" cmpd="sng" algn="ctr">
+            <a:solidFill>
+              <a:schemeClr val="bg1">
+                <a:lumMod val="50000"/>
+              </a:schemeClr>
+            </a:solidFill>
+            <a:prstDash val="solid"/>
+            <a:round/>
+            <a:headEnd type="none" w="med" len="med"/>
+            <a:tailEnd type="none" w="med" len="med"/>
+          </a:ln>
+          <a:effectLst/>
+        </p:spPr>
+        <p:txBody>
+          <a:bodyPr rot="0" spcFirstLastPara="0" vertOverflow="overflow" horzOverflow="overflow" vert="horz" wrap="square" lIns="91440" tIns="45720" rIns="91440" bIns="45720" numCol="1" spcCol="0" rtlCol="0" fromWordArt="0" anchor="ctr" anchorCtr="0" forceAA="0" compatLnSpc="1">
+            <a:prstTxWarp prst="textNoShape">
+              <a:avLst/>
+            </a:prstTxWarp>
+            <a:noAutofit/>
+          </a:bodyPr>
+          <a:lstStyle/>
+          <a:p>
+            <a:pPr marL="0" marR="0" indent="0" defTabSz="914400" rtl="0" eaLnBrk="1" fontAlgn="base" latinLnBrk="0" hangingPunct="1">
+              <a:lnSpc>
+                <a:spcPct val="100000"/>
+              </a:lnSpc>
+              <a:spcBef>
+                <a:spcPct val="0"/>
+              </a:spcBef>
+              <a:spcAft>
+                <a:spcPts val="600"/>
+              </a:spcAft>
+              <a:buClrTx/>
+              <a:buSzTx/>
+              <a:buFontTx/>
+              <a:buNone/>
+              <a:tabLst/>
+            </a:pPr>
+            <a:r>
+              <a:rPr kumimoji="0" lang="de-DE" sz="1200" b="0" i="0" u="none" strike="noStrike" cap="none" normalizeH="0" dirty="0" smtClean="0">
+                <a:ln>
+                  <a:noFill/>
+                </a:ln>
+                <a:effectLst/>
+                <a:latin typeface="Open Sans" panose="020B0606030504020204" pitchFamily="34" charset="0"/>
+                <a:ea typeface="Open Sans" panose="020B0606030504020204" pitchFamily="34" charset="0"/>
+                <a:cs typeface="Open Sans" panose="020B0606030504020204" pitchFamily="34" charset="0"/>
+              </a:rPr>
+              <a:t>Spezifischer Code</a:t>
+            </a:r>
+            <a:endParaRPr kumimoji="0" lang="en-US" sz="1200" b="0" i="0" u="none" strike="noStrike" cap="none" normalizeH="0" dirty="0" err="1" smtClean="0">
+              <a:ln>
+                <a:noFill/>
+              </a:ln>
+              <a:effectLst/>
+              <a:latin typeface="Open Sans" panose="020B0606030504020204" pitchFamily="34" charset="0"/>
+              <a:ea typeface="Open Sans" panose="020B0606030504020204" pitchFamily="34" charset="0"/>
+              <a:cs typeface="Open Sans" panose="020B0606030504020204" pitchFamily="34" charset="0"/>
+            </a:endParaRPr>
+          </a:p>
+        </p:txBody>
+      </p:sp>
+      <p:cxnSp>
+        <p:nvCxnSpPr>
+          <p:cNvPr id="29" name="Gerade Verbindung mit Pfeil 28"/>
+          <p:cNvCxnSpPr/>
+          <p:nvPr/>
+        </p:nvCxnSpPr>
+        <p:spPr bwMode="auto">
+          <a:xfrm flipH="1" flipV="1">
+            <a:off x="3942610" y="2105520"/>
+            <a:ext cx="4901352" cy="425107"/>
+          </a:xfrm>
+          <a:prstGeom prst="straightConnector1">
+            <a:avLst/>
+          </a:prstGeom>
+          <a:solidFill>
+            <a:schemeClr val="accent1"/>
+          </a:solidFill>
+          <a:ln w="57150" cap="flat" cmpd="sng" algn="ctr">
+            <a:solidFill>
+              <a:schemeClr val="tx1"/>
+            </a:solidFill>
+            <a:prstDash val="solid"/>
+            <a:round/>
+            <a:headEnd type="none" w="med" len="med"/>
+            <a:tailEnd type="triangle" w="med" len="med"/>
+          </a:ln>
+          <a:effectLst/>
+        </p:spPr>
+      </p:cxnSp>
+      <p:cxnSp>
+        <p:nvCxnSpPr>
+          <p:cNvPr id="31" name="Gerade Verbindung mit Pfeil 30"/>
+          <p:cNvCxnSpPr/>
+          <p:nvPr/>
+        </p:nvCxnSpPr>
+        <p:spPr bwMode="auto">
+          <a:xfrm flipV="1">
+            <a:off x="3942608" y="4647341"/>
+            <a:ext cx="4901354" cy="1135943"/>
+          </a:xfrm>
+          <a:prstGeom prst="straightConnector1">
+            <a:avLst/>
+          </a:prstGeom>
+          <a:solidFill>
+            <a:schemeClr val="accent1"/>
+          </a:solidFill>
+          <a:ln w="57150" cap="flat" cmpd="sng" algn="ctr">
+            <a:solidFill>
+              <a:schemeClr val="tx1"/>
+            </a:solidFill>
+            <a:prstDash val="solid"/>
+            <a:round/>
+            <a:headEnd type="none" w="med" len="med"/>
+            <a:tailEnd type="triangle" w="med" len="med"/>
+          </a:ln>
+          <a:effectLst/>
+        </p:spPr>
+      </p:cxnSp>
+      <p:sp>
+        <p:nvSpPr>
+          <p:cNvPr id="35" name="Ellipse 34"/>
+          <p:cNvSpPr/>
+          <p:nvPr/>
+        </p:nvSpPr>
+        <p:spPr bwMode="auto">
+          <a:xfrm>
+            <a:off x="9394810" y="5345218"/>
+            <a:ext cx="412780" cy="418594"/>
+          </a:xfrm>
+          <a:prstGeom prst="ellipse">
+            <a:avLst/>
+          </a:prstGeom>
+          <a:ln>
+            <a:headEnd type="none" w="med" len="med"/>
+            <a:tailEnd type="none" w="med" len="med"/>
+          </a:ln>
+        </p:spPr>
+        <p:style>
+          <a:lnRef idx="2">
+            <a:schemeClr val="accent2"/>
+          </a:lnRef>
+          <a:fillRef idx="1">
+            <a:schemeClr val="lt1"/>
+          </a:fillRef>
+          <a:effectRef idx="0">
+            <a:schemeClr val="accent2"/>
+          </a:effectRef>
+          <a:fontRef idx="minor">
+            <a:schemeClr val="dk1"/>
+          </a:fontRef>
+        </p:style>
+        <p:txBody>
+          <a:bodyPr rot="0" spcFirstLastPara="0" vertOverflow="overflow" horzOverflow="overflow" vert="horz" wrap="square" lIns="91440" tIns="45720" rIns="91440" bIns="45720" numCol="1" spcCol="0" rtlCol="0" fromWordArt="0" anchor="ctr" anchorCtr="0" forceAA="0" compatLnSpc="1">
+            <a:prstTxWarp prst="textNoShape">
+              <a:avLst/>
+            </a:prstTxWarp>
+            <a:noAutofit/>
+          </a:bodyPr>
+          <a:lstStyle/>
+          <a:p>
+            <a:pPr marL="0" marR="0" indent="0" algn="ctr" defTabSz="914400" rtl="0" eaLnBrk="1" fontAlgn="base" latinLnBrk="0" hangingPunct="1">
+              <a:lnSpc>
+                <a:spcPct val="100000"/>
+              </a:lnSpc>
+              <a:spcBef>
+                <a:spcPct val="0"/>
+              </a:spcBef>
+              <a:spcAft>
+                <a:spcPts val="600"/>
+              </a:spcAft>
+              <a:buClrTx/>
+              <a:buSzTx/>
+              <a:buFontTx/>
+              <a:buNone/>
+              <a:tabLst/>
+            </a:pPr>
+            <a:r>
+              <a:rPr kumimoji="0" lang="de-DE" sz="2000" b="1" i="0" u="none" strike="noStrike" cap="none" normalizeH="0" baseline="0" dirty="0" smtClean="0">
+                <a:ln>
+                  <a:noFill/>
+                </a:ln>
+                <a:solidFill>
+                  <a:schemeClr val="tx1"/>
+                </a:solidFill>
+                <a:effectLst/>
+                <a:latin typeface="Open Sans" panose="020B0606030504020204" pitchFamily="34" charset="0"/>
+                <a:ea typeface="Open Sans" panose="020B0606030504020204" pitchFamily="34" charset="0"/>
+                <a:cs typeface="Open Sans" panose="020B0606030504020204" pitchFamily="34" charset="0"/>
+              </a:rPr>
+              <a:t>7</a:t>
+            </a:r>
+          </a:p>
+        </p:txBody>
+      </p:sp>
+      <p:cxnSp>
+        <p:nvCxnSpPr>
+          <p:cNvPr id="37" name="Gerade Verbindung mit Pfeil 36"/>
+          <p:cNvCxnSpPr>
+            <a:stCxn id="36" idx="3"/>
+            <a:endCxn id="35" idx="2"/>
+          </p:cNvCxnSpPr>
+          <p:nvPr/>
+        </p:nvCxnSpPr>
+        <p:spPr bwMode="auto">
+          <a:xfrm>
+            <a:off x="6216731" y="4293162"/>
+            <a:ext cx="3178079" cy="1261353"/>
+          </a:xfrm>
+          <a:prstGeom prst="straightConnector1">
+            <a:avLst/>
+          </a:prstGeom>
+          <a:solidFill>
+            <a:schemeClr val="accent1"/>
+          </a:solidFill>
+          <a:ln w="9525" cap="flat" cmpd="sng" algn="ctr">
+            <a:solidFill>
+              <a:schemeClr val="tx1"/>
+            </a:solidFill>
+            <a:prstDash val="dash"/>
+            <a:round/>
+            <a:headEnd type="none" w="med" len="med"/>
+            <a:tailEnd type="arrow"/>
+          </a:ln>
+          <a:effectLst/>
+        </p:spPr>
+      </p:cxnSp>
+      <p:cxnSp>
+        <p:nvCxnSpPr>
+          <p:cNvPr id="38" name="Gerade Verbindung mit Pfeil 37"/>
+          <p:cNvCxnSpPr>
+            <a:stCxn id="30" idx="3"/>
+            <a:endCxn id="35" idx="1"/>
+          </p:cNvCxnSpPr>
+          <p:nvPr/>
+        </p:nvCxnSpPr>
+        <p:spPr bwMode="auto">
+          <a:xfrm>
+            <a:off x="6216732" y="3382238"/>
+            <a:ext cx="3238528" cy="2024282"/>
+          </a:xfrm>
+          <a:prstGeom prst="straightConnector1">
+            <a:avLst/>
+          </a:prstGeom>
+          <a:solidFill>
+            <a:schemeClr val="accent1"/>
+          </a:solidFill>
+          <a:ln w="9525" cap="flat" cmpd="sng" algn="ctr">
+            <a:solidFill>
+              <a:schemeClr val="tx1"/>
+            </a:solidFill>
+            <a:prstDash val="dash"/>
+            <a:round/>
+            <a:headEnd type="none" w="med" len="med"/>
+            <a:tailEnd type="arrow"/>
+          </a:ln>
+          <a:effectLst/>
+        </p:spPr>
+      </p:cxnSp>
     </p:spTree>
     <p:extLst>
       <p:ext uri="{BB962C8B-B14F-4D97-AF65-F5344CB8AC3E}">
@@ -15986,14 +16284,14 @@
                 <a:gridCol w="1145504">
                   <a:extLst>
                     <a:ext uri="{9D8B030D-6E8A-4147-A177-3AD203B41FA5}">
-                      <a16:colId xmlns="" xmlns:a16="http://schemas.microsoft.com/office/drawing/2014/main" val="20000"/>
+                      <a16:colId xmlns:a16="http://schemas.microsoft.com/office/drawing/2014/main" xmlns="" val="20000"/>
                     </a:ext>
                   </a:extLst>
                 </a:gridCol>
                 <a:gridCol w="3842658">
                   <a:extLst>
                     <a:ext uri="{9D8B030D-6E8A-4147-A177-3AD203B41FA5}">
-                      <a16:colId xmlns="" xmlns:a16="http://schemas.microsoft.com/office/drawing/2014/main" val="20001"/>
+                      <a16:colId xmlns:a16="http://schemas.microsoft.com/office/drawing/2014/main" xmlns="" val="20001"/>
                     </a:ext>
                   </a:extLst>
                 </a:gridCol>
@@ -16056,7 +16354,7 @@
                 </a:tc>
                 <a:extLst>
                   <a:ext uri="{0D108BD9-81ED-4DB2-BD59-A6C34878D82A}">
-                    <a16:rowId xmlns="" xmlns:a16="http://schemas.microsoft.com/office/drawing/2014/main" val="10002"/>
+                    <a16:rowId xmlns:a16="http://schemas.microsoft.com/office/drawing/2014/main" xmlns="" val="10002"/>
                   </a:ext>
                 </a:extLst>
               </a:tr>
@@ -16533,7 +16831,6 @@
               <a:rPr lang="en-US" sz="1400" dirty="0" smtClean="0"/>
               <a:t> </a:t>
             </a:r>
-            <a:endParaRPr lang="en-US" sz="1400" dirty="0" smtClean="0"/>
           </a:p>
           <a:p>
             <a:r>
@@ -16552,7 +16849,6 @@
               <a:rPr lang="en-US" sz="1400" dirty="0" smtClean="0"/>
               <a:t> </a:t>
             </a:r>
-            <a:endParaRPr lang="en-US" sz="1400" dirty="0" smtClean="0"/>
           </a:p>
           <a:p>
             <a:endParaRPr lang="en-US" sz="1400" dirty="0" smtClean="0"/>

</xml_diff>